<commit_message>
ersten beiden Kapitel v1.0 fertig
</commit_message>
<xml_diff>
--- a/sketches.pptx
+++ b/sketches.pptx
@@ -5,7 +5,7 @@
     <p:sldMasterId id="2147483648" r:id="rId1"/>
   </p:sldMasterIdLst>
   <p:notesMasterIdLst>
-    <p:notesMasterId r:id="rId8"/>
+    <p:notesMasterId r:id="rId9"/>
   </p:notesMasterIdLst>
   <p:sldIdLst>
     <p:sldId id="256" r:id="rId2"/>
@@ -14,6 +14,7 @@
     <p:sldId id="259" r:id="rId5"/>
     <p:sldId id="260" r:id="rId6"/>
     <p:sldId id="261" r:id="rId7"/>
+    <p:sldId id="262" r:id="rId8"/>
   </p:sldIdLst>
   <p:sldSz cx="12192000" cy="6858000"/>
   <p:notesSz cx="6858000" cy="9144000"/>
@@ -9641,6 +9642,457 @@
 </p:sld>
 </file>
 
+<file path=ppt/slides/slide7.xml><?xml version="1.0" encoding="utf-8"?>
+<p:sld xmlns:a="http://schemas.openxmlformats.org/drawingml/2006/main" xmlns:r="http://schemas.openxmlformats.org/officeDocument/2006/relationships" xmlns:p="http://schemas.openxmlformats.org/presentationml/2006/main">
+  <p:cSld>
+    <p:spTree>
+      <p:nvGrpSpPr>
+        <p:cNvPr id="1" name=""/>
+        <p:cNvGrpSpPr/>
+        <p:nvPr/>
+      </p:nvGrpSpPr>
+      <p:grpSpPr>
+        <a:xfrm>
+          <a:off x="0" y="0"/>
+          <a:ext cx="0" cy="0"/>
+          <a:chOff x="0" y="0"/>
+          <a:chExt cx="0" cy="0"/>
+        </a:xfrm>
+      </p:grpSpPr>
+      <p:pic>
+        <p:nvPicPr>
+          <p:cNvPr id="20" name="Picture 19">
+            <a:extLst>
+              <a:ext uri="{FF2B5EF4-FFF2-40B4-BE49-F238E27FC236}">
+                <a16:creationId xmlns:a16="http://schemas.microsoft.com/office/drawing/2014/main" id="{02A8BB8A-8BF6-B4EE-5503-FE8FD65263EB}"/>
+              </a:ext>
+            </a:extLst>
+          </p:cNvPr>
+          <p:cNvPicPr>
+            <a:picLocks noChangeAspect="1"/>
+          </p:cNvPicPr>
+          <p:nvPr/>
+        </p:nvPicPr>
+        <p:blipFill>
+          <a:blip r:embed="rId2"/>
+          <a:stretch>
+            <a:fillRect/>
+          </a:stretch>
+        </p:blipFill>
+        <p:spPr>
+          <a:xfrm>
+            <a:off x="3686175" y="1557337"/>
+            <a:ext cx="4819650" cy="3743325"/>
+          </a:xfrm>
+          <a:prstGeom prst="rect">
+            <a:avLst/>
+          </a:prstGeom>
+        </p:spPr>
+      </p:pic>
+      <p:sp>
+        <p:nvSpPr>
+          <p:cNvPr id="6" name="Oval 5">
+            <a:extLst>
+              <a:ext uri="{FF2B5EF4-FFF2-40B4-BE49-F238E27FC236}">
+                <a16:creationId xmlns:a16="http://schemas.microsoft.com/office/drawing/2014/main" id="{BAAE0647-0ADE-9F36-369A-3592C8DD7336}"/>
+              </a:ext>
+            </a:extLst>
+          </p:cNvPr>
+          <p:cNvSpPr/>
+          <p:nvPr/>
+        </p:nvSpPr>
+        <p:spPr>
+          <a:xfrm>
+            <a:off x="4959858" y="3493008"/>
+            <a:ext cx="73152" cy="73152"/>
+          </a:xfrm>
+          <a:prstGeom prst="ellipse">
+            <a:avLst/>
+          </a:prstGeom>
+          <a:solidFill>
+            <a:srgbClr val="C00000"/>
+          </a:solidFill>
+          <a:ln>
+            <a:solidFill>
+              <a:srgbClr val="C00000"/>
+            </a:solidFill>
+          </a:ln>
+        </p:spPr>
+        <p:style>
+          <a:lnRef idx="2">
+            <a:schemeClr val="accent1">
+              <a:shade val="50000"/>
+            </a:schemeClr>
+          </a:lnRef>
+          <a:fillRef idx="1">
+            <a:schemeClr val="accent1"/>
+          </a:fillRef>
+          <a:effectRef idx="0">
+            <a:schemeClr val="accent1"/>
+          </a:effectRef>
+          <a:fontRef idx="minor">
+            <a:schemeClr val="lt1"/>
+          </a:fontRef>
+        </p:style>
+        <p:txBody>
+          <a:bodyPr rtlCol="0" anchor="ctr"/>
+          <a:lstStyle/>
+          <a:p>
+            <a:pPr algn="ctr"/>
+            <a:endParaRPr lang="de-DE"/>
+          </a:p>
+        </p:txBody>
+      </p:sp>
+      <p:sp>
+        <p:nvSpPr>
+          <p:cNvPr id="7" name="Oval 6">
+            <a:extLst>
+              <a:ext uri="{FF2B5EF4-FFF2-40B4-BE49-F238E27FC236}">
+                <a16:creationId xmlns:a16="http://schemas.microsoft.com/office/drawing/2014/main" id="{75FD2564-7275-05AF-7453-6D8FEE5763B0}"/>
+              </a:ext>
+            </a:extLst>
+          </p:cNvPr>
+          <p:cNvSpPr/>
+          <p:nvPr/>
+        </p:nvSpPr>
+        <p:spPr>
+          <a:xfrm>
+            <a:off x="5775198" y="3260598"/>
+            <a:ext cx="73152" cy="73152"/>
+          </a:xfrm>
+          <a:prstGeom prst="ellipse">
+            <a:avLst/>
+          </a:prstGeom>
+          <a:solidFill>
+            <a:srgbClr val="C00000"/>
+          </a:solidFill>
+          <a:ln>
+            <a:solidFill>
+              <a:srgbClr val="C00000"/>
+            </a:solidFill>
+          </a:ln>
+        </p:spPr>
+        <p:style>
+          <a:lnRef idx="2">
+            <a:schemeClr val="accent1">
+              <a:shade val="50000"/>
+            </a:schemeClr>
+          </a:lnRef>
+          <a:fillRef idx="1">
+            <a:schemeClr val="accent1"/>
+          </a:fillRef>
+          <a:effectRef idx="0">
+            <a:schemeClr val="accent1"/>
+          </a:effectRef>
+          <a:fontRef idx="minor">
+            <a:schemeClr val="lt1"/>
+          </a:fontRef>
+        </p:style>
+        <p:txBody>
+          <a:bodyPr rtlCol="0" anchor="ctr"/>
+          <a:lstStyle/>
+          <a:p>
+            <a:pPr algn="ctr"/>
+            <a:endParaRPr lang="de-DE"/>
+          </a:p>
+        </p:txBody>
+      </p:sp>
+      <p:sp>
+        <p:nvSpPr>
+          <p:cNvPr id="8" name="Oval 7">
+            <a:extLst>
+              <a:ext uri="{FF2B5EF4-FFF2-40B4-BE49-F238E27FC236}">
+                <a16:creationId xmlns:a16="http://schemas.microsoft.com/office/drawing/2014/main" id="{A2031D8E-8639-0CF5-C0A0-1170BFDD5E05}"/>
+              </a:ext>
+            </a:extLst>
+          </p:cNvPr>
+          <p:cNvSpPr/>
+          <p:nvPr/>
+        </p:nvSpPr>
+        <p:spPr>
+          <a:xfrm>
+            <a:off x="7371069" y="4752594"/>
+            <a:ext cx="73152" cy="73152"/>
+          </a:xfrm>
+          <a:prstGeom prst="ellipse">
+            <a:avLst/>
+          </a:prstGeom>
+          <a:solidFill>
+            <a:srgbClr val="C00000"/>
+          </a:solidFill>
+          <a:ln>
+            <a:solidFill>
+              <a:srgbClr val="C00000"/>
+            </a:solidFill>
+          </a:ln>
+        </p:spPr>
+        <p:style>
+          <a:lnRef idx="2">
+            <a:schemeClr val="accent1">
+              <a:shade val="50000"/>
+            </a:schemeClr>
+          </a:lnRef>
+          <a:fillRef idx="1">
+            <a:schemeClr val="accent1"/>
+          </a:fillRef>
+          <a:effectRef idx="0">
+            <a:schemeClr val="accent1"/>
+          </a:effectRef>
+          <a:fontRef idx="minor">
+            <a:schemeClr val="lt1"/>
+          </a:fontRef>
+        </p:style>
+        <p:txBody>
+          <a:bodyPr rtlCol="0" anchor="ctr"/>
+          <a:lstStyle/>
+          <a:p>
+            <a:pPr algn="ctr"/>
+            <a:endParaRPr lang="de-DE"/>
+          </a:p>
+        </p:txBody>
+      </p:sp>
+      <p:cxnSp>
+        <p:nvCxnSpPr>
+          <p:cNvPr id="12" name="Straight Arrow Connector 11">
+            <a:extLst>
+              <a:ext uri="{FF2B5EF4-FFF2-40B4-BE49-F238E27FC236}">
+                <a16:creationId xmlns:a16="http://schemas.microsoft.com/office/drawing/2014/main" id="{3172D9F8-19A9-95A2-56B1-F04B0CC17704}"/>
+              </a:ext>
+            </a:extLst>
+          </p:cNvPr>
+          <p:cNvCxnSpPr/>
+          <p:nvPr/>
+        </p:nvCxnSpPr>
+        <p:spPr>
+          <a:xfrm flipV="1">
+            <a:off x="4997370" y="3628707"/>
+            <a:ext cx="0" cy="436880"/>
+          </a:xfrm>
+          <a:prstGeom prst="straightConnector1">
+            <a:avLst/>
+          </a:prstGeom>
+          <a:ln>
+            <a:tailEnd type="triangle"/>
+          </a:ln>
+        </p:spPr>
+        <p:style>
+          <a:lnRef idx="1">
+            <a:schemeClr val="accent1"/>
+          </a:lnRef>
+          <a:fillRef idx="0">
+            <a:schemeClr val="accent1"/>
+          </a:fillRef>
+          <a:effectRef idx="0">
+            <a:schemeClr val="accent1"/>
+          </a:effectRef>
+          <a:fontRef idx="minor">
+            <a:schemeClr val="tx1"/>
+          </a:fontRef>
+        </p:style>
+      </p:cxnSp>
+      <p:cxnSp>
+        <p:nvCxnSpPr>
+          <p:cNvPr id="13" name="Straight Arrow Connector 12">
+            <a:extLst>
+              <a:ext uri="{FF2B5EF4-FFF2-40B4-BE49-F238E27FC236}">
+                <a16:creationId xmlns:a16="http://schemas.microsoft.com/office/drawing/2014/main" id="{D65A6492-AA4A-B8DF-9851-59D245B89B3A}"/>
+              </a:ext>
+            </a:extLst>
+          </p:cNvPr>
+          <p:cNvCxnSpPr>
+            <a:cxnSpLocks/>
+          </p:cNvCxnSpPr>
+          <p:nvPr/>
+        </p:nvCxnSpPr>
+        <p:spPr>
+          <a:xfrm>
+            <a:off x="5817603" y="2958447"/>
+            <a:ext cx="0" cy="253100"/>
+          </a:xfrm>
+          <a:prstGeom prst="straightConnector1">
+            <a:avLst/>
+          </a:prstGeom>
+          <a:ln>
+            <a:tailEnd type="triangle"/>
+          </a:ln>
+        </p:spPr>
+        <p:style>
+          <a:lnRef idx="1">
+            <a:schemeClr val="accent1"/>
+          </a:lnRef>
+          <a:fillRef idx="0">
+            <a:schemeClr val="accent1"/>
+          </a:fillRef>
+          <a:effectRef idx="0">
+            <a:schemeClr val="accent1"/>
+          </a:effectRef>
+          <a:fontRef idx="minor">
+            <a:schemeClr val="tx1"/>
+          </a:fontRef>
+        </p:style>
+      </p:cxnSp>
+      <p:cxnSp>
+        <p:nvCxnSpPr>
+          <p:cNvPr id="14" name="Straight Arrow Connector 13">
+            <a:extLst>
+              <a:ext uri="{FF2B5EF4-FFF2-40B4-BE49-F238E27FC236}">
+                <a16:creationId xmlns:a16="http://schemas.microsoft.com/office/drawing/2014/main" id="{1C791403-08B6-392D-03EC-55CB2881B6D2}"/>
+              </a:ext>
+            </a:extLst>
+          </p:cNvPr>
+          <p:cNvCxnSpPr>
+            <a:cxnSpLocks/>
+          </p:cNvCxnSpPr>
+          <p:nvPr/>
+        </p:nvCxnSpPr>
+        <p:spPr>
+          <a:xfrm>
+            <a:off x="7407645" y="3628707"/>
+            <a:ext cx="0" cy="914400"/>
+          </a:xfrm>
+          <a:prstGeom prst="straightConnector1">
+            <a:avLst/>
+          </a:prstGeom>
+          <a:ln>
+            <a:tailEnd type="triangle"/>
+          </a:ln>
+        </p:spPr>
+        <p:style>
+          <a:lnRef idx="1">
+            <a:schemeClr val="accent1"/>
+          </a:lnRef>
+          <a:fillRef idx="0">
+            <a:schemeClr val="accent1"/>
+          </a:fillRef>
+          <a:effectRef idx="0">
+            <a:schemeClr val="accent1"/>
+          </a:effectRef>
+          <a:fontRef idx="minor">
+            <a:schemeClr val="tx1"/>
+          </a:fontRef>
+        </p:style>
+      </p:cxnSp>
+      <p:sp>
+        <p:nvSpPr>
+          <p:cNvPr id="15" name="TextBox 14">
+            <a:extLst>
+              <a:ext uri="{FF2B5EF4-FFF2-40B4-BE49-F238E27FC236}">
+                <a16:creationId xmlns:a16="http://schemas.microsoft.com/office/drawing/2014/main" id="{C9BCA6C6-4319-C575-69DA-893CA42EBC76}"/>
+              </a:ext>
+            </a:extLst>
+          </p:cNvPr>
+          <p:cNvSpPr txBox="1"/>
+          <p:nvPr/>
+        </p:nvSpPr>
+        <p:spPr>
+          <a:xfrm>
+            <a:off x="4159170" y="4089650"/>
+            <a:ext cx="1676399" cy="338554"/>
+          </a:xfrm>
+          <a:prstGeom prst="rect">
+            <a:avLst/>
+          </a:prstGeom>
+          <a:noFill/>
+        </p:spPr>
+        <p:txBody>
+          <a:bodyPr wrap="square">
+            <a:spAutoFit/>
+          </a:bodyPr>
+          <a:lstStyle/>
+          <a:p>
+            <a:r>
+              <a:rPr lang="de-DE" sz="1600" b="0" dirty="0"/>
+              <a:t>Lokales Minimum</a:t>
+            </a:r>
+            <a:endParaRPr lang="de-DE" sz="1600" dirty="0"/>
+          </a:p>
+        </p:txBody>
+      </p:sp>
+      <p:sp>
+        <p:nvSpPr>
+          <p:cNvPr id="16" name="TextBox 15">
+            <a:extLst>
+              <a:ext uri="{FF2B5EF4-FFF2-40B4-BE49-F238E27FC236}">
+                <a16:creationId xmlns:a16="http://schemas.microsoft.com/office/drawing/2014/main" id="{0B87E3C0-3CF1-2B04-8148-E1775E7A9448}"/>
+              </a:ext>
+            </a:extLst>
+          </p:cNvPr>
+          <p:cNvSpPr txBox="1"/>
+          <p:nvPr/>
+        </p:nvSpPr>
+        <p:spPr>
+          <a:xfrm>
+            <a:off x="5194953" y="2619893"/>
+            <a:ext cx="1676399" cy="338554"/>
+          </a:xfrm>
+          <a:prstGeom prst="rect">
+            <a:avLst/>
+          </a:prstGeom>
+          <a:noFill/>
+        </p:spPr>
+        <p:txBody>
+          <a:bodyPr wrap="square">
+            <a:spAutoFit/>
+          </a:bodyPr>
+          <a:lstStyle/>
+          <a:p>
+            <a:r>
+              <a:rPr lang="de-DE" sz="1600" b="0" dirty="0"/>
+              <a:t>Lokales Maximum</a:t>
+            </a:r>
+            <a:endParaRPr lang="de-DE" sz="1600" dirty="0"/>
+          </a:p>
+        </p:txBody>
+      </p:sp>
+      <p:sp>
+        <p:nvSpPr>
+          <p:cNvPr id="17" name="TextBox 16">
+            <a:extLst>
+              <a:ext uri="{FF2B5EF4-FFF2-40B4-BE49-F238E27FC236}">
+                <a16:creationId xmlns:a16="http://schemas.microsoft.com/office/drawing/2014/main" id="{E1264CD7-BEF8-5978-6881-7D67B06C0A72}"/>
+              </a:ext>
+            </a:extLst>
+          </p:cNvPr>
+          <p:cNvSpPr txBox="1"/>
+          <p:nvPr/>
+        </p:nvSpPr>
+        <p:spPr>
+          <a:xfrm>
+            <a:off x="6442258" y="3297174"/>
+            <a:ext cx="1930773" cy="338554"/>
+          </a:xfrm>
+          <a:prstGeom prst="rect">
+            <a:avLst/>
+          </a:prstGeom>
+          <a:noFill/>
+        </p:spPr>
+        <p:txBody>
+          <a:bodyPr wrap="square">
+            <a:spAutoFit/>
+          </a:bodyPr>
+          <a:lstStyle/>
+          <a:p>
+            <a:r>
+              <a:rPr lang="de-DE" sz="1600" b="0" dirty="0"/>
+              <a:t>Globales Minimum</a:t>
+            </a:r>
+            <a:endParaRPr lang="de-DE" sz="1600" dirty="0"/>
+          </a:p>
+        </p:txBody>
+      </p:sp>
+    </p:spTree>
+    <p:extLst>
+      <p:ext uri="{BB962C8B-B14F-4D97-AF65-F5344CB8AC3E}">
+        <p14:creationId xmlns:p14="http://schemas.microsoft.com/office/powerpoint/2010/main" val="2920498922"/>
+      </p:ext>
+    </p:extLst>
+  </p:cSld>
+  <p:clrMapOvr>
+    <a:masterClrMapping/>
+  </p:clrMapOvr>
+</p:sld>
+</file>
+
 <file path=ppt/theme/theme1.xml><?xml version="1.0" encoding="utf-8"?>
 <a:theme xmlns:a="http://schemas.openxmlformats.org/drawingml/2006/main" name="Office Theme">
   <a:themeElements>

</xml_diff>

<commit_message>
vor Überarbeitung für SS24
</commit_message>
<xml_diff>
--- a/sketches.pptx
+++ b/sketches.pptx
@@ -5,17 +5,18 @@
     <p:sldMasterId id="2147483648" r:id="rId1"/>
   </p:sldMasterIdLst>
   <p:notesMasterIdLst>
-    <p:notesMasterId r:id="rId10"/>
+    <p:notesMasterId r:id="rId11"/>
   </p:notesMasterIdLst>
   <p:sldIdLst>
     <p:sldId id="256" r:id="rId2"/>
     <p:sldId id="257" r:id="rId3"/>
     <p:sldId id="258" r:id="rId4"/>
     <p:sldId id="259" r:id="rId5"/>
-    <p:sldId id="260" r:id="rId6"/>
-    <p:sldId id="261" r:id="rId7"/>
-    <p:sldId id="262" r:id="rId8"/>
-    <p:sldId id="263" r:id="rId9"/>
+    <p:sldId id="264" r:id="rId6"/>
+    <p:sldId id="260" r:id="rId7"/>
+    <p:sldId id="261" r:id="rId8"/>
+    <p:sldId id="262" r:id="rId9"/>
+    <p:sldId id="263" r:id="rId10"/>
   </p:sldIdLst>
   <p:sldSz cx="12192000" cy="6858000"/>
   <p:notesSz cx="6858000" cy="9144000"/>
@@ -204,7 +205,7 @@
           <a:p>
             <a:fld id="{83BEFFCD-55D1-46DA-89C3-8B3AE4381425}" type="datetimeFigureOut">
               <a:rPr lang="de-DE" smtClean="0"/>
-              <a:t>03.04.2023</a:t>
+              <a:t>20.11.2023</a:t>
             </a:fld>
             <a:endParaRPr lang="de-DE"/>
           </a:p>
@@ -537,7 +538,7 @@
           <a:p>
             <a:fld id="{2A9EB1CA-8E32-43B2-8FCA-33A31D7A2105}" type="slidenum">
               <a:rPr lang="de-DE" smtClean="0"/>
-              <a:t>6</a:t>
+              <a:t>7</a:t>
             </a:fld>
             <a:endParaRPr lang="de-DE"/>
           </a:p>
@@ -705,7 +706,7 @@
           <a:p>
             <a:fld id="{475E47E5-6F11-44CE-B90D-6B38E21F4970}" type="datetimeFigureOut">
               <a:rPr lang="de-DE" smtClean="0"/>
-              <a:t>03.04.2023</a:t>
+              <a:t>20.11.2023</a:t>
             </a:fld>
             <a:endParaRPr lang="de-DE"/>
           </a:p>
@@ -905,7 +906,7 @@
           <a:p>
             <a:fld id="{475E47E5-6F11-44CE-B90D-6B38E21F4970}" type="datetimeFigureOut">
               <a:rPr lang="de-DE" smtClean="0"/>
-              <a:t>03.04.2023</a:t>
+              <a:t>20.11.2023</a:t>
             </a:fld>
             <a:endParaRPr lang="de-DE"/>
           </a:p>
@@ -1115,7 +1116,7 @@
           <a:p>
             <a:fld id="{475E47E5-6F11-44CE-B90D-6B38E21F4970}" type="datetimeFigureOut">
               <a:rPr lang="de-DE" smtClean="0"/>
-              <a:t>03.04.2023</a:t>
+              <a:t>20.11.2023</a:t>
             </a:fld>
             <a:endParaRPr lang="de-DE"/>
           </a:p>
@@ -1315,7 +1316,7 @@
           <a:p>
             <a:fld id="{475E47E5-6F11-44CE-B90D-6B38E21F4970}" type="datetimeFigureOut">
               <a:rPr lang="de-DE" smtClean="0"/>
-              <a:t>03.04.2023</a:t>
+              <a:t>20.11.2023</a:t>
             </a:fld>
             <a:endParaRPr lang="de-DE"/>
           </a:p>
@@ -1591,7 +1592,7 @@
           <a:p>
             <a:fld id="{475E47E5-6F11-44CE-B90D-6B38E21F4970}" type="datetimeFigureOut">
               <a:rPr lang="de-DE" smtClean="0"/>
-              <a:t>03.04.2023</a:t>
+              <a:t>20.11.2023</a:t>
             </a:fld>
             <a:endParaRPr lang="de-DE"/>
           </a:p>
@@ -1859,7 +1860,7 @@
           <a:p>
             <a:fld id="{475E47E5-6F11-44CE-B90D-6B38E21F4970}" type="datetimeFigureOut">
               <a:rPr lang="de-DE" smtClean="0"/>
-              <a:t>03.04.2023</a:t>
+              <a:t>20.11.2023</a:t>
             </a:fld>
             <a:endParaRPr lang="de-DE"/>
           </a:p>
@@ -2274,7 +2275,7 @@
           <a:p>
             <a:fld id="{475E47E5-6F11-44CE-B90D-6B38E21F4970}" type="datetimeFigureOut">
               <a:rPr lang="de-DE" smtClean="0"/>
-              <a:t>03.04.2023</a:t>
+              <a:t>20.11.2023</a:t>
             </a:fld>
             <a:endParaRPr lang="de-DE"/>
           </a:p>
@@ -2416,7 +2417,7 @@
           <a:p>
             <a:fld id="{475E47E5-6F11-44CE-B90D-6B38E21F4970}" type="datetimeFigureOut">
               <a:rPr lang="de-DE" smtClean="0"/>
-              <a:t>03.04.2023</a:t>
+              <a:t>20.11.2023</a:t>
             </a:fld>
             <a:endParaRPr lang="de-DE"/>
           </a:p>
@@ -2529,7 +2530,7 @@
           <a:p>
             <a:fld id="{475E47E5-6F11-44CE-B90D-6B38E21F4970}" type="datetimeFigureOut">
               <a:rPr lang="de-DE" smtClean="0"/>
-              <a:t>03.04.2023</a:t>
+              <a:t>20.11.2023</a:t>
             </a:fld>
             <a:endParaRPr lang="de-DE"/>
           </a:p>
@@ -2842,7 +2843,7 @@
           <a:p>
             <a:fld id="{475E47E5-6F11-44CE-B90D-6B38E21F4970}" type="datetimeFigureOut">
               <a:rPr lang="de-DE" smtClean="0"/>
-              <a:t>03.04.2023</a:t>
+              <a:t>20.11.2023</a:t>
             </a:fld>
             <a:endParaRPr lang="de-DE"/>
           </a:p>
@@ -3131,7 +3132,7 @@
           <a:p>
             <a:fld id="{475E47E5-6F11-44CE-B90D-6B38E21F4970}" type="datetimeFigureOut">
               <a:rPr lang="de-DE" smtClean="0"/>
-              <a:t>03.04.2023</a:t>
+              <a:t>20.11.2023</a:t>
             </a:fld>
             <a:endParaRPr lang="de-DE"/>
           </a:p>
@@ -3374,7 +3375,7 @@
           <a:p>
             <a:fld id="{475E47E5-6F11-44CE-B90D-6B38E21F4970}" type="datetimeFigureOut">
               <a:rPr lang="de-DE" smtClean="0"/>
-              <a:t>03.04.2023</a:t>
+              <a:t>20.11.2023</a:t>
             </a:fld>
             <a:endParaRPr lang="de-DE"/>
           </a:p>
@@ -8155,6 +8156,404 @@
       </p:grpSpPr>
       <p:pic>
         <p:nvPicPr>
+          <p:cNvPr id="1026" name="Picture 2">
+            <a:extLst>
+              <a:ext uri="{FF2B5EF4-FFF2-40B4-BE49-F238E27FC236}">
+                <a16:creationId xmlns:a16="http://schemas.microsoft.com/office/drawing/2014/main" id="{74D4F882-829B-3ADF-8FCF-F45F1904FB38}"/>
+              </a:ext>
+            </a:extLst>
+          </p:cNvPr>
+          <p:cNvPicPr>
+            <a:picLocks noChangeAspect="1" noChangeArrowheads="1"/>
+          </p:cNvPicPr>
+          <p:nvPr/>
+        </p:nvPicPr>
+        <p:blipFill>
+          <a:blip r:embed="rId2">
+            <a:extLst>
+              <a:ext uri="{28A0092B-C50C-407E-A947-70E740481C1C}">
+                <a14:useLocalDpi xmlns:a14="http://schemas.microsoft.com/office/drawing/2010/main" val="0"/>
+              </a:ext>
+            </a:extLst>
+          </a:blip>
+          <a:srcRect/>
+          <a:stretch>
+            <a:fillRect/>
+          </a:stretch>
+        </p:blipFill>
+        <p:spPr bwMode="auto">
+          <a:xfrm>
+            <a:off x="2625877" y="559278"/>
+            <a:ext cx="5739441" cy="5739441"/>
+          </a:xfrm>
+          <a:prstGeom prst="rect">
+            <a:avLst/>
+          </a:prstGeom>
+          <a:noFill/>
+          <a:extLst>
+            <a:ext uri="{909E8E84-426E-40DD-AFC4-6F175D3DCCD1}">
+              <a14:hiddenFill xmlns:a14="http://schemas.microsoft.com/office/drawing/2010/main">
+                <a:solidFill>
+                  <a:srgbClr val="FFFFFF"/>
+                </a:solidFill>
+              </a14:hiddenFill>
+            </a:ext>
+          </a:extLst>
+        </p:spPr>
+      </p:pic>
+      <p:sp>
+        <p:nvSpPr>
+          <p:cNvPr id="4" name="Rectangle 3">
+            <a:extLst>
+              <a:ext uri="{FF2B5EF4-FFF2-40B4-BE49-F238E27FC236}">
+                <a16:creationId xmlns:a16="http://schemas.microsoft.com/office/drawing/2014/main" id="{36BDFF82-6130-78CE-9CBD-6B00CEB16BE4}"/>
+              </a:ext>
+            </a:extLst>
+          </p:cNvPr>
+          <p:cNvSpPr/>
+          <p:nvPr/>
+        </p:nvSpPr>
+        <p:spPr>
+          <a:xfrm>
+            <a:off x="4637105" y="3071183"/>
+            <a:ext cx="1966546" cy="1519096"/>
+          </a:xfrm>
+          <a:prstGeom prst="rect">
+            <a:avLst/>
+          </a:prstGeom>
+          <a:solidFill>
+            <a:schemeClr val="accent1">
+              <a:lumMod val="40000"/>
+              <a:lumOff val="60000"/>
+              <a:alpha val="50000"/>
+            </a:schemeClr>
+          </a:solidFill>
+          <a:ln>
+            <a:solidFill>
+              <a:schemeClr val="tx1"/>
+            </a:solidFill>
+          </a:ln>
+          <a:scene3d>
+            <a:camera prst="perspectiveRelaxed">
+              <a:rot lat="21000000" lon="0" rev="0"/>
+            </a:camera>
+            <a:lightRig rig="threePt" dir="t"/>
+          </a:scene3d>
+        </p:spPr>
+        <p:style>
+          <a:lnRef idx="2">
+            <a:schemeClr val="accent1">
+              <a:shade val="50000"/>
+            </a:schemeClr>
+          </a:lnRef>
+          <a:fillRef idx="1">
+            <a:schemeClr val="accent1"/>
+          </a:fillRef>
+          <a:effectRef idx="0">
+            <a:schemeClr val="accent1"/>
+          </a:effectRef>
+          <a:fontRef idx="minor">
+            <a:schemeClr val="lt1"/>
+          </a:fontRef>
+        </p:style>
+        <p:txBody>
+          <a:bodyPr rtlCol="0" anchor="ctr"/>
+          <a:lstStyle/>
+          <a:p>
+            <a:pPr algn="ctr"/>
+            <a:endParaRPr lang="de-DE"/>
+          </a:p>
+        </p:txBody>
+      </p:sp>
+      <p:cxnSp>
+        <p:nvCxnSpPr>
+          <p:cNvPr id="6" name="Straight Arrow Connector 5">
+            <a:extLst>
+              <a:ext uri="{FF2B5EF4-FFF2-40B4-BE49-F238E27FC236}">
+                <a16:creationId xmlns:a16="http://schemas.microsoft.com/office/drawing/2014/main" id="{DD3F5AC0-3070-2A24-8CDE-59023994DAB5}"/>
+              </a:ext>
+            </a:extLst>
+          </p:cNvPr>
+          <p:cNvCxnSpPr>
+            <a:cxnSpLocks/>
+          </p:cNvCxnSpPr>
+          <p:nvPr/>
+        </p:nvCxnSpPr>
+        <p:spPr>
+          <a:xfrm flipH="1" flipV="1">
+            <a:off x="4833257" y="3221572"/>
+            <a:ext cx="791705" cy="609159"/>
+          </a:xfrm>
+          <a:prstGeom prst="straightConnector1">
+            <a:avLst/>
+          </a:prstGeom>
+          <a:ln w="19050">
+            <a:solidFill>
+              <a:schemeClr val="tx1"/>
+            </a:solidFill>
+            <a:tailEnd type="triangle"/>
+          </a:ln>
+        </p:spPr>
+        <p:style>
+          <a:lnRef idx="1">
+            <a:schemeClr val="accent1"/>
+          </a:lnRef>
+          <a:fillRef idx="0">
+            <a:schemeClr val="accent1"/>
+          </a:fillRef>
+          <a:effectRef idx="0">
+            <a:schemeClr val="accent1"/>
+          </a:effectRef>
+          <a:fontRef idx="minor">
+            <a:schemeClr val="tx1"/>
+          </a:fontRef>
+        </p:style>
+      </p:cxnSp>
+      <p:cxnSp>
+        <p:nvCxnSpPr>
+          <p:cNvPr id="8" name="Straight Arrow Connector 7">
+            <a:extLst>
+              <a:ext uri="{FF2B5EF4-FFF2-40B4-BE49-F238E27FC236}">
+                <a16:creationId xmlns:a16="http://schemas.microsoft.com/office/drawing/2014/main" id="{6C8903A2-8B0F-CAAB-9256-E990172FDF0D}"/>
+              </a:ext>
+            </a:extLst>
+          </p:cNvPr>
+          <p:cNvCxnSpPr>
+            <a:cxnSpLocks/>
+          </p:cNvCxnSpPr>
+          <p:nvPr/>
+        </p:nvCxnSpPr>
+        <p:spPr>
+          <a:xfrm flipV="1">
+            <a:off x="5659729" y="3194757"/>
+            <a:ext cx="641874" cy="618001"/>
+          </a:xfrm>
+          <a:prstGeom prst="straightConnector1">
+            <a:avLst/>
+          </a:prstGeom>
+          <a:ln w="19050">
+            <a:solidFill>
+              <a:schemeClr val="tx1"/>
+            </a:solidFill>
+            <a:tailEnd type="triangle"/>
+          </a:ln>
+        </p:spPr>
+        <p:style>
+          <a:lnRef idx="1">
+            <a:schemeClr val="accent1"/>
+          </a:lnRef>
+          <a:fillRef idx="0">
+            <a:schemeClr val="accent1"/>
+          </a:fillRef>
+          <a:effectRef idx="0">
+            <a:schemeClr val="accent1"/>
+          </a:effectRef>
+          <a:fontRef idx="minor">
+            <a:schemeClr val="tx1"/>
+          </a:fontRef>
+        </p:style>
+      </p:cxnSp>
+      <p:sp>
+        <p:nvSpPr>
+          <p:cNvPr id="12" name="Oval 11">
+            <a:extLst>
+              <a:ext uri="{FF2B5EF4-FFF2-40B4-BE49-F238E27FC236}">
+                <a16:creationId xmlns:a16="http://schemas.microsoft.com/office/drawing/2014/main" id="{1D7B7CB9-08B8-03CC-A70B-3E7E5F6CE441}"/>
+              </a:ext>
+            </a:extLst>
+          </p:cNvPr>
+          <p:cNvSpPr/>
+          <p:nvPr/>
+        </p:nvSpPr>
+        <p:spPr>
+          <a:xfrm>
+            <a:off x="5566749" y="3777102"/>
+            <a:ext cx="107259" cy="107259"/>
+          </a:xfrm>
+          <a:prstGeom prst="ellipse">
+            <a:avLst/>
+          </a:prstGeom>
+          <a:solidFill>
+            <a:srgbClr val="C00000"/>
+          </a:solidFill>
+          <a:ln>
+            <a:solidFill>
+              <a:srgbClr val="C00000"/>
+            </a:solidFill>
+          </a:ln>
+        </p:spPr>
+        <p:style>
+          <a:lnRef idx="2">
+            <a:schemeClr val="accent1">
+              <a:shade val="50000"/>
+            </a:schemeClr>
+          </a:lnRef>
+          <a:fillRef idx="1">
+            <a:schemeClr val="accent1"/>
+          </a:fillRef>
+          <a:effectRef idx="0">
+            <a:schemeClr val="accent1"/>
+          </a:effectRef>
+          <a:fontRef idx="minor">
+            <a:schemeClr val="lt1"/>
+          </a:fontRef>
+        </p:style>
+        <p:txBody>
+          <a:bodyPr rtlCol="0" anchor="ctr"/>
+          <a:lstStyle/>
+          <a:p>
+            <a:pPr algn="ctr"/>
+            <a:endParaRPr lang="de-DE"/>
+          </a:p>
+        </p:txBody>
+      </p:sp>
+      <mc:AlternateContent xmlns:mc="http://schemas.openxmlformats.org/markup-compatibility/2006">
+        <mc:Choice xmlns:a14="http://schemas.microsoft.com/office/drawing/2010/main" Requires="a14">
+          <p:sp>
+            <p:nvSpPr>
+              <p:cNvPr id="13" name="TextBox 12">
+                <a:extLst>
+                  <a:ext uri="{FF2B5EF4-FFF2-40B4-BE49-F238E27FC236}">
+                    <a16:creationId xmlns:a16="http://schemas.microsoft.com/office/drawing/2014/main" id="{FD211AC4-35FA-195C-F27A-8DA5320364E8}"/>
+                  </a:ext>
+                </a:extLst>
+              </p:cNvPr>
+              <p:cNvSpPr txBox="1"/>
+              <p:nvPr/>
+            </p:nvSpPr>
+            <p:spPr>
+              <a:xfrm>
+                <a:off x="5070740" y="3546269"/>
+                <a:ext cx="549638" cy="461665"/>
+              </a:xfrm>
+              <a:prstGeom prst="rect">
+                <a:avLst/>
+              </a:prstGeom>
+              <a:noFill/>
+            </p:spPr>
+            <p:txBody>
+              <a:bodyPr wrap="none" rtlCol="0">
+                <a:spAutoFit/>
+              </a:bodyPr>
+              <a:lstStyle/>
+              <a:p>
+                <a:pPr/>
+                <a14:m>
+                  <m:oMathPara xmlns:m="http://schemas.openxmlformats.org/officeDocument/2006/math">
+                    <m:oMathParaPr>
+                      <m:jc m:val="centerGroup"/>
+                    </m:oMathParaPr>
+                    <m:oMath xmlns:m="http://schemas.openxmlformats.org/officeDocument/2006/math">
+                      <m:sSub>
+                        <m:sSubPr>
+                          <m:ctrlPr>
+                            <a:rPr lang="de-DE" sz="2400" b="0" i="1" dirty="0" smtClean="0">
+                              <a:latin typeface="Cambria Math" panose="02040503050406030204" pitchFamily="18" charset="0"/>
+                            </a:rPr>
+                          </m:ctrlPr>
+                        </m:sSubPr>
+                        <m:e>
+                          <m:r>
+                            <a:rPr lang="de-DE" sz="2400" b="0" i="1" dirty="0" smtClean="0">
+                              <a:latin typeface="Cambria Math" panose="02040503050406030204" pitchFamily="18" charset="0"/>
+                            </a:rPr>
+                            <m:t>𝑥</m:t>
+                          </m:r>
+                        </m:e>
+                        <m:sub>
+                          <m:r>
+                            <a:rPr lang="de-DE" sz="2400" b="0" i="1" dirty="0" smtClean="0">
+                              <a:latin typeface="Cambria Math" panose="02040503050406030204" pitchFamily="18" charset="0"/>
+                            </a:rPr>
+                            <m:t>0</m:t>
+                          </m:r>
+                        </m:sub>
+                      </m:sSub>
+                    </m:oMath>
+                  </m:oMathPara>
+                </a14:m>
+                <a:endParaRPr lang="de-DE" dirty="0"/>
+              </a:p>
+            </p:txBody>
+          </p:sp>
+        </mc:Choice>
+        <mc:Fallback>
+          <p:sp>
+            <p:nvSpPr>
+              <p:cNvPr id="13" name="TextBox 12">
+                <a:extLst>
+                  <a:ext uri="{FF2B5EF4-FFF2-40B4-BE49-F238E27FC236}">
+                    <a16:creationId xmlns:a16="http://schemas.microsoft.com/office/drawing/2014/main" id="{FD211AC4-35FA-195C-F27A-8DA5320364E8}"/>
+                  </a:ext>
+                </a:extLst>
+              </p:cNvPr>
+              <p:cNvSpPr txBox="1">
+                <a:spLocks noRot="1" noChangeAspect="1" noMove="1" noResize="1" noEditPoints="1" noAdjustHandles="1" noChangeArrowheads="1" noChangeShapeType="1" noTextEdit="1"/>
+              </p:cNvSpPr>
+              <p:nvPr/>
+            </p:nvSpPr>
+            <p:spPr>
+              <a:xfrm>
+                <a:off x="5070740" y="3546269"/>
+                <a:ext cx="549638" cy="461665"/>
+              </a:xfrm>
+              <a:prstGeom prst="rect">
+                <a:avLst/>
+              </a:prstGeom>
+              <a:blipFill>
+                <a:blip r:embed="rId3"/>
+                <a:stretch>
+                  <a:fillRect b="-1333"/>
+                </a:stretch>
+              </a:blipFill>
+            </p:spPr>
+            <p:txBody>
+              <a:bodyPr/>
+              <a:lstStyle/>
+              <a:p>
+                <a:r>
+                  <a:rPr lang="en-US">
+                    <a:noFill/>
+                  </a:rPr>
+                  <a:t> </a:t>
+                </a:r>
+              </a:p>
+            </p:txBody>
+          </p:sp>
+        </mc:Fallback>
+      </mc:AlternateContent>
+    </p:spTree>
+    <p:extLst>
+      <p:ext uri="{BB962C8B-B14F-4D97-AF65-F5344CB8AC3E}">
+        <p14:creationId xmlns:p14="http://schemas.microsoft.com/office/powerpoint/2010/main" val="3297130885"/>
+      </p:ext>
+    </p:extLst>
+  </p:cSld>
+  <p:clrMapOvr>
+    <a:masterClrMapping/>
+  </p:clrMapOvr>
+</p:sld>
+</file>
+
+<file path=ppt/slides/slide6.xml><?xml version="1.0" encoding="utf-8"?>
+<p:sld xmlns:a="http://schemas.openxmlformats.org/drawingml/2006/main" xmlns:r="http://schemas.openxmlformats.org/officeDocument/2006/relationships" xmlns:p="http://schemas.openxmlformats.org/presentationml/2006/main">
+  <p:cSld>
+    <p:spTree>
+      <p:nvGrpSpPr>
+        <p:cNvPr id="1" name=""/>
+        <p:cNvGrpSpPr/>
+        <p:nvPr/>
+      </p:nvGrpSpPr>
+      <p:grpSpPr>
+        <a:xfrm>
+          <a:off x="0" y="0"/>
+          <a:ext cx="0" cy="0"/>
+          <a:chOff x="0" y="0"/>
+          <a:chExt cx="0" cy="0"/>
+        </a:xfrm>
+      </p:grpSpPr>
+      <p:pic>
+        <p:nvPicPr>
           <p:cNvPr id="2050" name="Picture 2">
             <a:extLst>
               <a:ext uri="{FF2B5EF4-FFF2-40B4-BE49-F238E27FC236}">
@@ -8473,7 +8872,7 @@
 </p:sld>
 </file>
 
-<file path=ppt/slides/slide6.xml><?xml version="1.0" encoding="utf-8"?>
+<file path=ppt/slides/slide7.xml><?xml version="1.0" encoding="utf-8"?>
 <p:sld xmlns:a="http://schemas.openxmlformats.org/drawingml/2006/main" xmlns:r="http://schemas.openxmlformats.org/officeDocument/2006/relationships" xmlns:p="http://schemas.openxmlformats.org/presentationml/2006/main">
   <p:cSld>
     <p:spTree>
@@ -9643,7 +10042,7 @@
 </p:sld>
 </file>
 
-<file path=ppt/slides/slide7.xml><?xml version="1.0" encoding="utf-8"?>
+<file path=ppt/slides/slide8.xml><?xml version="1.0" encoding="utf-8"?>
 <p:sld xmlns:a="http://schemas.openxmlformats.org/drawingml/2006/main" xmlns:r="http://schemas.openxmlformats.org/officeDocument/2006/relationships" xmlns:p="http://schemas.openxmlformats.org/presentationml/2006/main">
   <p:cSld>
     <p:spTree>
@@ -10094,7 +10493,7 @@
 </p:sld>
 </file>
 
-<file path=ppt/slides/slide8.xml><?xml version="1.0" encoding="utf-8"?>
+<file path=ppt/slides/slide9.xml><?xml version="1.0" encoding="utf-8"?>
 <p:sld xmlns:a="http://schemas.openxmlformats.org/drawingml/2006/main" xmlns:r="http://schemas.openxmlformats.org/officeDocument/2006/relationships" xmlns:p="http://schemas.openxmlformats.org/presentationml/2006/main">
   <p:cSld>
     <p:spTree>

</xml_diff>

<commit_message>
linear programming bis software done
</commit_message>
<xml_diff>
--- a/sketches.pptx
+++ b/sketches.pptx
@@ -5,7 +5,7 @@
     <p:sldMasterId id="2147483648" r:id="rId1"/>
   </p:sldMasterIdLst>
   <p:notesMasterIdLst>
-    <p:notesMasterId r:id="rId11"/>
+    <p:notesMasterId r:id="rId12"/>
   </p:notesMasterIdLst>
   <p:sldIdLst>
     <p:sldId id="256" r:id="rId2"/>
@@ -17,6 +17,7 @@
     <p:sldId id="261" r:id="rId8"/>
     <p:sldId id="262" r:id="rId9"/>
     <p:sldId id="263" r:id="rId10"/>
+    <p:sldId id="265" r:id="rId11"/>
   </p:sldIdLst>
   <p:sldSz cx="12192000" cy="6858000"/>
   <p:notesSz cx="6858000" cy="9144000"/>
@@ -123,6 +124,62 @@
 </p:presentation>
 </file>
 
+<file path=ppt/ink/ink1.xml><?xml version="1.0" encoding="utf-8"?>
+<inkml:ink xmlns:inkml="http://www.w3.org/2003/InkML">
+  <inkml:definitions>
+    <inkml:context xml:id="ctx0">
+      <inkml:inkSource xml:id="inkSrc0">
+        <inkml:traceFormat>
+          <inkml:channel name="X" type="integer" min="-2.14748E9" max="2.14748E9" units="cm"/>
+          <inkml:channel name="Y" type="integer" min="-2.14748E9" max="2.14748E9" units="cm"/>
+          <inkml:channel name="F" type="integer" max="32767" units="dev"/>
+        </inkml:traceFormat>
+        <inkml:channelProperties>
+          <inkml:channelProperty channel="X" name="resolution" value="1000" units="1/cm"/>
+          <inkml:channelProperty channel="Y" name="resolution" value="1000" units="1/cm"/>
+          <inkml:channelProperty channel="F" name="resolution" value="0" units="1/dev"/>
+        </inkml:channelProperties>
+      </inkml:inkSource>
+      <inkml:timestamp xml:id="ts0" timeString="2024-02-23T11:31:13.599"/>
+    </inkml:context>
+    <inkml:brush xml:id="br0">
+      <inkml:brushProperty name="width" value="0.05" units="cm"/>
+      <inkml:brushProperty name="height" value="0.05" units="cm"/>
+      <inkml:brushProperty name="color" value="#004F8B"/>
+    </inkml:brush>
+  </inkml:definitions>
+  <inkml:trace contextRef="#ctx0" brushRef="#br0">1 2 24575,'79'-1'0,"85"2"0,-155 2 0,1 0 0,-1 0 0,0 1 0,-1 0 0,1 1 0,14 10 0,-20-13 0,40 28 0,-3 2 0,0 2 0,42 47 0,48 38 0,-62-60 0,14 25 0,-81-84 0,-1 0 0,0 1 0,0-1 0,0 0 0,1 0 0,-1 1 0,0-1 0,0 0 0,1 0 0,-1 0 0,0 0 0,1 1 0,-1-1 0,0 0 0,0 0 0,1 0 0,-1 0 0,0 0 0,1 0 0,-1 0 0,0 0 0,1 0 0,-1 0 0,0 0 0,1 0 0,-1 0 0,0 0 0,1 0 0,-1 0 0,0 0 0,1 0 0,-1 0 0,0-1 0,1 1 0,4-13 0,-3-20 0,-2 31 0,-1-113-1365,1 106-5461</inkml:trace>
+</inkml:ink>
+</file>
+
+<file path=ppt/ink/ink2.xml><?xml version="1.0" encoding="utf-8"?>
+<inkml:ink xmlns:inkml="http://www.w3.org/2003/InkML">
+  <inkml:definitions>
+    <inkml:context xml:id="ctx0">
+      <inkml:inkSource xml:id="inkSrc0">
+        <inkml:traceFormat>
+          <inkml:channel name="X" type="integer" min="-2.14748E9" max="2.14748E9" units="cm"/>
+          <inkml:channel name="Y" type="integer" min="-2.14748E9" max="2.14748E9" units="cm"/>
+          <inkml:channel name="F" type="integer" max="32767" units="dev"/>
+        </inkml:traceFormat>
+        <inkml:channelProperties>
+          <inkml:channelProperty channel="X" name="resolution" value="1000" units="1/cm"/>
+          <inkml:channelProperty channel="Y" name="resolution" value="1000" units="1/cm"/>
+          <inkml:channelProperty channel="F" name="resolution" value="0" units="1/dev"/>
+        </inkml:channelProperties>
+      </inkml:inkSource>
+      <inkml:timestamp xml:id="ts0" timeString="2024-02-23T11:31:13.600"/>
+    </inkml:context>
+    <inkml:brush xml:id="br0">
+      <inkml:brushProperty name="width" value="0.05" units="cm"/>
+      <inkml:brushProperty name="height" value="0.05" units="cm"/>
+      <inkml:brushProperty name="color" value="#004F8B"/>
+    </inkml:brush>
+  </inkml:definitions>
+  <inkml:trace contextRef="#ctx0" brushRef="#br0">150 1 24575,'-2'0'0,"-4"0"0,-3 0 0,-1 0 0,-2 0 0,0 0 0,1 0 0,-1 0 0,1 0 0,0 0 0,0 0 0,1 0 0,-1 0 0,0 0 0,1 0 0</inkml:trace>
+</inkml:ink>
+</file>
+
 <file path=ppt/notesMasters/notesMaster1.xml><?xml version="1.0" encoding="utf-8"?>
 <p:notesMaster xmlns:a="http://schemas.openxmlformats.org/drawingml/2006/main" xmlns:r="http://schemas.openxmlformats.org/officeDocument/2006/relationships" xmlns:p="http://schemas.openxmlformats.org/presentationml/2006/main">
   <p:cSld>
@@ -205,7 +262,7 @@
           <a:p>
             <a:fld id="{83BEFFCD-55D1-46DA-89C3-8B3AE4381425}" type="datetimeFigureOut">
               <a:rPr lang="de-DE" smtClean="0"/>
-              <a:t>20.11.2023</a:t>
+              <a:t>23.02.2024</a:t>
             </a:fld>
             <a:endParaRPr lang="de-DE"/>
           </a:p>
@@ -706,7 +763,7 @@
           <a:p>
             <a:fld id="{475E47E5-6F11-44CE-B90D-6B38E21F4970}" type="datetimeFigureOut">
               <a:rPr lang="de-DE" smtClean="0"/>
-              <a:t>20.11.2023</a:t>
+              <a:t>23.02.2024</a:t>
             </a:fld>
             <a:endParaRPr lang="de-DE"/>
           </a:p>
@@ -906,7 +963,7 @@
           <a:p>
             <a:fld id="{475E47E5-6F11-44CE-B90D-6B38E21F4970}" type="datetimeFigureOut">
               <a:rPr lang="de-DE" smtClean="0"/>
-              <a:t>20.11.2023</a:t>
+              <a:t>23.02.2024</a:t>
             </a:fld>
             <a:endParaRPr lang="de-DE"/>
           </a:p>
@@ -1116,7 +1173,7 @@
           <a:p>
             <a:fld id="{475E47E5-6F11-44CE-B90D-6B38E21F4970}" type="datetimeFigureOut">
               <a:rPr lang="de-DE" smtClean="0"/>
-              <a:t>20.11.2023</a:t>
+              <a:t>23.02.2024</a:t>
             </a:fld>
             <a:endParaRPr lang="de-DE"/>
           </a:p>
@@ -1316,7 +1373,7 @@
           <a:p>
             <a:fld id="{475E47E5-6F11-44CE-B90D-6B38E21F4970}" type="datetimeFigureOut">
               <a:rPr lang="de-DE" smtClean="0"/>
-              <a:t>20.11.2023</a:t>
+              <a:t>23.02.2024</a:t>
             </a:fld>
             <a:endParaRPr lang="de-DE"/>
           </a:p>
@@ -1592,7 +1649,7 @@
           <a:p>
             <a:fld id="{475E47E5-6F11-44CE-B90D-6B38E21F4970}" type="datetimeFigureOut">
               <a:rPr lang="de-DE" smtClean="0"/>
-              <a:t>20.11.2023</a:t>
+              <a:t>23.02.2024</a:t>
             </a:fld>
             <a:endParaRPr lang="de-DE"/>
           </a:p>
@@ -1860,7 +1917,7 @@
           <a:p>
             <a:fld id="{475E47E5-6F11-44CE-B90D-6B38E21F4970}" type="datetimeFigureOut">
               <a:rPr lang="de-DE" smtClean="0"/>
-              <a:t>20.11.2023</a:t>
+              <a:t>23.02.2024</a:t>
             </a:fld>
             <a:endParaRPr lang="de-DE"/>
           </a:p>
@@ -2275,7 +2332,7 @@
           <a:p>
             <a:fld id="{475E47E5-6F11-44CE-B90D-6B38E21F4970}" type="datetimeFigureOut">
               <a:rPr lang="de-DE" smtClean="0"/>
-              <a:t>20.11.2023</a:t>
+              <a:t>23.02.2024</a:t>
             </a:fld>
             <a:endParaRPr lang="de-DE"/>
           </a:p>
@@ -2417,7 +2474,7 @@
           <a:p>
             <a:fld id="{475E47E5-6F11-44CE-B90D-6B38E21F4970}" type="datetimeFigureOut">
               <a:rPr lang="de-DE" smtClean="0"/>
-              <a:t>20.11.2023</a:t>
+              <a:t>23.02.2024</a:t>
             </a:fld>
             <a:endParaRPr lang="de-DE"/>
           </a:p>
@@ -2530,7 +2587,7 @@
           <a:p>
             <a:fld id="{475E47E5-6F11-44CE-B90D-6B38E21F4970}" type="datetimeFigureOut">
               <a:rPr lang="de-DE" smtClean="0"/>
-              <a:t>20.11.2023</a:t>
+              <a:t>23.02.2024</a:t>
             </a:fld>
             <a:endParaRPr lang="de-DE"/>
           </a:p>
@@ -2843,7 +2900,7 @@
           <a:p>
             <a:fld id="{475E47E5-6F11-44CE-B90D-6B38E21F4970}" type="datetimeFigureOut">
               <a:rPr lang="de-DE" smtClean="0"/>
-              <a:t>20.11.2023</a:t>
+              <a:t>23.02.2024</a:t>
             </a:fld>
             <a:endParaRPr lang="de-DE"/>
           </a:p>
@@ -3132,7 +3189,7 @@
           <a:p>
             <a:fld id="{475E47E5-6F11-44CE-B90D-6B38E21F4970}" type="datetimeFigureOut">
               <a:rPr lang="de-DE" smtClean="0"/>
-              <a:t>20.11.2023</a:t>
+              <a:t>23.02.2024</a:t>
             </a:fld>
             <a:endParaRPr lang="de-DE"/>
           </a:p>
@@ -3375,7 +3432,7 @@
           <a:p>
             <a:fld id="{475E47E5-6F11-44CE-B90D-6B38E21F4970}" type="datetimeFigureOut">
               <a:rPr lang="de-DE" smtClean="0"/>
-              <a:t>20.11.2023</a:t>
+              <a:t>23.02.2024</a:t>
             </a:fld>
             <a:endParaRPr lang="de-DE"/>
           </a:p>
@@ -7228,6 +7285,2693 @@
 </p:sld>
 </file>
 
+<file path=ppt/slides/slide10.xml><?xml version="1.0" encoding="utf-8"?>
+<p:sld xmlns:a="http://schemas.openxmlformats.org/drawingml/2006/main" xmlns:r="http://schemas.openxmlformats.org/officeDocument/2006/relationships" xmlns:p="http://schemas.openxmlformats.org/presentationml/2006/main">
+  <p:cSld>
+    <p:spTree>
+      <p:nvGrpSpPr>
+        <p:cNvPr id="1" name=""/>
+        <p:cNvGrpSpPr/>
+        <p:nvPr/>
+      </p:nvGrpSpPr>
+      <p:grpSpPr>
+        <a:xfrm>
+          <a:off x="0" y="0"/>
+          <a:ext cx="0" cy="0"/>
+          <a:chOff x="0" y="0"/>
+          <a:chExt cx="0" cy="0"/>
+        </a:xfrm>
+      </p:grpSpPr>
+      <p:cxnSp>
+        <p:nvCxnSpPr>
+          <p:cNvPr id="4" name="Straight Arrow Connector 3">
+            <a:extLst>
+              <a:ext uri="{FF2B5EF4-FFF2-40B4-BE49-F238E27FC236}">
+                <a16:creationId xmlns:a16="http://schemas.microsoft.com/office/drawing/2014/main" id="{A7B8E557-FB84-824B-D4A1-F79B7C935743}"/>
+              </a:ext>
+            </a:extLst>
+          </p:cNvPr>
+          <p:cNvCxnSpPr>
+            <a:cxnSpLocks/>
+          </p:cNvCxnSpPr>
+          <p:nvPr/>
+        </p:nvCxnSpPr>
+        <p:spPr>
+          <a:xfrm flipH="1" flipV="1">
+            <a:off x="4121552" y="1487156"/>
+            <a:ext cx="0" cy="3633870"/>
+          </a:xfrm>
+          <a:prstGeom prst="straightConnector1">
+            <a:avLst/>
+          </a:prstGeom>
+          <a:ln>
+            <a:tailEnd type="triangle"/>
+          </a:ln>
+        </p:spPr>
+        <p:style>
+          <a:lnRef idx="1">
+            <a:schemeClr val="accent1"/>
+          </a:lnRef>
+          <a:fillRef idx="0">
+            <a:schemeClr val="accent1"/>
+          </a:fillRef>
+          <a:effectRef idx="0">
+            <a:schemeClr val="accent1"/>
+          </a:effectRef>
+          <a:fontRef idx="minor">
+            <a:schemeClr val="tx1"/>
+          </a:fontRef>
+        </p:style>
+      </p:cxnSp>
+      <p:cxnSp>
+        <p:nvCxnSpPr>
+          <p:cNvPr id="5" name="Straight Arrow Connector 4">
+            <a:extLst>
+              <a:ext uri="{FF2B5EF4-FFF2-40B4-BE49-F238E27FC236}">
+                <a16:creationId xmlns:a16="http://schemas.microsoft.com/office/drawing/2014/main" id="{97AE32F1-7285-057C-D2A4-FEAF670875C9}"/>
+              </a:ext>
+            </a:extLst>
+          </p:cNvPr>
+          <p:cNvCxnSpPr>
+            <a:cxnSpLocks/>
+          </p:cNvCxnSpPr>
+          <p:nvPr/>
+        </p:nvCxnSpPr>
+        <p:spPr>
+          <a:xfrm>
+            <a:off x="4052898" y="5108077"/>
+            <a:ext cx="3679086" cy="0"/>
+          </a:xfrm>
+          <a:prstGeom prst="straightConnector1">
+            <a:avLst/>
+          </a:prstGeom>
+          <a:ln>
+            <a:tailEnd type="triangle"/>
+          </a:ln>
+        </p:spPr>
+        <p:style>
+          <a:lnRef idx="1">
+            <a:schemeClr val="accent1"/>
+          </a:lnRef>
+          <a:fillRef idx="0">
+            <a:schemeClr val="accent1"/>
+          </a:fillRef>
+          <a:effectRef idx="0">
+            <a:schemeClr val="accent1"/>
+          </a:effectRef>
+          <a:fontRef idx="minor">
+            <a:schemeClr val="tx1"/>
+          </a:fontRef>
+        </p:style>
+      </p:cxnSp>
+      <p:cxnSp>
+        <p:nvCxnSpPr>
+          <p:cNvPr id="6" name="Straight Connector 5">
+            <a:extLst>
+              <a:ext uri="{FF2B5EF4-FFF2-40B4-BE49-F238E27FC236}">
+                <a16:creationId xmlns:a16="http://schemas.microsoft.com/office/drawing/2014/main" id="{E344AE04-1752-5163-74F9-CB89CBC1B99B}"/>
+              </a:ext>
+            </a:extLst>
+          </p:cNvPr>
+          <p:cNvCxnSpPr>
+            <a:cxnSpLocks/>
+          </p:cNvCxnSpPr>
+          <p:nvPr/>
+        </p:nvCxnSpPr>
+        <p:spPr>
+          <a:xfrm flipH="1" flipV="1">
+            <a:off x="4145034" y="2180656"/>
+            <a:ext cx="1960134" cy="2961856"/>
+          </a:xfrm>
+          <a:prstGeom prst="line">
+            <a:avLst/>
+          </a:prstGeom>
+        </p:spPr>
+        <p:style>
+          <a:lnRef idx="3">
+            <a:schemeClr val="accent2"/>
+          </a:lnRef>
+          <a:fillRef idx="0">
+            <a:schemeClr val="accent2"/>
+          </a:fillRef>
+          <a:effectRef idx="2">
+            <a:schemeClr val="accent2"/>
+          </a:effectRef>
+          <a:fontRef idx="minor">
+            <a:schemeClr val="tx1"/>
+          </a:fontRef>
+        </p:style>
+      </p:cxnSp>
+      <mc:AlternateContent xmlns:mc="http://schemas.openxmlformats.org/markup-compatibility/2006">
+        <mc:Choice xmlns:a14="http://schemas.microsoft.com/office/drawing/2010/main" Requires="a14">
+          <p:sp>
+            <p:nvSpPr>
+              <p:cNvPr id="7" name="TextBox 6">
+                <a:extLst>
+                  <a:ext uri="{FF2B5EF4-FFF2-40B4-BE49-F238E27FC236}">
+                    <a16:creationId xmlns:a16="http://schemas.microsoft.com/office/drawing/2014/main" id="{74F27F87-080E-B489-BBDA-CC0AB6CF070A}"/>
+                  </a:ext>
+                </a:extLst>
+              </p:cNvPr>
+              <p:cNvSpPr txBox="1"/>
+              <p:nvPr/>
+            </p:nvSpPr>
+            <p:spPr>
+              <a:xfrm>
+                <a:off x="5776753" y="5493970"/>
+                <a:ext cx="275562" cy="369332"/>
+              </a:xfrm>
+              <a:prstGeom prst="rect">
+                <a:avLst/>
+              </a:prstGeom>
+              <a:noFill/>
+            </p:spPr>
+            <p:txBody>
+              <a:bodyPr wrap="square">
+                <a:spAutoFit/>
+              </a:bodyPr>
+              <a:lstStyle/>
+              <a:p>
+                <a:pPr/>
+                <a14:m>
+                  <m:oMathPara xmlns:m="http://schemas.openxmlformats.org/officeDocument/2006/math">
+                    <m:oMathParaPr>
+                      <m:jc m:val="centerGroup"/>
+                    </m:oMathParaPr>
+                    <m:oMath xmlns:m="http://schemas.openxmlformats.org/officeDocument/2006/math">
+                      <m:sSub>
+                        <m:sSubPr>
+                          <m:ctrlPr>
+                            <a:rPr lang="de-DE" sz="1800" b="0" i="1" smtClean="0">
+                              <a:latin typeface="Cambria Math" panose="02040503050406030204" pitchFamily="18" charset="0"/>
+                            </a:rPr>
+                          </m:ctrlPr>
+                        </m:sSubPr>
+                        <m:e>
+                          <m:r>
+                            <a:rPr lang="de-DE" sz="1800" b="0" i="1" smtClean="0">
+                              <a:latin typeface="Cambria Math" panose="02040503050406030204" pitchFamily="18" charset="0"/>
+                            </a:rPr>
+                            <m:t>𝑥</m:t>
+                          </m:r>
+                        </m:e>
+                        <m:sub>
+                          <m:r>
+                            <a:rPr lang="de-DE" sz="1800" b="0" i="0" smtClean="0">
+                              <a:latin typeface="Cambria Math" panose="02040503050406030204" pitchFamily="18" charset="0"/>
+                            </a:rPr>
+                            <m:t>1</m:t>
+                          </m:r>
+                        </m:sub>
+                      </m:sSub>
+                    </m:oMath>
+                  </m:oMathPara>
+                </a14:m>
+                <a:endParaRPr lang="de-DE" dirty="0"/>
+              </a:p>
+            </p:txBody>
+          </p:sp>
+        </mc:Choice>
+        <mc:Fallback>
+          <p:sp>
+            <p:nvSpPr>
+              <p:cNvPr id="7" name="TextBox 6">
+                <a:extLst>
+                  <a:ext uri="{FF2B5EF4-FFF2-40B4-BE49-F238E27FC236}">
+                    <a16:creationId xmlns:a16="http://schemas.microsoft.com/office/drawing/2014/main" id="{74F27F87-080E-B489-BBDA-CC0AB6CF070A}"/>
+                  </a:ext>
+                </a:extLst>
+              </p:cNvPr>
+              <p:cNvSpPr txBox="1">
+                <a:spLocks noRot="1" noChangeAspect="1" noMove="1" noResize="1" noEditPoints="1" noAdjustHandles="1" noChangeArrowheads="1" noChangeShapeType="1" noTextEdit="1"/>
+              </p:cNvSpPr>
+              <p:nvPr/>
+            </p:nvSpPr>
+            <p:spPr>
+              <a:xfrm>
+                <a:off x="5776753" y="5493970"/>
+                <a:ext cx="275562" cy="369332"/>
+              </a:xfrm>
+              <a:prstGeom prst="rect">
+                <a:avLst/>
+              </a:prstGeom>
+              <a:blipFill>
+                <a:blip r:embed="rId2"/>
+                <a:stretch>
+                  <a:fillRect r="-31111"/>
+                </a:stretch>
+              </a:blipFill>
+            </p:spPr>
+            <p:txBody>
+              <a:bodyPr/>
+              <a:lstStyle/>
+              <a:p>
+                <a:r>
+                  <a:rPr lang="en-US">
+                    <a:noFill/>
+                  </a:rPr>
+                  <a:t> </a:t>
+                </a:r>
+              </a:p>
+            </p:txBody>
+          </p:sp>
+        </mc:Fallback>
+      </mc:AlternateContent>
+      <mc:AlternateContent xmlns:mc="http://schemas.openxmlformats.org/markup-compatibility/2006">
+        <mc:Choice xmlns:a14="http://schemas.microsoft.com/office/drawing/2010/main" Requires="a14">
+          <p:sp>
+            <p:nvSpPr>
+              <p:cNvPr id="8" name="TextBox 7">
+                <a:extLst>
+                  <a:ext uri="{FF2B5EF4-FFF2-40B4-BE49-F238E27FC236}">
+                    <a16:creationId xmlns:a16="http://schemas.microsoft.com/office/drawing/2014/main" id="{F7749233-B42D-B968-D08D-9DFDF256277B}"/>
+                  </a:ext>
+                </a:extLst>
+              </p:cNvPr>
+              <p:cNvSpPr txBox="1"/>
+              <p:nvPr/>
+            </p:nvSpPr>
+            <p:spPr>
+              <a:xfrm>
+                <a:off x="3343636" y="3071899"/>
+                <a:ext cx="275562" cy="369332"/>
+              </a:xfrm>
+              <a:prstGeom prst="rect">
+                <a:avLst/>
+              </a:prstGeom>
+              <a:noFill/>
+            </p:spPr>
+            <p:txBody>
+              <a:bodyPr wrap="square">
+                <a:spAutoFit/>
+              </a:bodyPr>
+              <a:lstStyle/>
+              <a:p>
+                <a:pPr/>
+                <a14:m>
+                  <m:oMathPara xmlns:m="http://schemas.openxmlformats.org/officeDocument/2006/math">
+                    <m:oMathParaPr>
+                      <m:jc m:val="centerGroup"/>
+                    </m:oMathParaPr>
+                    <m:oMath xmlns:m="http://schemas.openxmlformats.org/officeDocument/2006/math">
+                      <m:sSub>
+                        <m:sSubPr>
+                          <m:ctrlPr>
+                            <a:rPr lang="de-DE" sz="1800" b="0" i="1" smtClean="0">
+                              <a:latin typeface="Cambria Math" panose="02040503050406030204" pitchFamily="18" charset="0"/>
+                            </a:rPr>
+                          </m:ctrlPr>
+                        </m:sSubPr>
+                        <m:e>
+                          <m:r>
+                            <a:rPr lang="de-DE" sz="1800" b="0" i="1" smtClean="0">
+                              <a:latin typeface="Cambria Math" panose="02040503050406030204" pitchFamily="18" charset="0"/>
+                            </a:rPr>
+                            <m:t>𝑥</m:t>
+                          </m:r>
+                        </m:e>
+                        <m:sub>
+                          <m:r>
+                            <a:rPr lang="de-DE" sz="1800" b="0" i="1" smtClean="0">
+                              <a:latin typeface="Cambria Math" panose="02040503050406030204" pitchFamily="18" charset="0"/>
+                            </a:rPr>
+                            <m:t>2</m:t>
+                          </m:r>
+                        </m:sub>
+                      </m:sSub>
+                    </m:oMath>
+                  </m:oMathPara>
+                </a14:m>
+                <a:endParaRPr lang="de-DE" dirty="0"/>
+              </a:p>
+            </p:txBody>
+          </p:sp>
+        </mc:Choice>
+        <mc:Fallback>
+          <p:sp>
+            <p:nvSpPr>
+              <p:cNvPr id="8" name="TextBox 7">
+                <a:extLst>
+                  <a:ext uri="{FF2B5EF4-FFF2-40B4-BE49-F238E27FC236}">
+                    <a16:creationId xmlns:a16="http://schemas.microsoft.com/office/drawing/2014/main" id="{F7749233-B42D-B968-D08D-9DFDF256277B}"/>
+                  </a:ext>
+                </a:extLst>
+              </p:cNvPr>
+              <p:cNvSpPr txBox="1">
+                <a:spLocks noRot="1" noChangeAspect="1" noMove="1" noResize="1" noEditPoints="1" noAdjustHandles="1" noChangeArrowheads="1" noChangeShapeType="1" noTextEdit="1"/>
+              </p:cNvSpPr>
+              <p:nvPr/>
+            </p:nvSpPr>
+            <p:spPr>
+              <a:xfrm>
+                <a:off x="3343636" y="3071899"/>
+                <a:ext cx="275562" cy="369332"/>
+              </a:xfrm>
+              <a:prstGeom prst="rect">
+                <a:avLst/>
+              </a:prstGeom>
+              <a:blipFill>
+                <a:blip r:embed="rId3"/>
+                <a:stretch>
+                  <a:fillRect r="-32609"/>
+                </a:stretch>
+              </a:blipFill>
+            </p:spPr>
+            <p:txBody>
+              <a:bodyPr/>
+              <a:lstStyle/>
+              <a:p>
+                <a:r>
+                  <a:rPr lang="en-US">
+                    <a:noFill/>
+                  </a:rPr>
+                  <a:t> </a:t>
+                </a:r>
+              </a:p>
+            </p:txBody>
+          </p:sp>
+        </mc:Fallback>
+      </mc:AlternateContent>
+      <mc:AlternateContent xmlns:mc="http://schemas.openxmlformats.org/markup-compatibility/2006">
+        <mc:Choice xmlns:a14="http://schemas.microsoft.com/office/drawing/2010/main" Requires="a14">
+          <p:sp>
+            <p:nvSpPr>
+              <p:cNvPr id="9" name="TextBox 8">
+                <a:extLst>
+                  <a:ext uri="{FF2B5EF4-FFF2-40B4-BE49-F238E27FC236}">
+                    <a16:creationId xmlns:a16="http://schemas.microsoft.com/office/drawing/2014/main" id="{351D2D51-9A7D-713C-3E83-2A97F061164E}"/>
+                  </a:ext>
+                </a:extLst>
+              </p:cNvPr>
+              <p:cNvSpPr txBox="1"/>
+              <p:nvPr/>
+            </p:nvSpPr>
+            <p:spPr>
+              <a:xfrm>
+                <a:off x="3600599" y="1677818"/>
+                <a:ext cx="425094" cy="3652282"/>
+              </a:xfrm>
+              <a:prstGeom prst="rect">
+                <a:avLst/>
+              </a:prstGeom>
+              <a:noFill/>
+            </p:spPr>
+            <p:txBody>
+              <a:bodyPr wrap="square">
+                <a:spAutoFit/>
+              </a:bodyPr>
+              <a:lstStyle/>
+              <a:p>
+                <a:pPr algn="r">
+                  <a:spcBef>
+                    <a:spcPts val="400"/>
+                  </a:spcBef>
+                </a:pPr>
+                <a14:m>
+                  <m:oMathPara xmlns:m="http://schemas.openxmlformats.org/officeDocument/2006/math">
+                    <m:oMathParaPr>
+                      <m:jc m:val="centerGroup"/>
+                    </m:oMathParaPr>
+                    <m:oMath xmlns:m="http://schemas.openxmlformats.org/officeDocument/2006/math">
+                      <m:r>
+                        <a:rPr lang="de-DE" sz="1800" b="0" i="1" dirty="0" smtClean="0">
+                          <a:latin typeface="Cambria Math" panose="02040503050406030204" pitchFamily="18" charset="0"/>
+                        </a:rPr>
+                        <m:t>10</m:t>
+                      </m:r>
+                    </m:oMath>
+                  </m:oMathPara>
+                </a14:m>
+                <a:endParaRPr lang="de-DE" sz="1800" b="0" i="1" dirty="0">
+                  <a:latin typeface="Cambria Math" panose="02040503050406030204" pitchFamily="18" charset="0"/>
+                </a:endParaRPr>
+              </a:p>
+              <a:p>
+                <a:pPr algn="r">
+                  <a:spcBef>
+                    <a:spcPts val="400"/>
+                  </a:spcBef>
+                </a:pPr>
+                <a:r>
+                  <a:rPr lang="de-DE" dirty="0"/>
+                  <a:t> </a:t>
+                </a:r>
+                <a14:m>
+                  <m:oMath xmlns:m="http://schemas.openxmlformats.org/officeDocument/2006/math">
+                    <m:r>
+                      <a:rPr lang="de-DE" i="1" dirty="0" smtClean="0">
+                        <a:latin typeface="Cambria Math" panose="02040503050406030204" pitchFamily="18" charset="0"/>
+                      </a:rPr>
+                      <m:t>9</m:t>
+                    </m:r>
+                  </m:oMath>
+                </a14:m>
+                <a:endParaRPr lang="de-DE" dirty="0"/>
+              </a:p>
+              <a:p>
+                <a:pPr algn="r">
+                  <a:spcBef>
+                    <a:spcPts val="400"/>
+                  </a:spcBef>
+                </a:pPr>
+                <a:r>
+                  <a:rPr lang="de-DE" dirty="0"/>
+                  <a:t> </a:t>
+                </a:r>
+                <a14:m>
+                  <m:oMath xmlns:m="http://schemas.openxmlformats.org/officeDocument/2006/math">
+                    <m:r>
+                      <a:rPr lang="de-DE" i="1" dirty="0" smtClean="0">
+                        <a:latin typeface="Cambria Math" panose="02040503050406030204" pitchFamily="18" charset="0"/>
+                      </a:rPr>
+                      <m:t>8</m:t>
+                    </m:r>
+                  </m:oMath>
+                </a14:m>
+                <a:endParaRPr lang="de-DE" dirty="0"/>
+              </a:p>
+              <a:p>
+                <a:pPr algn="r">
+                  <a:spcBef>
+                    <a:spcPts val="400"/>
+                  </a:spcBef>
+                </a:pPr>
+                <a:r>
+                  <a:rPr lang="de-DE" dirty="0"/>
+                  <a:t> </a:t>
+                </a:r>
+                <a14:m>
+                  <m:oMath xmlns:m="http://schemas.openxmlformats.org/officeDocument/2006/math">
+                    <m:r>
+                      <a:rPr lang="de-DE" i="1" dirty="0" smtClean="0">
+                        <a:latin typeface="Cambria Math" panose="02040503050406030204" pitchFamily="18" charset="0"/>
+                      </a:rPr>
+                      <m:t>7</m:t>
+                    </m:r>
+                  </m:oMath>
+                </a14:m>
+                <a:endParaRPr lang="de-DE" dirty="0"/>
+              </a:p>
+              <a:p>
+                <a:pPr algn="r">
+                  <a:spcBef>
+                    <a:spcPts val="400"/>
+                  </a:spcBef>
+                </a:pPr>
+                <a:r>
+                  <a:rPr lang="de-DE" dirty="0"/>
+                  <a:t> </a:t>
+                </a:r>
+                <a14:m>
+                  <m:oMath xmlns:m="http://schemas.openxmlformats.org/officeDocument/2006/math">
+                    <m:r>
+                      <a:rPr lang="de-DE" i="1" dirty="0" smtClean="0">
+                        <a:latin typeface="Cambria Math" panose="02040503050406030204" pitchFamily="18" charset="0"/>
+                      </a:rPr>
+                      <m:t>6</m:t>
+                    </m:r>
+                  </m:oMath>
+                </a14:m>
+                <a:endParaRPr lang="de-DE" dirty="0"/>
+              </a:p>
+              <a:p>
+                <a:pPr algn="r">
+                  <a:spcBef>
+                    <a:spcPts val="400"/>
+                  </a:spcBef>
+                </a:pPr>
+                <a:r>
+                  <a:rPr lang="de-DE" dirty="0"/>
+                  <a:t> </a:t>
+                </a:r>
+                <a14:m>
+                  <m:oMath xmlns:m="http://schemas.openxmlformats.org/officeDocument/2006/math">
+                    <m:r>
+                      <a:rPr lang="de-DE" i="1" dirty="0" smtClean="0">
+                        <a:latin typeface="Cambria Math" panose="02040503050406030204" pitchFamily="18" charset="0"/>
+                      </a:rPr>
+                      <m:t>5</m:t>
+                    </m:r>
+                  </m:oMath>
+                </a14:m>
+                <a:endParaRPr lang="de-DE" dirty="0"/>
+              </a:p>
+              <a:p>
+                <a:pPr algn="r">
+                  <a:spcBef>
+                    <a:spcPts val="400"/>
+                  </a:spcBef>
+                </a:pPr>
+                <a:r>
+                  <a:rPr lang="de-DE" dirty="0"/>
+                  <a:t> </a:t>
+                </a:r>
+                <a14:m>
+                  <m:oMath xmlns:m="http://schemas.openxmlformats.org/officeDocument/2006/math">
+                    <m:r>
+                      <a:rPr lang="de-DE" i="1" dirty="0" smtClean="0">
+                        <a:latin typeface="Cambria Math" panose="02040503050406030204" pitchFamily="18" charset="0"/>
+                      </a:rPr>
+                      <m:t>4</m:t>
+                    </m:r>
+                  </m:oMath>
+                </a14:m>
+                <a:endParaRPr lang="de-DE" dirty="0"/>
+              </a:p>
+              <a:p>
+                <a:pPr algn="r">
+                  <a:spcBef>
+                    <a:spcPts val="400"/>
+                  </a:spcBef>
+                </a:pPr>
+                <a:r>
+                  <a:rPr lang="de-DE" dirty="0"/>
+                  <a:t> </a:t>
+                </a:r>
+                <a14:m>
+                  <m:oMath xmlns:m="http://schemas.openxmlformats.org/officeDocument/2006/math">
+                    <m:r>
+                      <a:rPr lang="de-DE" i="1" dirty="0" smtClean="0">
+                        <a:latin typeface="Cambria Math" panose="02040503050406030204" pitchFamily="18" charset="0"/>
+                      </a:rPr>
+                      <m:t>3</m:t>
+                    </m:r>
+                  </m:oMath>
+                </a14:m>
+                <a:endParaRPr lang="de-DE" dirty="0"/>
+              </a:p>
+              <a:p>
+                <a:pPr algn="r">
+                  <a:spcBef>
+                    <a:spcPts val="400"/>
+                  </a:spcBef>
+                </a:pPr>
+                <a:r>
+                  <a:rPr lang="de-DE" dirty="0"/>
+                  <a:t> </a:t>
+                </a:r>
+                <a14:m>
+                  <m:oMath xmlns:m="http://schemas.openxmlformats.org/officeDocument/2006/math">
+                    <m:r>
+                      <a:rPr lang="de-DE" i="1" dirty="0" smtClean="0">
+                        <a:latin typeface="Cambria Math" panose="02040503050406030204" pitchFamily="18" charset="0"/>
+                      </a:rPr>
+                      <m:t>2</m:t>
+                    </m:r>
+                  </m:oMath>
+                </a14:m>
+                <a:endParaRPr lang="de-DE" dirty="0"/>
+              </a:p>
+              <a:p>
+                <a:pPr algn="r">
+                  <a:spcBef>
+                    <a:spcPts val="400"/>
+                  </a:spcBef>
+                </a:pPr>
+                <a:r>
+                  <a:rPr lang="de-DE" dirty="0"/>
+                  <a:t> </a:t>
+                </a:r>
+                <a14:m>
+                  <m:oMath xmlns:m="http://schemas.openxmlformats.org/officeDocument/2006/math">
+                    <m:r>
+                      <a:rPr lang="de-DE" i="1" dirty="0" smtClean="0">
+                        <a:latin typeface="Cambria Math" panose="02040503050406030204" pitchFamily="18" charset="0"/>
+                      </a:rPr>
+                      <m:t>1</m:t>
+                    </m:r>
+                  </m:oMath>
+                </a14:m>
+                <a:endParaRPr lang="de-DE" dirty="0"/>
+              </a:p>
+              <a:p>
+                <a:pPr algn="r">
+                  <a:spcBef>
+                    <a:spcPts val="400"/>
+                  </a:spcBef>
+                </a:pPr>
+                <a:r>
+                  <a:rPr lang="de-DE" b="0" dirty="0"/>
+                  <a:t> </a:t>
+                </a:r>
+                <a14:m>
+                  <m:oMath xmlns:m="http://schemas.openxmlformats.org/officeDocument/2006/math">
+                    <m:r>
+                      <a:rPr lang="de-DE" b="0" i="1" smtClean="0">
+                        <a:latin typeface="Cambria Math" panose="02040503050406030204" pitchFamily="18" charset="0"/>
+                      </a:rPr>
+                      <m:t>0</m:t>
+                    </m:r>
+                  </m:oMath>
+                </a14:m>
+                <a:endParaRPr lang="de-DE" dirty="0"/>
+              </a:p>
+            </p:txBody>
+          </p:sp>
+        </mc:Choice>
+        <mc:Fallback>
+          <p:sp>
+            <p:nvSpPr>
+              <p:cNvPr id="9" name="TextBox 8">
+                <a:extLst>
+                  <a:ext uri="{FF2B5EF4-FFF2-40B4-BE49-F238E27FC236}">
+                    <a16:creationId xmlns:a16="http://schemas.microsoft.com/office/drawing/2014/main" id="{351D2D51-9A7D-713C-3E83-2A97F061164E}"/>
+                  </a:ext>
+                </a:extLst>
+              </p:cNvPr>
+              <p:cNvSpPr txBox="1">
+                <a:spLocks noRot="1" noChangeAspect="1" noMove="1" noResize="1" noEditPoints="1" noAdjustHandles="1" noChangeArrowheads="1" noChangeShapeType="1" noTextEdit="1"/>
+              </p:cNvSpPr>
+              <p:nvPr/>
+            </p:nvSpPr>
+            <p:spPr>
+              <a:xfrm>
+                <a:off x="3600599" y="1677818"/>
+                <a:ext cx="425094" cy="3652282"/>
+              </a:xfrm>
+              <a:prstGeom prst="rect">
+                <a:avLst/>
+              </a:prstGeom>
+              <a:blipFill>
+                <a:blip r:embed="rId4"/>
+                <a:stretch>
+                  <a:fillRect r="-1449"/>
+                </a:stretch>
+              </a:blipFill>
+            </p:spPr>
+            <p:txBody>
+              <a:bodyPr/>
+              <a:lstStyle/>
+              <a:p>
+                <a:r>
+                  <a:rPr lang="en-US">
+                    <a:noFill/>
+                  </a:rPr>
+                  <a:t> </a:t>
+                </a:r>
+              </a:p>
+            </p:txBody>
+          </p:sp>
+        </mc:Fallback>
+      </mc:AlternateContent>
+      <mc:AlternateContent xmlns:mc="http://schemas.openxmlformats.org/markup-compatibility/2006">
+        <mc:Choice xmlns:a14="http://schemas.microsoft.com/office/drawing/2010/main" Requires="a14">
+          <p:sp>
+            <p:nvSpPr>
+              <p:cNvPr id="10" name="TextBox 9">
+                <a:extLst>
+                  <a:ext uri="{FF2B5EF4-FFF2-40B4-BE49-F238E27FC236}">
+                    <a16:creationId xmlns:a16="http://schemas.microsoft.com/office/drawing/2014/main" id="{7F52F6AD-A33A-6890-683D-A1734B7DB1CD}"/>
+                  </a:ext>
+                </a:extLst>
+              </p:cNvPr>
+              <p:cNvSpPr txBox="1"/>
+              <p:nvPr/>
+            </p:nvSpPr>
+            <p:spPr>
+              <a:xfrm>
+                <a:off x="4303312" y="5133227"/>
+                <a:ext cx="3282398" cy="369332"/>
+              </a:xfrm>
+              <a:prstGeom prst="rect">
+                <a:avLst/>
+              </a:prstGeom>
+              <a:noFill/>
+            </p:spPr>
+            <p:txBody>
+              <a:bodyPr wrap="square">
+                <a:spAutoFit/>
+              </a:bodyPr>
+              <a:lstStyle/>
+              <a:p>
+                <a:pPr/>
+                <a14:m>
+                  <m:oMathPara xmlns:m="http://schemas.openxmlformats.org/officeDocument/2006/math">
+                    <m:oMathParaPr>
+                      <m:jc m:val="left"/>
+                    </m:oMathParaPr>
+                    <m:oMath xmlns:m="http://schemas.openxmlformats.org/officeDocument/2006/math">
+                      <m:r>
+                        <a:rPr lang="de-DE" sz="1800" b="0" i="1" smtClean="0">
+                          <a:latin typeface="Cambria Math" panose="02040503050406030204" pitchFamily="18" charset="0"/>
+                        </a:rPr>
+                        <m:t>1    2    3    4    5    6    7    8    9   10</m:t>
+                      </m:r>
+                    </m:oMath>
+                  </m:oMathPara>
+                </a14:m>
+                <a:endParaRPr lang="de-DE" dirty="0"/>
+              </a:p>
+            </p:txBody>
+          </p:sp>
+        </mc:Choice>
+        <mc:Fallback>
+          <p:sp>
+            <p:nvSpPr>
+              <p:cNvPr id="10" name="TextBox 9">
+                <a:extLst>
+                  <a:ext uri="{FF2B5EF4-FFF2-40B4-BE49-F238E27FC236}">
+                    <a16:creationId xmlns:a16="http://schemas.microsoft.com/office/drawing/2014/main" id="{7F52F6AD-A33A-6890-683D-A1734B7DB1CD}"/>
+                  </a:ext>
+                </a:extLst>
+              </p:cNvPr>
+              <p:cNvSpPr txBox="1">
+                <a:spLocks noRot="1" noChangeAspect="1" noMove="1" noResize="1" noEditPoints="1" noAdjustHandles="1" noChangeArrowheads="1" noChangeShapeType="1" noTextEdit="1"/>
+              </p:cNvSpPr>
+              <p:nvPr/>
+            </p:nvSpPr>
+            <p:spPr>
+              <a:xfrm>
+                <a:off x="4303312" y="5133227"/>
+                <a:ext cx="3282398" cy="369332"/>
+              </a:xfrm>
+              <a:prstGeom prst="rect">
+                <a:avLst/>
+              </a:prstGeom>
+              <a:blipFill>
+                <a:blip r:embed="rId5"/>
+                <a:stretch>
+                  <a:fillRect r="-2045"/>
+                </a:stretch>
+              </a:blipFill>
+            </p:spPr>
+            <p:txBody>
+              <a:bodyPr/>
+              <a:lstStyle/>
+              <a:p>
+                <a:r>
+                  <a:rPr lang="en-US">
+                    <a:noFill/>
+                  </a:rPr>
+                  <a:t> </a:t>
+                </a:r>
+              </a:p>
+            </p:txBody>
+          </p:sp>
+        </mc:Fallback>
+      </mc:AlternateContent>
+      <p:cxnSp>
+        <p:nvCxnSpPr>
+          <p:cNvPr id="11" name="Straight Connector 10">
+            <a:extLst>
+              <a:ext uri="{FF2B5EF4-FFF2-40B4-BE49-F238E27FC236}">
+                <a16:creationId xmlns:a16="http://schemas.microsoft.com/office/drawing/2014/main" id="{1285CF8C-5B81-D866-869E-6E92EDCE3FC8}"/>
+              </a:ext>
+            </a:extLst>
+          </p:cNvPr>
+          <p:cNvCxnSpPr>
+            <a:cxnSpLocks/>
+          </p:cNvCxnSpPr>
+          <p:nvPr/>
+        </p:nvCxnSpPr>
+        <p:spPr>
+          <a:xfrm>
+            <a:off x="4045352" y="4811916"/>
+            <a:ext cx="152400" cy="0"/>
+          </a:xfrm>
+          <a:prstGeom prst="line">
+            <a:avLst/>
+          </a:prstGeom>
+        </p:spPr>
+        <p:style>
+          <a:lnRef idx="1">
+            <a:schemeClr val="accent1"/>
+          </a:lnRef>
+          <a:fillRef idx="0">
+            <a:schemeClr val="accent1"/>
+          </a:fillRef>
+          <a:effectRef idx="0">
+            <a:schemeClr val="accent1"/>
+          </a:effectRef>
+          <a:fontRef idx="minor">
+            <a:schemeClr val="tx1"/>
+          </a:fontRef>
+        </p:style>
+      </p:cxnSp>
+      <p:cxnSp>
+        <p:nvCxnSpPr>
+          <p:cNvPr id="12" name="Straight Connector 11">
+            <a:extLst>
+              <a:ext uri="{FF2B5EF4-FFF2-40B4-BE49-F238E27FC236}">
+                <a16:creationId xmlns:a16="http://schemas.microsoft.com/office/drawing/2014/main" id="{AA9585DC-AF39-C529-24D7-C82D78470311}"/>
+              </a:ext>
+            </a:extLst>
+          </p:cNvPr>
+          <p:cNvCxnSpPr>
+            <a:cxnSpLocks/>
+          </p:cNvCxnSpPr>
+          <p:nvPr/>
+        </p:nvCxnSpPr>
+        <p:spPr>
+          <a:xfrm>
+            <a:off x="4045352" y="4483748"/>
+            <a:ext cx="152400" cy="0"/>
+          </a:xfrm>
+          <a:prstGeom prst="line">
+            <a:avLst/>
+          </a:prstGeom>
+        </p:spPr>
+        <p:style>
+          <a:lnRef idx="1">
+            <a:schemeClr val="accent1"/>
+          </a:lnRef>
+          <a:fillRef idx="0">
+            <a:schemeClr val="accent1"/>
+          </a:fillRef>
+          <a:effectRef idx="0">
+            <a:schemeClr val="accent1"/>
+          </a:effectRef>
+          <a:fontRef idx="minor">
+            <a:schemeClr val="tx1"/>
+          </a:fontRef>
+        </p:style>
+      </p:cxnSp>
+      <p:cxnSp>
+        <p:nvCxnSpPr>
+          <p:cNvPr id="13" name="Straight Connector 12">
+            <a:extLst>
+              <a:ext uri="{FF2B5EF4-FFF2-40B4-BE49-F238E27FC236}">
+                <a16:creationId xmlns:a16="http://schemas.microsoft.com/office/drawing/2014/main" id="{2667AEC3-F16E-93B1-9F81-AC2B8A796649}"/>
+              </a:ext>
+            </a:extLst>
+          </p:cNvPr>
+          <p:cNvCxnSpPr>
+            <a:cxnSpLocks/>
+          </p:cNvCxnSpPr>
+          <p:nvPr/>
+        </p:nvCxnSpPr>
+        <p:spPr>
+          <a:xfrm>
+            <a:off x="4045352" y="4155580"/>
+            <a:ext cx="152400" cy="0"/>
+          </a:xfrm>
+          <a:prstGeom prst="line">
+            <a:avLst/>
+          </a:prstGeom>
+        </p:spPr>
+        <p:style>
+          <a:lnRef idx="1">
+            <a:schemeClr val="accent1"/>
+          </a:lnRef>
+          <a:fillRef idx="0">
+            <a:schemeClr val="accent1"/>
+          </a:fillRef>
+          <a:effectRef idx="0">
+            <a:schemeClr val="accent1"/>
+          </a:effectRef>
+          <a:fontRef idx="minor">
+            <a:schemeClr val="tx1"/>
+          </a:fontRef>
+        </p:style>
+      </p:cxnSp>
+      <p:cxnSp>
+        <p:nvCxnSpPr>
+          <p:cNvPr id="14" name="Straight Connector 13">
+            <a:extLst>
+              <a:ext uri="{FF2B5EF4-FFF2-40B4-BE49-F238E27FC236}">
+                <a16:creationId xmlns:a16="http://schemas.microsoft.com/office/drawing/2014/main" id="{4C2AF7FE-503E-6A38-EFC0-77452B0636B7}"/>
+              </a:ext>
+            </a:extLst>
+          </p:cNvPr>
+          <p:cNvCxnSpPr>
+            <a:cxnSpLocks/>
+          </p:cNvCxnSpPr>
+          <p:nvPr/>
+        </p:nvCxnSpPr>
+        <p:spPr>
+          <a:xfrm rot="5400000">
+            <a:off x="4383817" y="5123942"/>
+            <a:ext cx="152400" cy="0"/>
+          </a:xfrm>
+          <a:prstGeom prst="line">
+            <a:avLst/>
+          </a:prstGeom>
+        </p:spPr>
+        <p:style>
+          <a:lnRef idx="1">
+            <a:schemeClr val="accent1"/>
+          </a:lnRef>
+          <a:fillRef idx="0">
+            <a:schemeClr val="accent1"/>
+          </a:fillRef>
+          <a:effectRef idx="0">
+            <a:schemeClr val="accent1"/>
+          </a:effectRef>
+          <a:fontRef idx="minor">
+            <a:schemeClr val="tx1"/>
+          </a:fontRef>
+        </p:style>
+      </p:cxnSp>
+      <p:cxnSp>
+        <p:nvCxnSpPr>
+          <p:cNvPr id="15" name="Straight Connector 14">
+            <a:extLst>
+              <a:ext uri="{FF2B5EF4-FFF2-40B4-BE49-F238E27FC236}">
+                <a16:creationId xmlns:a16="http://schemas.microsoft.com/office/drawing/2014/main" id="{037F1AA5-79DD-2901-7828-34F4431E9F5A}"/>
+              </a:ext>
+            </a:extLst>
+          </p:cNvPr>
+          <p:cNvCxnSpPr>
+            <a:cxnSpLocks/>
+          </p:cNvCxnSpPr>
+          <p:nvPr/>
+        </p:nvCxnSpPr>
+        <p:spPr>
+          <a:xfrm rot="5400000">
+            <a:off x="4713001" y="5123942"/>
+            <a:ext cx="152400" cy="0"/>
+          </a:xfrm>
+          <a:prstGeom prst="line">
+            <a:avLst/>
+          </a:prstGeom>
+        </p:spPr>
+        <p:style>
+          <a:lnRef idx="1">
+            <a:schemeClr val="accent1"/>
+          </a:lnRef>
+          <a:fillRef idx="0">
+            <a:schemeClr val="accent1"/>
+          </a:fillRef>
+          <a:effectRef idx="0">
+            <a:schemeClr val="accent1"/>
+          </a:effectRef>
+          <a:fontRef idx="minor">
+            <a:schemeClr val="tx1"/>
+          </a:fontRef>
+        </p:style>
+      </p:cxnSp>
+      <p:cxnSp>
+        <p:nvCxnSpPr>
+          <p:cNvPr id="16" name="Straight Connector 15">
+            <a:extLst>
+              <a:ext uri="{FF2B5EF4-FFF2-40B4-BE49-F238E27FC236}">
+                <a16:creationId xmlns:a16="http://schemas.microsoft.com/office/drawing/2014/main" id="{400EA10C-1E4E-8107-6F0E-F661AE989220}"/>
+              </a:ext>
+            </a:extLst>
+          </p:cNvPr>
+          <p:cNvCxnSpPr>
+            <a:cxnSpLocks/>
+          </p:cNvCxnSpPr>
+          <p:nvPr/>
+        </p:nvCxnSpPr>
+        <p:spPr>
+          <a:xfrm rot="5400000">
+            <a:off x="5042185" y="5123942"/>
+            <a:ext cx="152400" cy="0"/>
+          </a:xfrm>
+          <a:prstGeom prst="line">
+            <a:avLst/>
+          </a:prstGeom>
+        </p:spPr>
+        <p:style>
+          <a:lnRef idx="1">
+            <a:schemeClr val="accent1"/>
+          </a:lnRef>
+          <a:fillRef idx="0">
+            <a:schemeClr val="accent1"/>
+          </a:fillRef>
+          <a:effectRef idx="0">
+            <a:schemeClr val="accent1"/>
+          </a:effectRef>
+          <a:fontRef idx="minor">
+            <a:schemeClr val="tx1"/>
+          </a:fontRef>
+        </p:style>
+      </p:cxnSp>
+      <p:cxnSp>
+        <p:nvCxnSpPr>
+          <p:cNvPr id="17" name="Straight Connector 16">
+            <a:extLst>
+              <a:ext uri="{FF2B5EF4-FFF2-40B4-BE49-F238E27FC236}">
+                <a16:creationId xmlns:a16="http://schemas.microsoft.com/office/drawing/2014/main" id="{BE14042F-F6DB-19A0-C06D-141188B6C141}"/>
+              </a:ext>
+            </a:extLst>
+          </p:cNvPr>
+          <p:cNvCxnSpPr>
+            <a:cxnSpLocks/>
+          </p:cNvCxnSpPr>
+          <p:nvPr/>
+        </p:nvCxnSpPr>
+        <p:spPr>
+          <a:xfrm rot="5400000">
+            <a:off x="5371369" y="5123942"/>
+            <a:ext cx="152400" cy="0"/>
+          </a:xfrm>
+          <a:prstGeom prst="line">
+            <a:avLst/>
+          </a:prstGeom>
+        </p:spPr>
+        <p:style>
+          <a:lnRef idx="1">
+            <a:schemeClr val="accent1"/>
+          </a:lnRef>
+          <a:fillRef idx="0">
+            <a:schemeClr val="accent1"/>
+          </a:fillRef>
+          <a:effectRef idx="0">
+            <a:schemeClr val="accent1"/>
+          </a:effectRef>
+          <a:fontRef idx="minor">
+            <a:schemeClr val="tx1"/>
+          </a:fontRef>
+        </p:style>
+      </p:cxnSp>
+      <p:cxnSp>
+        <p:nvCxnSpPr>
+          <p:cNvPr id="18" name="Straight Connector 17">
+            <a:extLst>
+              <a:ext uri="{FF2B5EF4-FFF2-40B4-BE49-F238E27FC236}">
+                <a16:creationId xmlns:a16="http://schemas.microsoft.com/office/drawing/2014/main" id="{D00409A5-9662-BBF2-1E11-5A164DFBD86D}"/>
+              </a:ext>
+            </a:extLst>
+          </p:cNvPr>
+          <p:cNvCxnSpPr>
+            <a:cxnSpLocks/>
+          </p:cNvCxnSpPr>
+          <p:nvPr/>
+        </p:nvCxnSpPr>
+        <p:spPr>
+          <a:xfrm rot="5400000">
+            <a:off x="5700553" y="5123942"/>
+            <a:ext cx="152400" cy="0"/>
+          </a:xfrm>
+          <a:prstGeom prst="line">
+            <a:avLst/>
+          </a:prstGeom>
+        </p:spPr>
+        <p:style>
+          <a:lnRef idx="1">
+            <a:schemeClr val="accent1"/>
+          </a:lnRef>
+          <a:fillRef idx="0">
+            <a:schemeClr val="accent1"/>
+          </a:fillRef>
+          <a:effectRef idx="0">
+            <a:schemeClr val="accent1"/>
+          </a:effectRef>
+          <a:fontRef idx="minor">
+            <a:schemeClr val="tx1"/>
+          </a:fontRef>
+        </p:style>
+      </p:cxnSp>
+      <p:cxnSp>
+        <p:nvCxnSpPr>
+          <p:cNvPr id="19" name="Straight Connector 18">
+            <a:extLst>
+              <a:ext uri="{FF2B5EF4-FFF2-40B4-BE49-F238E27FC236}">
+                <a16:creationId xmlns:a16="http://schemas.microsoft.com/office/drawing/2014/main" id="{761407A7-73F3-68B0-CDDF-B11787BFE1A3}"/>
+              </a:ext>
+            </a:extLst>
+          </p:cNvPr>
+          <p:cNvCxnSpPr>
+            <a:cxnSpLocks/>
+          </p:cNvCxnSpPr>
+          <p:nvPr/>
+        </p:nvCxnSpPr>
+        <p:spPr>
+          <a:xfrm>
+            <a:off x="4045352" y="3827412"/>
+            <a:ext cx="152400" cy="0"/>
+          </a:xfrm>
+          <a:prstGeom prst="line">
+            <a:avLst/>
+          </a:prstGeom>
+        </p:spPr>
+        <p:style>
+          <a:lnRef idx="1">
+            <a:schemeClr val="accent1"/>
+          </a:lnRef>
+          <a:fillRef idx="0">
+            <a:schemeClr val="accent1"/>
+          </a:fillRef>
+          <a:effectRef idx="0">
+            <a:schemeClr val="accent1"/>
+          </a:effectRef>
+          <a:fontRef idx="minor">
+            <a:schemeClr val="tx1"/>
+          </a:fontRef>
+        </p:style>
+      </p:cxnSp>
+      <p:cxnSp>
+        <p:nvCxnSpPr>
+          <p:cNvPr id="20" name="Straight Connector 19">
+            <a:extLst>
+              <a:ext uri="{FF2B5EF4-FFF2-40B4-BE49-F238E27FC236}">
+                <a16:creationId xmlns:a16="http://schemas.microsoft.com/office/drawing/2014/main" id="{4A843F2D-F7DC-B1E8-3FDA-DAC74115C61F}"/>
+              </a:ext>
+            </a:extLst>
+          </p:cNvPr>
+          <p:cNvCxnSpPr>
+            <a:cxnSpLocks/>
+          </p:cNvCxnSpPr>
+          <p:nvPr/>
+        </p:nvCxnSpPr>
+        <p:spPr>
+          <a:xfrm>
+            <a:off x="4045352" y="3499244"/>
+            <a:ext cx="152400" cy="0"/>
+          </a:xfrm>
+          <a:prstGeom prst="line">
+            <a:avLst/>
+          </a:prstGeom>
+        </p:spPr>
+        <p:style>
+          <a:lnRef idx="1">
+            <a:schemeClr val="accent1"/>
+          </a:lnRef>
+          <a:fillRef idx="0">
+            <a:schemeClr val="accent1"/>
+          </a:fillRef>
+          <a:effectRef idx="0">
+            <a:schemeClr val="accent1"/>
+          </a:effectRef>
+          <a:fontRef idx="minor">
+            <a:schemeClr val="tx1"/>
+          </a:fontRef>
+        </p:style>
+      </p:cxnSp>
+      <p:cxnSp>
+        <p:nvCxnSpPr>
+          <p:cNvPr id="25" name="Straight Connector 24">
+            <a:extLst>
+              <a:ext uri="{FF2B5EF4-FFF2-40B4-BE49-F238E27FC236}">
+                <a16:creationId xmlns:a16="http://schemas.microsoft.com/office/drawing/2014/main" id="{DC38FECC-202A-ABA8-0C10-69ABD9376A89}"/>
+              </a:ext>
+            </a:extLst>
+          </p:cNvPr>
+          <p:cNvCxnSpPr>
+            <a:cxnSpLocks/>
+          </p:cNvCxnSpPr>
+          <p:nvPr/>
+        </p:nvCxnSpPr>
+        <p:spPr>
+          <a:xfrm flipH="1" flipV="1">
+            <a:off x="1382395" y="2518108"/>
+            <a:ext cx="1290788" cy="14019"/>
+          </a:xfrm>
+          <a:prstGeom prst="line">
+            <a:avLst/>
+          </a:prstGeom>
+        </p:spPr>
+        <p:style>
+          <a:lnRef idx="3">
+            <a:schemeClr val="accent2"/>
+          </a:lnRef>
+          <a:fillRef idx="0">
+            <a:schemeClr val="accent2"/>
+          </a:fillRef>
+          <a:effectRef idx="2">
+            <a:schemeClr val="accent2"/>
+          </a:effectRef>
+          <a:fontRef idx="minor">
+            <a:schemeClr val="tx1"/>
+          </a:fontRef>
+        </p:style>
+      </p:cxnSp>
+      <p:cxnSp>
+        <p:nvCxnSpPr>
+          <p:cNvPr id="26" name="Straight Connector 25">
+            <a:extLst>
+              <a:ext uri="{FF2B5EF4-FFF2-40B4-BE49-F238E27FC236}">
+                <a16:creationId xmlns:a16="http://schemas.microsoft.com/office/drawing/2014/main" id="{F01C5DDF-2931-7020-71A0-9E57A6EC18F5}"/>
+              </a:ext>
+            </a:extLst>
+          </p:cNvPr>
+          <p:cNvCxnSpPr>
+            <a:cxnSpLocks/>
+          </p:cNvCxnSpPr>
+          <p:nvPr/>
+        </p:nvCxnSpPr>
+        <p:spPr>
+          <a:xfrm flipH="1" flipV="1">
+            <a:off x="4126542" y="3499244"/>
+            <a:ext cx="3311340" cy="1655746"/>
+          </a:xfrm>
+          <a:prstGeom prst="line">
+            <a:avLst/>
+          </a:prstGeom>
+        </p:spPr>
+        <p:style>
+          <a:lnRef idx="3">
+            <a:schemeClr val="accent2"/>
+          </a:lnRef>
+          <a:fillRef idx="0">
+            <a:schemeClr val="accent2"/>
+          </a:fillRef>
+          <a:effectRef idx="2">
+            <a:schemeClr val="accent2"/>
+          </a:effectRef>
+          <a:fontRef idx="minor">
+            <a:schemeClr val="tx1"/>
+          </a:fontRef>
+        </p:style>
+      </p:cxnSp>
+      <p:cxnSp>
+        <p:nvCxnSpPr>
+          <p:cNvPr id="27" name="Straight Connector 26">
+            <a:extLst>
+              <a:ext uri="{FF2B5EF4-FFF2-40B4-BE49-F238E27FC236}">
+                <a16:creationId xmlns:a16="http://schemas.microsoft.com/office/drawing/2014/main" id="{E342176E-725C-3421-2EB3-10B3B070BC40}"/>
+              </a:ext>
+            </a:extLst>
+          </p:cNvPr>
+          <p:cNvCxnSpPr>
+            <a:cxnSpLocks/>
+          </p:cNvCxnSpPr>
+          <p:nvPr/>
+        </p:nvCxnSpPr>
+        <p:spPr>
+          <a:xfrm flipH="1" flipV="1">
+            <a:off x="5769549" y="2286928"/>
+            <a:ext cx="7204" cy="2855584"/>
+          </a:xfrm>
+          <a:prstGeom prst="line">
+            <a:avLst/>
+          </a:prstGeom>
+        </p:spPr>
+        <p:style>
+          <a:lnRef idx="3">
+            <a:schemeClr val="accent2"/>
+          </a:lnRef>
+          <a:fillRef idx="0">
+            <a:schemeClr val="accent2"/>
+          </a:fillRef>
+          <a:effectRef idx="2">
+            <a:schemeClr val="accent2"/>
+          </a:effectRef>
+          <a:fontRef idx="minor">
+            <a:schemeClr val="tx1"/>
+          </a:fontRef>
+        </p:style>
+      </p:cxnSp>
+      <p:cxnSp>
+        <p:nvCxnSpPr>
+          <p:cNvPr id="31" name="Straight Connector 30">
+            <a:extLst>
+              <a:ext uri="{FF2B5EF4-FFF2-40B4-BE49-F238E27FC236}">
+                <a16:creationId xmlns:a16="http://schemas.microsoft.com/office/drawing/2014/main" id="{F00B0E1D-78E1-57BC-B886-EA8B7A1E42A0}"/>
+              </a:ext>
+            </a:extLst>
+          </p:cNvPr>
+          <p:cNvCxnSpPr>
+            <a:cxnSpLocks/>
+          </p:cNvCxnSpPr>
+          <p:nvPr/>
+        </p:nvCxnSpPr>
+        <p:spPr>
+          <a:xfrm>
+            <a:off x="1553846" y="3706342"/>
+            <a:ext cx="513373" cy="1031400"/>
+          </a:xfrm>
+          <a:prstGeom prst="line">
+            <a:avLst/>
+          </a:prstGeom>
+        </p:spPr>
+        <p:style>
+          <a:lnRef idx="3">
+            <a:schemeClr val="dk1"/>
+          </a:lnRef>
+          <a:fillRef idx="0">
+            <a:schemeClr val="dk1"/>
+          </a:fillRef>
+          <a:effectRef idx="2">
+            <a:schemeClr val="dk1"/>
+          </a:effectRef>
+          <a:fontRef idx="minor">
+            <a:schemeClr val="tx1"/>
+          </a:fontRef>
+        </p:style>
+      </p:cxnSp>
+      <p:grpSp>
+        <p:nvGrpSpPr>
+          <p:cNvPr id="33" name="Group 32">
+            <a:extLst>
+              <a:ext uri="{FF2B5EF4-FFF2-40B4-BE49-F238E27FC236}">
+                <a16:creationId xmlns:a16="http://schemas.microsoft.com/office/drawing/2014/main" id="{FA0E2D66-8F83-BA1A-5C52-AD9E32008FF2}"/>
+              </a:ext>
+            </a:extLst>
+          </p:cNvPr>
+          <p:cNvGrpSpPr/>
+          <p:nvPr/>
+        </p:nvGrpSpPr>
+        <p:grpSpPr>
+          <a:xfrm>
+            <a:off x="1760040" y="3441231"/>
+            <a:ext cx="298080" cy="174240"/>
+            <a:chOff x="3786960" y="3900630"/>
+            <a:chExt cx="298080" cy="174240"/>
+          </a:xfrm>
+        </p:grpSpPr>
+        <mc:AlternateContent xmlns:mc="http://schemas.openxmlformats.org/markup-compatibility/2006" xmlns:p14="http://schemas.microsoft.com/office/powerpoint/2010/main">
+          <mc:Choice Requires="p14">
+            <p:contentPart p14:bwMode="auto" r:id="rId6">
+              <p14:nvContentPartPr>
+                <p14:cNvPr id="34" name="Ink 33">
+                  <a:extLst>
+                    <a:ext uri="{FF2B5EF4-FFF2-40B4-BE49-F238E27FC236}">
+                      <a16:creationId xmlns:a16="http://schemas.microsoft.com/office/drawing/2014/main" id="{43240F90-DC2B-D514-4D94-E4BA2BE604B9}"/>
+                    </a:ext>
+                  </a:extLst>
+                </p14:cNvPr>
+                <p14:cNvContentPartPr/>
+                <p14:nvPr/>
+              </p14:nvContentPartPr>
+              <p14:xfrm>
+                <a:off x="3786960" y="3900630"/>
+                <a:ext cx="298080" cy="174240"/>
+              </p14:xfrm>
+            </p:contentPart>
+          </mc:Choice>
+          <mc:Fallback xmlns="">
+            <p:pic>
+              <p:nvPicPr>
+                <p:cNvPr id="58" name="Ink 57">
+                  <a:extLst>
+                    <a:ext uri="{FF2B5EF4-FFF2-40B4-BE49-F238E27FC236}">
+                      <a16:creationId xmlns:a16="http://schemas.microsoft.com/office/drawing/2014/main" id="{4D894F02-EF6F-80C5-C648-93FD636B6E1E}"/>
+                    </a:ext>
+                  </a:extLst>
+                </p:cNvPr>
+                <p:cNvPicPr/>
+                <p:nvPr/>
+              </p:nvPicPr>
+              <p:blipFill>
+                <a:blip r:embed="rId19"/>
+                <a:stretch>
+                  <a:fillRect/>
+                </a:stretch>
+              </p:blipFill>
+              <p:spPr>
+                <a:xfrm>
+                  <a:off x="3777960" y="3891990"/>
+                  <a:ext cx="315720" cy="191880"/>
+                </a:xfrm>
+                <a:prstGeom prst="rect">
+                  <a:avLst/>
+                </a:prstGeom>
+              </p:spPr>
+            </p:pic>
+          </mc:Fallback>
+        </mc:AlternateContent>
+        <mc:AlternateContent xmlns:mc="http://schemas.openxmlformats.org/markup-compatibility/2006" xmlns:p14="http://schemas.microsoft.com/office/powerpoint/2010/main">
+          <mc:Choice Requires="p14">
+            <p:contentPart p14:bwMode="auto" r:id="rId20">
+              <p14:nvContentPartPr>
+                <p14:cNvPr id="35" name="Ink 34">
+                  <a:extLst>
+                    <a:ext uri="{FF2B5EF4-FFF2-40B4-BE49-F238E27FC236}">
+                      <a16:creationId xmlns:a16="http://schemas.microsoft.com/office/drawing/2014/main" id="{776DC314-1533-7AB3-AA76-90CE327D929E}"/>
+                    </a:ext>
+                  </a:extLst>
+                </p14:cNvPr>
+                <p14:cNvContentPartPr/>
+                <p14:nvPr/>
+              </p14:nvContentPartPr>
+              <p14:xfrm>
+                <a:off x="4011240" y="4072710"/>
+                <a:ext cx="54000" cy="360"/>
+              </p14:xfrm>
+            </p:contentPart>
+          </mc:Choice>
+          <mc:Fallback xmlns="">
+            <p:pic>
+              <p:nvPicPr>
+                <p:cNvPr id="59" name="Ink 58">
+                  <a:extLst>
+                    <a:ext uri="{FF2B5EF4-FFF2-40B4-BE49-F238E27FC236}">
+                      <a16:creationId xmlns:a16="http://schemas.microsoft.com/office/drawing/2014/main" id="{EF151C6B-3485-3684-6701-7A323215FF09}"/>
+                    </a:ext>
+                  </a:extLst>
+                </p:cNvPr>
+                <p:cNvPicPr/>
+                <p:nvPr/>
+              </p:nvPicPr>
+              <p:blipFill>
+                <a:blip r:embed="rId21"/>
+                <a:stretch>
+                  <a:fillRect/>
+                </a:stretch>
+              </p:blipFill>
+              <p:spPr>
+                <a:xfrm>
+                  <a:off x="4002600" y="4063710"/>
+                  <a:ext cx="71640" cy="18000"/>
+                </a:xfrm>
+                <a:prstGeom prst="rect">
+                  <a:avLst/>
+                </a:prstGeom>
+              </p:spPr>
+            </p:pic>
+          </mc:Fallback>
+        </mc:AlternateContent>
+      </p:grpSp>
+      <p:sp>
+        <p:nvSpPr>
+          <p:cNvPr id="36" name="Oval 35">
+            <a:extLst>
+              <a:ext uri="{FF2B5EF4-FFF2-40B4-BE49-F238E27FC236}">
+                <a16:creationId xmlns:a16="http://schemas.microsoft.com/office/drawing/2014/main" id="{6C8EFB0A-CDEA-B2AD-3218-707D8024280A}"/>
+              </a:ext>
+            </a:extLst>
+          </p:cNvPr>
+          <p:cNvSpPr/>
+          <p:nvPr/>
+        </p:nvSpPr>
+        <p:spPr>
+          <a:xfrm>
+            <a:off x="2389198" y="4047544"/>
+            <a:ext cx="60562" cy="60562"/>
+          </a:xfrm>
+          <a:prstGeom prst="ellipse">
+            <a:avLst/>
+          </a:prstGeom>
+        </p:spPr>
+        <p:style>
+          <a:lnRef idx="2">
+            <a:schemeClr val="dk1">
+              <a:shade val="50000"/>
+            </a:schemeClr>
+          </a:lnRef>
+          <a:fillRef idx="1">
+            <a:schemeClr val="dk1"/>
+          </a:fillRef>
+          <a:effectRef idx="0">
+            <a:schemeClr val="dk1"/>
+          </a:effectRef>
+          <a:fontRef idx="minor">
+            <a:schemeClr val="lt1"/>
+          </a:fontRef>
+        </p:style>
+        <p:txBody>
+          <a:bodyPr rtlCol="0" anchor="ctr"/>
+          <a:lstStyle/>
+          <a:p>
+            <a:pPr algn="ctr"/>
+            <a:endParaRPr lang="de-DE"/>
+          </a:p>
+        </p:txBody>
+      </p:sp>
+      <p:sp>
+        <p:nvSpPr>
+          <p:cNvPr id="41" name="Oval 40">
+            <a:extLst>
+              <a:ext uri="{FF2B5EF4-FFF2-40B4-BE49-F238E27FC236}">
+                <a16:creationId xmlns:a16="http://schemas.microsoft.com/office/drawing/2014/main" id="{FBA1EFD5-D348-A6C6-AFA6-294042FD8DA8}"/>
+              </a:ext>
+            </a:extLst>
+          </p:cNvPr>
+          <p:cNvSpPr/>
+          <p:nvPr/>
+        </p:nvSpPr>
+        <p:spPr>
+          <a:xfrm>
+            <a:off x="2036938" y="4008995"/>
+            <a:ext cx="60562" cy="60562"/>
+          </a:xfrm>
+          <a:prstGeom prst="ellipse">
+            <a:avLst/>
+          </a:prstGeom>
+        </p:spPr>
+        <p:style>
+          <a:lnRef idx="2">
+            <a:schemeClr val="dk1">
+              <a:shade val="50000"/>
+            </a:schemeClr>
+          </a:lnRef>
+          <a:fillRef idx="1">
+            <a:schemeClr val="dk1"/>
+          </a:fillRef>
+          <a:effectRef idx="0">
+            <a:schemeClr val="dk1"/>
+          </a:effectRef>
+          <a:fontRef idx="minor">
+            <a:schemeClr val="lt1"/>
+          </a:fontRef>
+        </p:style>
+        <p:txBody>
+          <a:bodyPr rtlCol="0" anchor="ctr"/>
+          <a:lstStyle/>
+          <a:p>
+            <a:pPr algn="ctr"/>
+            <a:endParaRPr lang="de-DE"/>
+          </a:p>
+        </p:txBody>
+      </p:sp>
+      <p:cxnSp>
+        <p:nvCxnSpPr>
+          <p:cNvPr id="46" name="Straight Connector 45">
+            <a:extLst>
+              <a:ext uri="{FF2B5EF4-FFF2-40B4-BE49-F238E27FC236}">
+                <a16:creationId xmlns:a16="http://schemas.microsoft.com/office/drawing/2014/main" id="{AA253CAB-2C75-3782-1F37-124472EF6805}"/>
+              </a:ext>
+            </a:extLst>
+          </p:cNvPr>
+          <p:cNvCxnSpPr>
+            <a:cxnSpLocks/>
+          </p:cNvCxnSpPr>
+          <p:nvPr/>
+        </p:nvCxnSpPr>
+        <p:spPr>
+          <a:xfrm rot="5400000" flipH="1" flipV="1">
+            <a:off x="1618331" y="4432513"/>
+            <a:ext cx="128565" cy="259073"/>
+          </a:xfrm>
+          <a:prstGeom prst="line">
+            <a:avLst/>
+          </a:prstGeom>
+          <a:ln>
+            <a:tailEnd type="triangle"/>
+          </a:ln>
+        </p:spPr>
+        <p:style>
+          <a:lnRef idx="3">
+            <a:schemeClr val="dk1"/>
+          </a:lnRef>
+          <a:fillRef idx="0">
+            <a:schemeClr val="dk1"/>
+          </a:fillRef>
+          <a:effectRef idx="2">
+            <a:schemeClr val="dk1"/>
+          </a:effectRef>
+          <a:fontRef idx="minor">
+            <a:schemeClr val="tx1"/>
+          </a:fontRef>
+        </p:style>
+      </p:cxnSp>
+      <p:cxnSp>
+        <p:nvCxnSpPr>
+          <p:cNvPr id="48" name="Straight Connector 47">
+            <a:extLst>
+              <a:ext uri="{FF2B5EF4-FFF2-40B4-BE49-F238E27FC236}">
+                <a16:creationId xmlns:a16="http://schemas.microsoft.com/office/drawing/2014/main" id="{3FDB827C-AB63-41F1-1ECA-E1DBEE129CB4}"/>
+              </a:ext>
+            </a:extLst>
+          </p:cNvPr>
+          <p:cNvCxnSpPr>
+            <a:cxnSpLocks/>
+          </p:cNvCxnSpPr>
+          <p:nvPr/>
+        </p:nvCxnSpPr>
+        <p:spPr>
+          <a:xfrm rot="5400000">
+            <a:off x="6029737" y="5123942"/>
+            <a:ext cx="152400" cy="0"/>
+          </a:xfrm>
+          <a:prstGeom prst="line">
+            <a:avLst/>
+          </a:prstGeom>
+        </p:spPr>
+        <p:style>
+          <a:lnRef idx="1">
+            <a:schemeClr val="accent1"/>
+          </a:lnRef>
+          <a:fillRef idx="0">
+            <a:schemeClr val="accent1"/>
+          </a:fillRef>
+          <a:effectRef idx="0">
+            <a:schemeClr val="accent1"/>
+          </a:effectRef>
+          <a:fontRef idx="minor">
+            <a:schemeClr val="tx1"/>
+          </a:fontRef>
+        </p:style>
+      </p:cxnSp>
+      <p:cxnSp>
+        <p:nvCxnSpPr>
+          <p:cNvPr id="49" name="Straight Connector 48">
+            <a:extLst>
+              <a:ext uri="{FF2B5EF4-FFF2-40B4-BE49-F238E27FC236}">
+                <a16:creationId xmlns:a16="http://schemas.microsoft.com/office/drawing/2014/main" id="{FB608029-44AC-B5F0-E543-4892DF9A489C}"/>
+              </a:ext>
+            </a:extLst>
+          </p:cNvPr>
+          <p:cNvCxnSpPr>
+            <a:cxnSpLocks/>
+          </p:cNvCxnSpPr>
+          <p:nvPr/>
+        </p:nvCxnSpPr>
+        <p:spPr>
+          <a:xfrm rot="5400000">
+            <a:off x="6358921" y="5123942"/>
+            <a:ext cx="152400" cy="0"/>
+          </a:xfrm>
+          <a:prstGeom prst="line">
+            <a:avLst/>
+          </a:prstGeom>
+        </p:spPr>
+        <p:style>
+          <a:lnRef idx="1">
+            <a:schemeClr val="accent1"/>
+          </a:lnRef>
+          <a:fillRef idx="0">
+            <a:schemeClr val="accent1"/>
+          </a:fillRef>
+          <a:effectRef idx="0">
+            <a:schemeClr val="accent1"/>
+          </a:effectRef>
+          <a:fontRef idx="minor">
+            <a:schemeClr val="tx1"/>
+          </a:fontRef>
+        </p:style>
+      </p:cxnSp>
+      <p:cxnSp>
+        <p:nvCxnSpPr>
+          <p:cNvPr id="50" name="Straight Connector 49">
+            <a:extLst>
+              <a:ext uri="{FF2B5EF4-FFF2-40B4-BE49-F238E27FC236}">
+                <a16:creationId xmlns:a16="http://schemas.microsoft.com/office/drawing/2014/main" id="{E939CD2E-7E91-E6CD-C0FB-07ACD87590A8}"/>
+              </a:ext>
+            </a:extLst>
+          </p:cNvPr>
+          <p:cNvCxnSpPr>
+            <a:cxnSpLocks/>
+          </p:cNvCxnSpPr>
+          <p:nvPr/>
+        </p:nvCxnSpPr>
+        <p:spPr>
+          <a:xfrm rot="5400000">
+            <a:off x="6688105" y="5123942"/>
+            <a:ext cx="152400" cy="0"/>
+          </a:xfrm>
+          <a:prstGeom prst="line">
+            <a:avLst/>
+          </a:prstGeom>
+        </p:spPr>
+        <p:style>
+          <a:lnRef idx="1">
+            <a:schemeClr val="accent1"/>
+          </a:lnRef>
+          <a:fillRef idx="0">
+            <a:schemeClr val="accent1"/>
+          </a:fillRef>
+          <a:effectRef idx="0">
+            <a:schemeClr val="accent1"/>
+          </a:effectRef>
+          <a:fontRef idx="minor">
+            <a:schemeClr val="tx1"/>
+          </a:fontRef>
+        </p:style>
+      </p:cxnSp>
+      <p:cxnSp>
+        <p:nvCxnSpPr>
+          <p:cNvPr id="51" name="Straight Connector 50">
+            <a:extLst>
+              <a:ext uri="{FF2B5EF4-FFF2-40B4-BE49-F238E27FC236}">
+                <a16:creationId xmlns:a16="http://schemas.microsoft.com/office/drawing/2014/main" id="{5895158B-F3E3-FC5E-6838-98BBC6B69102}"/>
+              </a:ext>
+            </a:extLst>
+          </p:cNvPr>
+          <p:cNvCxnSpPr>
+            <a:cxnSpLocks/>
+          </p:cNvCxnSpPr>
+          <p:nvPr/>
+        </p:nvCxnSpPr>
+        <p:spPr>
+          <a:xfrm rot="5400000">
+            <a:off x="7017289" y="5123942"/>
+            <a:ext cx="152400" cy="0"/>
+          </a:xfrm>
+          <a:prstGeom prst="line">
+            <a:avLst/>
+          </a:prstGeom>
+        </p:spPr>
+        <p:style>
+          <a:lnRef idx="1">
+            <a:schemeClr val="accent1"/>
+          </a:lnRef>
+          <a:fillRef idx="0">
+            <a:schemeClr val="accent1"/>
+          </a:fillRef>
+          <a:effectRef idx="0">
+            <a:schemeClr val="accent1"/>
+          </a:effectRef>
+          <a:fontRef idx="minor">
+            <a:schemeClr val="tx1"/>
+          </a:fontRef>
+        </p:style>
+      </p:cxnSp>
+      <p:cxnSp>
+        <p:nvCxnSpPr>
+          <p:cNvPr id="52" name="Straight Connector 51">
+            <a:extLst>
+              <a:ext uri="{FF2B5EF4-FFF2-40B4-BE49-F238E27FC236}">
+                <a16:creationId xmlns:a16="http://schemas.microsoft.com/office/drawing/2014/main" id="{14A9CA17-7B13-F012-3F54-203A25FD7D4D}"/>
+              </a:ext>
+            </a:extLst>
+          </p:cNvPr>
+          <p:cNvCxnSpPr>
+            <a:cxnSpLocks/>
+          </p:cNvCxnSpPr>
+          <p:nvPr/>
+        </p:nvCxnSpPr>
+        <p:spPr>
+          <a:xfrm rot="5400000">
+            <a:off x="7346473" y="5123942"/>
+            <a:ext cx="152400" cy="0"/>
+          </a:xfrm>
+          <a:prstGeom prst="line">
+            <a:avLst/>
+          </a:prstGeom>
+        </p:spPr>
+        <p:style>
+          <a:lnRef idx="1">
+            <a:schemeClr val="accent1"/>
+          </a:lnRef>
+          <a:fillRef idx="0">
+            <a:schemeClr val="accent1"/>
+          </a:fillRef>
+          <a:effectRef idx="0">
+            <a:schemeClr val="accent1"/>
+          </a:effectRef>
+          <a:fontRef idx="minor">
+            <a:schemeClr val="tx1"/>
+          </a:fontRef>
+        </p:style>
+      </p:cxnSp>
+      <p:cxnSp>
+        <p:nvCxnSpPr>
+          <p:cNvPr id="56" name="Straight Connector 55">
+            <a:extLst>
+              <a:ext uri="{FF2B5EF4-FFF2-40B4-BE49-F238E27FC236}">
+                <a16:creationId xmlns:a16="http://schemas.microsoft.com/office/drawing/2014/main" id="{F16D1A5B-DF3C-1C75-E5B8-DC73D417685B}"/>
+              </a:ext>
+            </a:extLst>
+          </p:cNvPr>
+          <p:cNvCxnSpPr>
+            <a:cxnSpLocks/>
+          </p:cNvCxnSpPr>
+          <p:nvPr/>
+        </p:nvCxnSpPr>
+        <p:spPr>
+          <a:xfrm>
+            <a:off x="4045352" y="3165160"/>
+            <a:ext cx="152400" cy="0"/>
+          </a:xfrm>
+          <a:prstGeom prst="line">
+            <a:avLst/>
+          </a:prstGeom>
+        </p:spPr>
+        <p:style>
+          <a:lnRef idx="1">
+            <a:schemeClr val="accent1"/>
+          </a:lnRef>
+          <a:fillRef idx="0">
+            <a:schemeClr val="accent1"/>
+          </a:fillRef>
+          <a:effectRef idx="0">
+            <a:schemeClr val="accent1"/>
+          </a:effectRef>
+          <a:fontRef idx="minor">
+            <a:schemeClr val="tx1"/>
+          </a:fontRef>
+        </p:style>
+      </p:cxnSp>
+      <p:cxnSp>
+        <p:nvCxnSpPr>
+          <p:cNvPr id="57" name="Straight Connector 56">
+            <a:extLst>
+              <a:ext uri="{FF2B5EF4-FFF2-40B4-BE49-F238E27FC236}">
+                <a16:creationId xmlns:a16="http://schemas.microsoft.com/office/drawing/2014/main" id="{726DF651-9C52-1272-C0AB-B34717F4A600}"/>
+              </a:ext>
+            </a:extLst>
+          </p:cNvPr>
+          <p:cNvCxnSpPr>
+            <a:cxnSpLocks/>
+          </p:cNvCxnSpPr>
+          <p:nvPr/>
+        </p:nvCxnSpPr>
+        <p:spPr>
+          <a:xfrm>
+            <a:off x="4045352" y="2836992"/>
+            <a:ext cx="152400" cy="0"/>
+          </a:xfrm>
+          <a:prstGeom prst="line">
+            <a:avLst/>
+          </a:prstGeom>
+        </p:spPr>
+        <p:style>
+          <a:lnRef idx="1">
+            <a:schemeClr val="accent1"/>
+          </a:lnRef>
+          <a:fillRef idx="0">
+            <a:schemeClr val="accent1"/>
+          </a:fillRef>
+          <a:effectRef idx="0">
+            <a:schemeClr val="accent1"/>
+          </a:effectRef>
+          <a:fontRef idx="minor">
+            <a:schemeClr val="tx1"/>
+          </a:fontRef>
+        </p:style>
+      </p:cxnSp>
+      <p:cxnSp>
+        <p:nvCxnSpPr>
+          <p:cNvPr id="58" name="Straight Connector 57">
+            <a:extLst>
+              <a:ext uri="{FF2B5EF4-FFF2-40B4-BE49-F238E27FC236}">
+                <a16:creationId xmlns:a16="http://schemas.microsoft.com/office/drawing/2014/main" id="{71236C87-AC10-1F54-413B-0DDDB9893FE9}"/>
+              </a:ext>
+            </a:extLst>
+          </p:cNvPr>
+          <p:cNvCxnSpPr>
+            <a:cxnSpLocks/>
+          </p:cNvCxnSpPr>
+          <p:nvPr/>
+        </p:nvCxnSpPr>
+        <p:spPr>
+          <a:xfrm>
+            <a:off x="4045352" y="2508824"/>
+            <a:ext cx="152400" cy="0"/>
+          </a:xfrm>
+          <a:prstGeom prst="line">
+            <a:avLst/>
+          </a:prstGeom>
+        </p:spPr>
+        <p:style>
+          <a:lnRef idx="1">
+            <a:schemeClr val="accent1"/>
+          </a:lnRef>
+          <a:fillRef idx="0">
+            <a:schemeClr val="accent1"/>
+          </a:fillRef>
+          <a:effectRef idx="0">
+            <a:schemeClr val="accent1"/>
+          </a:effectRef>
+          <a:fontRef idx="minor">
+            <a:schemeClr val="tx1"/>
+          </a:fontRef>
+        </p:style>
+      </p:cxnSp>
+      <p:cxnSp>
+        <p:nvCxnSpPr>
+          <p:cNvPr id="59" name="Straight Connector 58">
+            <a:extLst>
+              <a:ext uri="{FF2B5EF4-FFF2-40B4-BE49-F238E27FC236}">
+                <a16:creationId xmlns:a16="http://schemas.microsoft.com/office/drawing/2014/main" id="{47474FA0-9CAA-6759-9CA2-8FC9E2322DC9}"/>
+              </a:ext>
+            </a:extLst>
+          </p:cNvPr>
+          <p:cNvCxnSpPr>
+            <a:cxnSpLocks/>
+          </p:cNvCxnSpPr>
+          <p:nvPr/>
+        </p:nvCxnSpPr>
+        <p:spPr>
+          <a:xfrm>
+            <a:off x="4045352" y="2180656"/>
+            <a:ext cx="152400" cy="0"/>
+          </a:xfrm>
+          <a:prstGeom prst="line">
+            <a:avLst/>
+          </a:prstGeom>
+        </p:spPr>
+        <p:style>
+          <a:lnRef idx="1">
+            <a:schemeClr val="accent1"/>
+          </a:lnRef>
+          <a:fillRef idx="0">
+            <a:schemeClr val="accent1"/>
+          </a:fillRef>
+          <a:effectRef idx="0">
+            <a:schemeClr val="accent1"/>
+          </a:effectRef>
+          <a:fontRef idx="minor">
+            <a:schemeClr val="tx1"/>
+          </a:fontRef>
+        </p:style>
+      </p:cxnSp>
+      <p:cxnSp>
+        <p:nvCxnSpPr>
+          <p:cNvPr id="62" name="Straight Connector 61">
+            <a:extLst>
+              <a:ext uri="{FF2B5EF4-FFF2-40B4-BE49-F238E27FC236}">
+                <a16:creationId xmlns:a16="http://schemas.microsoft.com/office/drawing/2014/main" id="{762DABC5-44AF-B762-7E02-4CF120F28017}"/>
+              </a:ext>
+            </a:extLst>
+          </p:cNvPr>
+          <p:cNvCxnSpPr>
+            <a:cxnSpLocks/>
+          </p:cNvCxnSpPr>
+          <p:nvPr/>
+        </p:nvCxnSpPr>
+        <p:spPr>
+          <a:xfrm>
+            <a:off x="4045352" y="1868236"/>
+            <a:ext cx="152400" cy="0"/>
+          </a:xfrm>
+          <a:prstGeom prst="line">
+            <a:avLst/>
+          </a:prstGeom>
+        </p:spPr>
+        <p:style>
+          <a:lnRef idx="1">
+            <a:schemeClr val="accent1"/>
+          </a:lnRef>
+          <a:fillRef idx="0">
+            <a:schemeClr val="accent1"/>
+          </a:fillRef>
+          <a:effectRef idx="0">
+            <a:schemeClr val="accent1"/>
+          </a:effectRef>
+          <a:fontRef idx="minor">
+            <a:schemeClr val="tx1"/>
+          </a:fontRef>
+        </p:style>
+      </p:cxnSp>
+      <p:sp>
+        <p:nvSpPr>
+          <p:cNvPr id="72" name="TextBox 71">
+            <a:extLst>
+              <a:ext uri="{FF2B5EF4-FFF2-40B4-BE49-F238E27FC236}">
+                <a16:creationId xmlns:a16="http://schemas.microsoft.com/office/drawing/2014/main" id="{BF2F9FD0-1068-1E3E-8F3B-3CBFFD5DA13D}"/>
+              </a:ext>
+            </a:extLst>
+          </p:cNvPr>
+          <p:cNvSpPr txBox="1"/>
+          <p:nvPr/>
+        </p:nvSpPr>
+        <p:spPr>
+          <a:xfrm>
+            <a:off x="6710845" y="4281395"/>
+            <a:ext cx="1275410" cy="738664"/>
+          </a:xfrm>
+          <a:prstGeom prst="rect">
+            <a:avLst/>
+          </a:prstGeom>
+          <a:noFill/>
+        </p:spPr>
+        <p:txBody>
+          <a:bodyPr wrap="square">
+            <a:spAutoFit/>
+          </a:bodyPr>
+          <a:lstStyle/>
+          <a:p>
+            <a:pPr>
+              <a:spcBef>
+                <a:spcPts val="400"/>
+              </a:spcBef>
+            </a:pPr>
+            <a:r>
+              <a:rPr lang="de-DE" sz="1400" dirty="0"/>
+              <a:t>Begrenzung Nachfrage Produkt A</a:t>
+            </a:r>
+            <a:endParaRPr lang="de-DE" sz="1400" b="0" dirty="0"/>
+          </a:p>
+        </p:txBody>
+      </p:sp>
+      <p:sp>
+        <p:nvSpPr>
+          <p:cNvPr id="73" name="TextBox 72">
+            <a:extLst>
+              <a:ext uri="{FF2B5EF4-FFF2-40B4-BE49-F238E27FC236}">
+                <a16:creationId xmlns:a16="http://schemas.microsoft.com/office/drawing/2014/main" id="{AD70799B-772C-4AED-E513-476757BA5654}"/>
+              </a:ext>
+            </a:extLst>
+          </p:cNvPr>
+          <p:cNvSpPr txBox="1"/>
+          <p:nvPr/>
+        </p:nvSpPr>
+        <p:spPr>
+          <a:xfrm>
+            <a:off x="4311087" y="1868236"/>
+            <a:ext cx="1275410" cy="738664"/>
+          </a:xfrm>
+          <a:prstGeom prst="rect">
+            <a:avLst/>
+          </a:prstGeom>
+          <a:noFill/>
+        </p:spPr>
+        <p:txBody>
+          <a:bodyPr wrap="square">
+            <a:spAutoFit/>
+          </a:bodyPr>
+          <a:lstStyle/>
+          <a:p>
+            <a:pPr>
+              <a:spcBef>
+                <a:spcPts val="400"/>
+              </a:spcBef>
+            </a:pPr>
+            <a:r>
+              <a:rPr lang="de-DE" sz="1400"/>
+              <a:t>Begrenzung Nachfrage </a:t>
+            </a:r>
+            <a:r>
+              <a:rPr lang="de-DE" sz="1400" dirty="0"/>
+              <a:t>Produkt B</a:t>
+            </a:r>
+            <a:endParaRPr lang="de-DE" sz="1400" b="0" dirty="0"/>
+          </a:p>
+        </p:txBody>
+      </p:sp>
+      <p:sp>
+        <p:nvSpPr>
+          <p:cNvPr id="74" name="TextBox 73">
+            <a:extLst>
+              <a:ext uri="{FF2B5EF4-FFF2-40B4-BE49-F238E27FC236}">
+                <a16:creationId xmlns:a16="http://schemas.microsoft.com/office/drawing/2014/main" id="{1D3C637D-A28E-74DF-D0E4-573D564225EB}"/>
+              </a:ext>
+            </a:extLst>
+          </p:cNvPr>
+          <p:cNvSpPr txBox="1"/>
+          <p:nvPr/>
+        </p:nvSpPr>
+        <p:spPr>
+          <a:xfrm>
+            <a:off x="5751217" y="2943806"/>
+            <a:ext cx="1275410" cy="738664"/>
+          </a:xfrm>
+          <a:prstGeom prst="rect">
+            <a:avLst/>
+          </a:prstGeom>
+          <a:noFill/>
+        </p:spPr>
+        <p:txBody>
+          <a:bodyPr wrap="square">
+            <a:spAutoFit/>
+          </a:bodyPr>
+          <a:lstStyle/>
+          <a:p>
+            <a:pPr>
+              <a:spcBef>
+                <a:spcPts val="400"/>
+              </a:spcBef>
+            </a:pPr>
+            <a:r>
+              <a:rPr lang="de-DE" sz="1400" dirty="0"/>
+              <a:t>Begrenzung Nachfrage Produkt C</a:t>
+            </a:r>
+            <a:endParaRPr lang="de-DE" sz="1400" b="0" dirty="0"/>
+          </a:p>
+        </p:txBody>
+      </p:sp>
+    </p:spTree>
+    <p:extLst>
+      <p:ext uri="{BB962C8B-B14F-4D97-AF65-F5344CB8AC3E}">
+        <p14:creationId xmlns:p14="http://schemas.microsoft.com/office/powerpoint/2010/main" val="488912307"/>
+      </p:ext>
+    </p:extLst>
+  </p:cSld>
+  <p:clrMapOvr>
+    <a:masterClrMapping/>
+  </p:clrMapOvr>
+  <p:timing>
+    <p:tnLst>
+      <p:par>
+        <p:cTn id="1" dur="indefinite" restart="never" nodeType="tmRoot">
+          <p:childTnLst>
+            <p:seq concurrent="1" nextAc="seek">
+              <p:cTn id="2" dur="indefinite" nodeType="mainSeq">
+                <p:childTnLst>
+                  <p:par>
+                    <p:cTn id="3" fill="hold">
+                      <p:stCondLst>
+                        <p:cond delay="indefinite"/>
+                      </p:stCondLst>
+                      <p:childTnLst>
+                        <p:par>
+                          <p:cTn id="4" fill="hold">
+                            <p:stCondLst>
+                              <p:cond delay="0"/>
+                            </p:stCondLst>
+                            <p:childTnLst>
+                              <p:par>
+                                <p:cTn id="5" presetID="1" presetClass="entr" presetSubtype="0" fill="hold" nodeType="clickEffect">
+                                  <p:stCondLst>
+                                    <p:cond delay="0"/>
+                                  </p:stCondLst>
+                                  <p:childTnLst>
+                                    <p:set>
+                                      <p:cBhvr>
+                                        <p:cTn id="6" dur="1" fill="hold">
+                                          <p:stCondLst>
+                                            <p:cond delay="0"/>
+                                          </p:stCondLst>
+                                        </p:cTn>
+                                        <p:tgtEl>
+                                          <p:spTgt spid="4"/>
+                                        </p:tgtEl>
+                                        <p:attrNameLst>
+                                          <p:attrName>style.visibility</p:attrName>
+                                        </p:attrNameLst>
+                                      </p:cBhvr>
+                                      <p:to>
+                                        <p:strVal val="visible"/>
+                                      </p:to>
+                                    </p:set>
+                                  </p:childTnLst>
+                                </p:cTn>
+                              </p:par>
+                              <p:par>
+                                <p:cTn id="7" presetID="1" presetClass="entr" presetSubtype="0" fill="hold" nodeType="withEffect">
+                                  <p:stCondLst>
+                                    <p:cond delay="0"/>
+                                  </p:stCondLst>
+                                  <p:childTnLst>
+                                    <p:set>
+                                      <p:cBhvr>
+                                        <p:cTn id="8" dur="1" fill="hold">
+                                          <p:stCondLst>
+                                            <p:cond delay="0"/>
+                                          </p:stCondLst>
+                                        </p:cTn>
+                                        <p:tgtEl>
+                                          <p:spTgt spid="5"/>
+                                        </p:tgtEl>
+                                        <p:attrNameLst>
+                                          <p:attrName>style.visibility</p:attrName>
+                                        </p:attrNameLst>
+                                      </p:cBhvr>
+                                      <p:to>
+                                        <p:strVal val="visible"/>
+                                      </p:to>
+                                    </p:set>
+                                  </p:childTnLst>
+                                </p:cTn>
+                              </p:par>
+                              <p:par>
+                                <p:cTn id="9" presetID="1" presetClass="entr" presetSubtype="0" fill="hold" nodeType="withEffect">
+                                  <p:stCondLst>
+                                    <p:cond delay="0"/>
+                                  </p:stCondLst>
+                                  <p:childTnLst>
+                                    <p:set>
+                                      <p:cBhvr>
+                                        <p:cTn id="10" dur="1" fill="hold">
+                                          <p:stCondLst>
+                                            <p:cond delay="0"/>
+                                          </p:stCondLst>
+                                        </p:cTn>
+                                        <p:tgtEl>
+                                          <p:spTgt spid="6"/>
+                                        </p:tgtEl>
+                                        <p:attrNameLst>
+                                          <p:attrName>style.visibility</p:attrName>
+                                        </p:attrNameLst>
+                                      </p:cBhvr>
+                                      <p:to>
+                                        <p:strVal val="visible"/>
+                                      </p:to>
+                                    </p:set>
+                                  </p:childTnLst>
+                                </p:cTn>
+                              </p:par>
+                              <p:par>
+                                <p:cTn id="11" presetID="1" presetClass="entr" presetSubtype="0" fill="hold" grpId="0" nodeType="withEffect">
+                                  <p:stCondLst>
+                                    <p:cond delay="0"/>
+                                  </p:stCondLst>
+                                  <p:childTnLst>
+                                    <p:set>
+                                      <p:cBhvr>
+                                        <p:cTn id="12" dur="1" fill="hold">
+                                          <p:stCondLst>
+                                            <p:cond delay="0"/>
+                                          </p:stCondLst>
+                                        </p:cTn>
+                                        <p:tgtEl>
+                                          <p:spTgt spid="7"/>
+                                        </p:tgtEl>
+                                        <p:attrNameLst>
+                                          <p:attrName>style.visibility</p:attrName>
+                                        </p:attrNameLst>
+                                      </p:cBhvr>
+                                      <p:to>
+                                        <p:strVal val="visible"/>
+                                      </p:to>
+                                    </p:set>
+                                  </p:childTnLst>
+                                </p:cTn>
+                              </p:par>
+                              <p:par>
+                                <p:cTn id="13" presetID="1" presetClass="entr" presetSubtype="0" fill="hold" grpId="0" nodeType="withEffect">
+                                  <p:stCondLst>
+                                    <p:cond delay="0"/>
+                                  </p:stCondLst>
+                                  <p:childTnLst>
+                                    <p:set>
+                                      <p:cBhvr>
+                                        <p:cTn id="14" dur="1" fill="hold">
+                                          <p:stCondLst>
+                                            <p:cond delay="0"/>
+                                          </p:stCondLst>
+                                        </p:cTn>
+                                        <p:tgtEl>
+                                          <p:spTgt spid="8"/>
+                                        </p:tgtEl>
+                                        <p:attrNameLst>
+                                          <p:attrName>style.visibility</p:attrName>
+                                        </p:attrNameLst>
+                                      </p:cBhvr>
+                                      <p:to>
+                                        <p:strVal val="visible"/>
+                                      </p:to>
+                                    </p:set>
+                                  </p:childTnLst>
+                                </p:cTn>
+                              </p:par>
+                              <p:par>
+                                <p:cTn id="15" presetID="1" presetClass="entr" presetSubtype="0" fill="hold" grpId="0" nodeType="withEffect">
+                                  <p:stCondLst>
+                                    <p:cond delay="0"/>
+                                  </p:stCondLst>
+                                  <p:childTnLst>
+                                    <p:set>
+                                      <p:cBhvr>
+                                        <p:cTn id="16" dur="1" fill="hold">
+                                          <p:stCondLst>
+                                            <p:cond delay="0"/>
+                                          </p:stCondLst>
+                                        </p:cTn>
+                                        <p:tgtEl>
+                                          <p:spTgt spid="9"/>
+                                        </p:tgtEl>
+                                        <p:attrNameLst>
+                                          <p:attrName>style.visibility</p:attrName>
+                                        </p:attrNameLst>
+                                      </p:cBhvr>
+                                      <p:to>
+                                        <p:strVal val="visible"/>
+                                      </p:to>
+                                    </p:set>
+                                  </p:childTnLst>
+                                </p:cTn>
+                              </p:par>
+                              <p:par>
+                                <p:cTn id="17" presetID="1" presetClass="entr" presetSubtype="0" fill="hold" grpId="0" nodeType="withEffect">
+                                  <p:stCondLst>
+                                    <p:cond delay="0"/>
+                                  </p:stCondLst>
+                                  <p:childTnLst>
+                                    <p:set>
+                                      <p:cBhvr>
+                                        <p:cTn id="18" dur="1" fill="hold">
+                                          <p:stCondLst>
+                                            <p:cond delay="0"/>
+                                          </p:stCondLst>
+                                        </p:cTn>
+                                        <p:tgtEl>
+                                          <p:spTgt spid="10"/>
+                                        </p:tgtEl>
+                                        <p:attrNameLst>
+                                          <p:attrName>style.visibility</p:attrName>
+                                        </p:attrNameLst>
+                                      </p:cBhvr>
+                                      <p:to>
+                                        <p:strVal val="visible"/>
+                                      </p:to>
+                                    </p:set>
+                                  </p:childTnLst>
+                                </p:cTn>
+                              </p:par>
+                              <p:par>
+                                <p:cTn id="19" presetID="1" presetClass="entr" presetSubtype="0" fill="hold" nodeType="withEffect">
+                                  <p:stCondLst>
+                                    <p:cond delay="0"/>
+                                  </p:stCondLst>
+                                  <p:childTnLst>
+                                    <p:set>
+                                      <p:cBhvr>
+                                        <p:cTn id="20" dur="1" fill="hold">
+                                          <p:stCondLst>
+                                            <p:cond delay="0"/>
+                                          </p:stCondLst>
+                                        </p:cTn>
+                                        <p:tgtEl>
+                                          <p:spTgt spid="11"/>
+                                        </p:tgtEl>
+                                        <p:attrNameLst>
+                                          <p:attrName>style.visibility</p:attrName>
+                                        </p:attrNameLst>
+                                      </p:cBhvr>
+                                      <p:to>
+                                        <p:strVal val="visible"/>
+                                      </p:to>
+                                    </p:set>
+                                  </p:childTnLst>
+                                </p:cTn>
+                              </p:par>
+                              <p:par>
+                                <p:cTn id="21" presetID="1" presetClass="entr" presetSubtype="0" fill="hold" nodeType="withEffect">
+                                  <p:stCondLst>
+                                    <p:cond delay="0"/>
+                                  </p:stCondLst>
+                                  <p:childTnLst>
+                                    <p:set>
+                                      <p:cBhvr>
+                                        <p:cTn id="22" dur="1" fill="hold">
+                                          <p:stCondLst>
+                                            <p:cond delay="0"/>
+                                          </p:stCondLst>
+                                        </p:cTn>
+                                        <p:tgtEl>
+                                          <p:spTgt spid="12"/>
+                                        </p:tgtEl>
+                                        <p:attrNameLst>
+                                          <p:attrName>style.visibility</p:attrName>
+                                        </p:attrNameLst>
+                                      </p:cBhvr>
+                                      <p:to>
+                                        <p:strVal val="visible"/>
+                                      </p:to>
+                                    </p:set>
+                                  </p:childTnLst>
+                                </p:cTn>
+                              </p:par>
+                              <p:par>
+                                <p:cTn id="23" presetID="1" presetClass="entr" presetSubtype="0" fill="hold" nodeType="withEffect">
+                                  <p:stCondLst>
+                                    <p:cond delay="0"/>
+                                  </p:stCondLst>
+                                  <p:childTnLst>
+                                    <p:set>
+                                      <p:cBhvr>
+                                        <p:cTn id="24" dur="1" fill="hold">
+                                          <p:stCondLst>
+                                            <p:cond delay="0"/>
+                                          </p:stCondLst>
+                                        </p:cTn>
+                                        <p:tgtEl>
+                                          <p:spTgt spid="13"/>
+                                        </p:tgtEl>
+                                        <p:attrNameLst>
+                                          <p:attrName>style.visibility</p:attrName>
+                                        </p:attrNameLst>
+                                      </p:cBhvr>
+                                      <p:to>
+                                        <p:strVal val="visible"/>
+                                      </p:to>
+                                    </p:set>
+                                  </p:childTnLst>
+                                </p:cTn>
+                              </p:par>
+                              <p:par>
+                                <p:cTn id="25" presetID="1" presetClass="entr" presetSubtype="0" fill="hold" nodeType="withEffect">
+                                  <p:stCondLst>
+                                    <p:cond delay="0"/>
+                                  </p:stCondLst>
+                                  <p:childTnLst>
+                                    <p:set>
+                                      <p:cBhvr>
+                                        <p:cTn id="26" dur="1" fill="hold">
+                                          <p:stCondLst>
+                                            <p:cond delay="0"/>
+                                          </p:stCondLst>
+                                        </p:cTn>
+                                        <p:tgtEl>
+                                          <p:spTgt spid="19"/>
+                                        </p:tgtEl>
+                                        <p:attrNameLst>
+                                          <p:attrName>style.visibility</p:attrName>
+                                        </p:attrNameLst>
+                                      </p:cBhvr>
+                                      <p:to>
+                                        <p:strVal val="visible"/>
+                                      </p:to>
+                                    </p:set>
+                                  </p:childTnLst>
+                                </p:cTn>
+                              </p:par>
+                              <p:par>
+                                <p:cTn id="27" presetID="1" presetClass="entr" presetSubtype="0" fill="hold" nodeType="withEffect">
+                                  <p:stCondLst>
+                                    <p:cond delay="0"/>
+                                  </p:stCondLst>
+                                  <p:childTnLst>
+                                    <p:set>
+                                      <p:cBhvr>
+                                        <p:cTn id="28" dur="1" fill="hold">
+                                          <p:stCondLst>
+                                            <p:cond delay="0"/>
+                                          </p:stCondLst>
+                                        </p:cTn>
+                                        <p:tgtEl>
+                                          <p:spTgt spid="20"/>
+                                        </p:tgtEl>
+                                        <p:attrNameLst>
+                                          <p:attrName>style.visibility</p:attrName>
+                                        </p:attrNameLst>
+                                      </p:cBhvr>
+                                      <p:to>
+                                        <p:strVal val="visible"/>
+                                      </p:to>
+                                    </p:set>
+                                  </p:childTnLst>
+                                </p:cTn>
+                              </p:par>
+                              <p:par>
+                                <p:cTn id="29" presetID="1" presetClass="entr" presetSubtype="0" fill="hold" nodeType="withEffect">
+                                  <p:stCondLst>
+                                    <p:cond delay="0"/>
+                                  </p:stCondLst>
+                                  <p:childTnLst>
+                                    <p:set>
+                                      <p:cBhvr>
+                                        <p:cTn id="30" dur="1" fill="hold">
+                                          <p:stCondLst>
+                                            <p:cond delay="0"/>
+                                          </p:stCondLst>
+                                        </p:cTn>
+                                        <p:tgtEl>
+                                          <p:spTgt spid="25"/>
+                                        </p:tgtEl>
+                                        <p:attrNameLst>
+                                          <p:attrName>style.visibility</p:attrName>
+                                        </p:attrNameLst>
+                                      </p:cBhvr>
+                                      <p:to>
+                                        <p:strVal val="visible"/>
+                                      </p:to>
+                                    </p:set>
+                                  </p:childTnLst>
+                                </p:cTn>
+                              </p:par>
+                              <p:par>
+                                <p:cTn id="31" presetID="1" presetClass="entr" presetSubtype="0" fill="hold" nodeType="withEffect">
+                                  <p:stCondLst>
+                                    <p:cond delay="0"/>
+                                  </p:stCondLst>
+                                  <p:childTnLst>
+                                    <p:set>
+                                      <p:cBhvr>
+                                        <p:cTn id="32" dur="1" fill="hold">
+                                          <p:stCondLst>
+                                            <p:cond delay="0"/>
+                                          </p:stCondLst>
+                                        </p:cTn>
+                                        <p:tgtEl>
+                                          <p:spTgt spid="26"/>
+                                        </p:tgtEl>
+                                        <p:attrNameLst>
+                                          <p:attrName>style.visibility</p:attrName>
+                                        </p:attrNameLst>
+                                      </p:cBhvr>
+                                      <p:to>
+                                        <p:strVal val="visible"/>
+                                      </p:to>
+                                    </p:set>
+                                  </p:childTnLst>
+                                </p:cTn>
+                              </p:par>
+                              <p:par>
+                                <p:cTn id="33" presetID="1" presetClass="entr" presetSubtype="0" fill="hold" nodeType="withEffect">
+                                  <p:stCondLst>
+                                    <p:cond delay="0"/>
+                                  </p:stCondLst>
+                                  <p:childTnLst>
+                                    <p:set>
+                                      <p:cBhvr>
+                                        <p:cTn id="34" dur="1" fill="hold">
+                                          <p:stCondLst>
+                                            <p:cond delay="0"/>
+                                          </p:stCondLst>
+                                        </p:cTn>
+                                        <p:tgtEl>
+                                          <p:spTgt spid="27"/>
+                                        </p:tgtEl>
+                                        <p:attrNameLst>
+                                          <p:attrName>style.visibility</p:attrName>
+                                        </p:attrNameLst>
+                                      </p:cBhvr>
+                                      <p:to>
+                                        <p:strVal val="visible"/>
+                                      </p:to>
+                                    </p:set>
+                                  </p:childTnLst>
+                                </p:cTn>
+                              </p:par>
+                              <p:par>
+                                <p:cTn id="35" presetID="1" presetClass="entr" presetSubtype="0" fill="hold" nodeType="withEffect">
+                                  <p:stCondLst>
+                                    <p:cond delay="0"/>
+                                  </p:stCondLst>
+                                  <p:childTnLst>
+                                    <p:set>
+                                      <p:cBhvr>
+                                        <p:cTn id="36" dur="1" fill="hold">
+                                          <p:stCondLst>
+                                            <p:cond delay="0"/>
+                                          </p:stCondLst>
+                                        </p:cTn>
+                                        <p:tgtEl>
+                                          <p:spTgt spid="56"/>
+                                        </p:tgtEl>
+                                        <p:attrNameLst>
+                                          <p:attrName>style.visibility</p:attrName>
+                                        </p:attrNameLst>
+                                      </p:cBhvr>
+                                      <p:to>
+                                        <p:strVal val="visible"/>
+                                      </p:to>
+                                    </p:set>
+                                  </p:childTnLst>
+                                </p:cTn>
+                              </p:par>
+                              <p:par>
+                                <p:cTn id="37" presetID="1" presetClass="entr" presetSubtype="0" fill="hold" nodeType="withEffect">
+                                  <p:stCondLst>
+                                    <p:cond delay="0"/>
+                                  </p:stCondLst>
+                                  <p:childTnLst>
+                                    <p:set>
+                                      <p:cBhvr>
+                                        <p:cTn id="38" dur="1" fill="hold">
+                                          <p:stCondLst>
+                                            <p:cond delay="0"/>
+                                          </p:stCondLst>
+                                        </p:cTn>
+                                        <p:tgtEl>
+                                          <p:spTgt spid="57"/>
+                                        </p:tgtEl>
+                                        <p:attrNameLst>
+                                          <p:attrName>style.visibility</p:attrName>
+                                        </p:attrNameLst>
+                                      </p:cBhvr>
+                                      <p:to>
+                                        <p:strVal val="visible"/>
+                                      </p:to>
+                                    </p:set>
+                                  </p:childTnLst>
+                                </p:cTn>
+                              </p:par>
+                              <p:par>
+                                <p:cTn id="39" presetID="1" presetClass="entr" presetSubtype="0" fill="hold" nodeType="withEffect">
+                                  <p:stCondLst>
+                                    <p:cond delay="0"/>
+                                  </p:stCondLst>
+                                  <p:childTnLst>
+                                    <p:set>
+                                      <p:cBhvr>
+                                        <p:cTn id="40" dur="1" fill="hold">
+                                          <p:stCondLst>
+                                            <p:cond delay="0"/>
+                                          </p:stCondLst>
+                                        </p:cTn>
+                                        <p:tgtEl>
+                                          <p:spTgt spid="58"/>
+                                        </p:tgtEl>
+                                        <p:attrNameLst>
+                                          <p:attrName>style.visibility</p:attrName>
+                                        </p:attrNameLst>
+                                      </p:cBhvr>
+                                      <p:to>
+                                        <p:strVal val="visible"/>
+                                      </p:to>
+                                    </p:set>
+                                  </p:childTnLst>
+                                </p:cTn>
+                              </p:par>
+                              <p:par>
+                                <p:cTn id="41" presetID="1" presetClass="entr" presetSubtype="0" fill="hold" nodeType="withEffect">
+                                  <p:stCondLst>
+                                    <p:cond delay="0"/>
+                                  </p:stCondLst>
+                                  <p:childTnLst>
+                                    <p:set>
+                                      <p:cBhvr>
+                                        <p:cTn id="42" dur="1" fill="hold">
+                                          <p:stCondLst>
+                                            <p:cond delay="0"/>
+                                          </p:stCondLst>
+                                        </p:cTn>
+                                        <p:tgtEl>
+                                          <p:spTgt spid="59"/>
+                                        </p:tgtEl>
+                                        <p:attrNameLst>
+                                          <p:attrName>style.visibility</p:attrName>
+                                        </p:attrNameLst>
+                                      </p:cBhvr>
+                                      <p:to>
+                                        <p:strVal val="visible"/>
+                                      </p:to>
+                                    </p:set>
+                                  </p:childTnLst>
+                                </p:cTn>
+                              </p:par>
+                              <p:par>
+                                <p:cTn id="43" presetID="1" presetClass="entr" presetSubtype="0" fill="hold" nodeType="withEffect">
+                                  <p:stCondLst>
+                                    <p:cond delay="0"/>
+                                  </p:stCondLst>
+                                  <p:childTnLst>
+                                    <p:set>
+                                      <p:cBhvr>
+                                        <p:cTn id="44" dur="1" fill="hold">
+                                          <p:stCondLst>
+                                            <p:cond delay="0"/>
+                                          </p:stCondLst>
+                                        </p:cTn>
+                                        <p:tgtEl>
+                                          <p:spTgt spid="62"/>
+                                        </p:tgtEl>
+                                        <p:attrNameLst>
+                                          <p:attrName>style.visibility</p:attrName>
+                                        </p:attrNameLst>
+                                      </p:cBhvr>
+                                      <p:to>
+                                        <p:strVal val="visible"/>
+                                      </p:to>
+                                    </p:set>
+                                  </p:childTnLst>
+                                </p:cTn>
+                              </p:par>
+                            </p:childTnLst>
+                          </p:cTn>
+                        </p:par>
+                      </p:childTnLst>
+                    </p:cTn>
+                  </p:par>
+                </p:childTnLst>
+              </p:cTn>
+              <p:prevCondLst>
+                <p:cond evt="onPrev" delay="0">
+                  <p:tgtEl>
+                    <p:sldTgt/>
+                  </p:tgtEl>
+                </p:cond>
+              </p:prevCondLst>
+              <p:nextCondLst>
+                <p:cond evt="onNext" delay="0">
+                  <p:tgtEl>
+                    <p:sldTgt/>
+                  </p:tgtEl>
+                </p:cond>
+              </p:nextCondLst>
+            </p:seq>
+          </p:childTnLst>
+        </p:cTn>
+      </p:par>
+    </p:tnLst>
+    <p:bldLst>
+      <p:bldP spid="7" grpId="0"/>
+      <p:bldP spid="8" grpId="0"/>
+      <p:bldP spid="9" grpId="0"/>
+      <p:bldP spid="10" grpId="0"/>
+    </p:bldLst>
+  </p:timing>
+</p:sld>
+</file>
+
 <file path=ppt/slides/slide2.xml><?xml version="1.0" encoding="utf-8"?>
 <p:sld xmlns:a="http://schemas.openxmlformats.org/drawingml/2006/main" xmlns:r="http://schemas.openxmlformats.org/officeDocument/2006/relationships" xmlns:p="http://schemas.openxmlformats.org/presentationml/2006/main">
   <p:cSld>
@@ -8407,8 +11151,8 @@
           </a:p>
         </p:txBody>
       </p:sp>
-      <mc:AlternateContent xmlns:mc="http://schemas.openxmlformats.org/markup-compatibility/2006">
-        <mc:Choice xmlns:a14="http://schemas.microsoft.com/office/drawing/2010/main" Requires="a14">
+      <mc:AlternateContent xmlns:mc="http://schemas.openxmlformats.org/markup-compatibility/2006" xmlns:a14="http://schemas.microsoft.com/office/drawing/2010/main">
+        <mc:Choice Requires="a14">
           <p:sp>
             <p:nvSpPr>
               <p:cNvPr id="13" name="TextBox 12">
@@ -8477,7 +11221,7 @@
             </p:txBody>
           </p:sp>
         </mc:Choice>
-        <mc:Fallback>
+        <mc:Fallback xmlns="">
           <p:sp>
             <p:nvSpPr>
               <p:cNvPr id="13" name="TextBox 12">

</xml_diff>

<commit_message>
ILP chapter done außer Anwendungen
</commit_message>
<xml_diff>
--- a/sketches.pptx
+++ b/sketches.pptx
@@ -5,7 +5,7 @@
     <p:sldMasterId id="2147483648" r:id="rId1"/>
   </p:sldMasterIdLst>
   <p:notesMasterIdLst>
-    <p:notesMasterId r:id="rId14"/>
+    <p:notesMasterId r:id="rId16"/>
   </p:notesMasterIdLst>
   <p:sldIdLst>
     <p:sldId id="256" r:id="rId2"/>
@@ -20,6 +20,8 @@
     <p:sldId id="265" r:id="rId11"/>
     <p:sldId id="266" r:id="rId12"/>
     <p:sldId id="267" r:id="rId13"/>
+    <p:sldId id="269" r:id="rId14"/>
+    <p:sldId id="268" r:id="rId15"/>
   </p:sldIdLst>
   <p:sldSz cx="12192000" cy="6858000"/>
   <p:notesSz cx="6858000" cy="9144000"/>
@@ -8505,7 +8507,7 @@
                 <a:blipFill>
                   <a:blip r:embed="rId24"/>
                   <a:stretch>
-                    <a:fillRect r="-1449"/>
+                    <a:fillRect r="-1449" b="-1836"/>
                   </a:stretch>
                 </a:blipFill>
               </p:spPr>
@@ -8565,7 +8567,115 @@
                           <a:rPr lang="de-DE" sz="1800" b="0" i="1" smtClean="0">
                             <a:latin typeface="Cambria Math" panose="02040503050406030204" pitchFamily="18" charset="0"/>
                           </a:rPr>
-                          <m:t>1    2    3    4    5    6    7    8    9   10</m:t>
+                          <m:t>1</m:t>
+                        </m:r>
+                        <m:r>
+                          <a:rPr lang="de-DE" sz="1800" b="0" i="1" smtClean="0">
+                            <a:latin typeface="Cambria Math" panose="02040503050406030204" pitchFamily="18" charset="0"/>
+                          </a:rPr>
+                          <m:t>    </m:t>
+                        </m:r>
+                        <m:r>
+                          <a:rPr lang="de-DE" sz="1800" b="0" i="1" smtClean="0">
+                            <a:latin typeface="Cambria Math" panose="02040503050406030204" pitchFamily="18" charset="0"/>
+                          </a:rPr>
+                          <m:t>2</m:t>
+                        </m:r>
+                        <m:r>
+                          <a:rPr lang="de-DE" sz="1800" b="0" i="1" smtClean="0">
+                            <a:latin typeface="Cambria Math" panose="02040503050406030204" pitchFamily="18" charset="0"/>
+                          </a:rPr>
+                          <m:t>    </m:t>
+                        </m:r>
+                        <m:r>
+                          <a:rPr lang="de-DE" sz="1800" b="0" i="1" smtClean="0">
+                            <a:latin typeface="Cambria Math" panose="02040503050406030204" pitchFamily="18" charset="0"/>
+                          </a:rPr>
+                          <m:t>3</m:t>
+                        </m:r>
+                        <m:r>
+                          <a:rPr lang="de-DE" sz="1800" b="0" i="1" smtClean="0">
+                            <a:latin typeface="Cambria Math" panose="02040503050406030204" pitchFamily="18" charset="0"/>
+                          </a:rPr>
+                          <m:t>    </m:t>
+                        </m:r>
+                        <m:r>
+                          <a:rPr lang="de-DE" sz="1800" b="0" i="1" smtClean="0">
+                            <a:latin typeface="Cambria Math" panose="02040503050406030204" pitchFamily="18" charset="0"/>
+                          </a:rPr>
+                          <m:t>4</m:t>
+                        </m:r>
+                        <m:r>
+                          <a:rPr lang="de-DE" sz="1800" b="0" i="1" smtClean="0">
+                            <a:latin typeface="Cambria Math" panose="02040503050406030204" pitchFamily="18" charset="0"/>
+                          </a:rPr>
+                          <m:t>    </m:t>
+                        </m:r>
+                        <m:r>
+                          <a:rPr lang="de-DE" sz="1800" b="0" i="1" smtClean="0">
+                            <a:latin typeface="Cambria Math" panose="02040503050406030204" pitchFamily="18" charset="0"/>
+                          </a:rPr>
+                          <m:t>5</m:t>
+                        </m:r>
+                        <m:r>
+                          <a:rPr lang="de-DE" sz="1800" b="0" i="1" smtClean="0">
+                            <a:latin typeface="Cambria Math" panose="02040503050406030204" pitchFamily="18" charset="0"/>
+                          </a:rPr>
+                          <m:t>    </m:t>
+                        </m:r>
+                        <m:r>
+                          <a:rPr lang="de-DE" sz="1800" b="0" i="1" smtClean="0">
+                            <a:latin typeface="Cambria Math" panose="02040503050406030204" pitchFamily="18" charset="0"/>
+                          </a:rPr>
+                          <m:t>6</m:t>
+                        </m:r>
+                        <m:r>
+                          <a:rPr lang="de-DE" sz="1800" b="0" i="1" smtClean="0">
+                            <a:latin typeface="Cambria Math" panose="02040503050406030204" pitchFamily="18" charset="0"/>
+                          </a:rPr>
+                          <m:t>    </m:t>
+                        </m:r>
+                        <m:r>
+                          <a:rPr lang="de-DE" sz="1800" b="0" i="1" smtClean="0">
+                            <a:latin typeface="Cambria Math" panose="02040503050406030204" pitchFamily="18" charset="0"/>
+                          </a:rPr>
+                          <m:t>7</m:t>
+                        </m:r>
+                        <m:r>
+                          <a:rPr lang="de-DE" sz="1800" b="0" i="1" smtClean="0">
+                            <a:latin typeface="Cambria Math" panose="02040503050406030204" pitchFamily="18" charset="0"/>
+                          </a:rPr>
+                          <m:t>    </m:t>
+                        </m:r>
+                        <m:r>
+                          <a:rPr lang="de-DE" sz="1800" b="0" i="1" smtClean="0">
+                            <a:latin typeface="Cambria Math" panose="02040503050406030204" pitchFamily="18" charset="0"/>
+                          </a:rPr>
+                          <m:t>8</m:t>
+                        </m:r>
+                        <m:r>
+                          <a:rPr lang="de-DE" sz="1800" b="0" i="1" smtClean="0">
+                            <a:latin typeface="Cambria Math" panose="02040503050406030204" pitchFamily="18" charset="0"/>
+                          </a:rPr>
+                          <m:t>    </m:t>
+                        </m:r>
+                        <m:r>
+                          <a:rPr lang="de-DE" sz="1800" b="0" i="1" smtClean="0">
+                            <a:latin typeface="Cambria Math" panose="02040503050406030204" pitchFamily="18" charset="0"/>
+                          </a:rPr>
+                          <m:t>9</m:t>
+                        </m:r>
+                        <m:r>
+                          <a:rPr lang="de-DE" sz="1800" b="0" i="1" smtClean="0">
+                            <a:latin typeface="Cambria Math" panose="02040503050406030204" pitchFamily="18" charset="0"/>
+                          </a:rPr>
+                          <m:t>   </m:t>
+                        </m:r>
+                        <m:r>
+                          <a:rPr lang="de-DE" sz="1800" b="0" i="1" smtClean="0">
+                            <a:latin typeface="Cambria Math" panose="02040503050406030204" pitchFamily="18" charset="0"/>
+                          </a:rPr>
+                          <m:t>10</m:t>
                         </m:r>
                       </m:oMath>
                     </m:oMathPara>
@@ -12546,7 +12656,7 @@
                   <a14:m>
                     <m:oMathPara xmlns:m="http://schemas.openxmlformats.org/officeDocument/2006/math">
                       <m:oMathParaPr>
-                        <m:jc m:val="centerGroup"/>
+                        <m:jc m:val="left"/>
                       </m:oMathParaPr>
                       <m:oMath xmlns:m="http://schemas.openxmlformats.org/officeDocument/2006/math">
                         <m:sSub>
@@ -12682,7 +12792,7 @@
                   <a14:m>
                     <m:oMathPara xmlns:m="http://schemas.openxmlformats.org/officeDocument/2006/math">
                       <m:oMathParaPr>
-                        <m:jc m:val="centerGroup"/>
+                        <m:jc m:val="left"/>
                       </m:oMathParaPr>
                       <m:oMath xmlns:m="http://schemas.openxmlformats.org/officeDocument/2006/math">
                         <m:sSub>
@@ -12818,7 +12928,7 @@
                   <a14:m>
                     <m:oMathPara xmlns:m="http://schemas.openxmlformats.org/officeDocument/2006/math">
                       <m:oMathParaPr>
-                        <m:jc m:val="centerGroup"/>
+                        <m:jc m:val="left"/>
                       </m:oMathParaPr>
                       <m:oMath xmlns:m="http://schemas.openxmlformats.org/officeDocument/2006/math">
                         <m:sSub>
@@ -12954,7 +13064,7 @@
                   <a14:m>
                     <m:oMathPara xmlns:m="http://schemas.openxmlformats.org/officeDocument/2006/math">
                       <m:oMathParaPr>
-                        <m:jc m:val="centerGroup"/>
+                        <m:jc m:val="left"/>
                       </m:oMathParaPr>
                       <m:oMath xmlns:m="http://schemas.openxmlformats.org/officeDocument/2006/math">
                         <m:sSub>
@@ -14181,6 +14291,2606 @@
     <p:extLst>
       <p:ext uri="{BB962C8B-B14F-4D97-AF65-F5344CB8AC3E}">
         <p14:creationId xmlns:p14="http://schemas.microsoft.com/office/powerpoint/2010/main" val="628024052"/>
+      </p:ext>
+    </p:extLst>
+  </p:cSld>
+  <p:clrMapOvr>
+    <a:masterClrMapping/>
+  </p:clrMapOvr>
+</p:sld>
+</file>
+
+<file path=ppt/slides/slide13.xml><?xml version="1.0" encoding="utf-8"?>
+<p:sld xmlns:a="http://schemas.openxmlformats.org/drawingml/2006/main" xmlns:r="http://schemas.openxmlformats.org/officeDocument/2006/relationships" xmlns:p="http://schemas.openxmlformats.org/presentationml/2006/main">
+  <p:cSld>
+    <p:spTree>
+      <p:nvGrpSpPr>
+        <p:cNvPr id="1" name="">
+          <a:extLst>
+            <a:ext uri="{FF2B5EF4-FFF2-40B4-BE49-F238E27FC236}">
+              <a16:creationId xmlns:a16="http://schemas.microsoft.com/office/drawing/2014/main" id="{C775784F-330D-8A78-5A45-94FA18D1577B}"/>
+            </a:ext>
+          </a:extLst>
+        </p:cNvPr>
+        <p:cNvGrpSpPr/>
+        <p:nvPr/>
+      </p:nvGrpSpPr>
+      <p:grpSpPr>
+        <a:xfrm>
+          <a:off x="0" y="0"/>
+          <a:ext cx="0" cy="0"/>
+          <a:chOff x="0" y="0"/>
+          <a:chExt cx="0" cy="0"/>
+        </a:xfrm>
+      </p:grpSpPr>
+      <p:grpSp>
+        <p:nvGrpSpPr>
+          <p:cNvPr id="20" name="Group 19">
+            <a:extLst>
+              <a:ext uri="{FF2B5EF4-FFF2-40B4-BE49-F238E27FC236}">
+                <a16:creationId xmlns:a16="http://schemas.microsoft.com/office/drawing/2014/main" id="{6E62FA6C-A20A-5CB5-79B9-592F143390DB}"/>
+              </a:ext>
+            </a:extLst>
+          </p:cNvPr>
+          <p:cNvGrpSpPr/>
+          <p:nvPr/>
+        </p:nvGrpSpPr>
+        <p:grpSpPr>
+          <a:xfrm>
+            <a:off x="667052" y="713238"/>
+            <a:ext cx="3681428" cy="5340321"/>
+            <a:chOff x="667052" y="713238"/>
+            <a:chExt cx="3681428" cy="5340321"/>
+          </a:xfrm>
+        </p:grpSpPr>
+        <mc:AlternateContent xmlns:mc="http://schemas.openxmlformats.org/markup-compatibility/2006">
+          <mc:Choice xmlns:a14="http://schemas.microsoft.com/office/drawing/2010/main" Requires="a14">
+            <p:sp>
+              <p:nvSpPr>
+                <p:cNvPr id="4" name="Rectangle: Rounded Corners 3">
+                  <a:extLst>
+                    <a:ext uri="{FF2B5EF4-FFF2-40B4-BE49-F238E27FC236}">
+                      <a16:creationId xmlns:a16="http://schemas.microsoft.com/office/drawing/2014/main" id="{EB07EA55-9AAD-991A-8660-6DC9DC2640AD}"/>
+                    </a:ext>
+                  </a:extLst>
+                </p:cNvPr>
+                <p:cNvSpPr/>
+                <p:nvPr/>
+              </p:nvSpPr>
+              <p:spPr>
+                <a:xfrm>
+                  <a:off x="1930400" y="2133600"/>
+                  <a:ext cx="2418080" cy="386080"/>
+                </a:xfrm>
+                <a:prstGeom prst="roundRect">
+                  <a:avLst/>
+                </a:prstGeom>
+                <a:ln w="19050">
+                  <a:solidFill>
+                    <a:schemeClr val="accent1"/>
+                  </a:solidFill>
+                </a:ln>
+              </p:spPr>
+              <p:style>
+                <a:lnRef idx="2">
+                  <a:schemeClr val="accent1"/>
+                </a:lnRef>
+                <a:fillRef idx="1">
+                  <a:schemeClr val="lt1"/>
+                </a:fillRef>
+                <a:effectRef idx="0">
+                  <a:schemeClr val="accent1"/>
+                </a:effectRef>
+                <a:fontRef idx="minor">
+                  <a:schemeClr val="dk1"/>
+                </a:fontRef>
+              </p:style>
+              <p:txBody>
+                <a:bodyPr rtlCol="0" anchor="ctr"/>
+                <a:lstStyle/>
+                <a:p>
+                  <a:pPr algn="ctr"/>
+                  <a14:m>
+                    <m:oMathPara xmlns:m="http://schemas.openxmlformats.org/officeDocument/2006/math">
+                      <m:oMathParaPr>
+                        <m:jc m:val="left"/>
+                      </m:oMathParaPr>
+                      <m:oMath xmlns:m="http://schemas.openxmlformats.org/officeDocument/2006/math">
+                        <m:sSub>
+                          <m:sSubPr>
+                            <m:ctrlPr>
+                              <a:rPr lang="de-DE" b="0" i="1" smtClean="0">
+                                <a:latin typeface="Cambria Math" panose="02040503050406030204" pitchFamily="18" charset="0"/>
+                              </a:rPr>
+                            </m:ctrlPr>
+                          </m:sSubPr>
+                          <m:e>
+                            <m:r>
+                              <a:rPr lang="de-DE" b="0" i="1" smtClean="0">
+                                <a:latin typeface="Cambria Math" panose="02040503050406030204" pitchFamily="18" charset="0"/>
+                              </a:rPr>
+                              <m:t>𝑠</m:t>
+                            </m:r>
+                          </m:e>
+                          <m:sub>
+                            <m:r>
+                              <a:rPr lang="de-DE" b="0" i="1" smtClean="0">
+                                <a:latin typeface="Cambria Math" panose="02040503050406030204" pitchFamily="18" charset="0"/>
+                              </a:rPr>
+                              <m:t>1</m:t>
+                            </m:r>
+                          </m:sub>
+                        </m:sSub>
+                      </m:oMath>
+                    </m:oMathPara>
+                  </a14:m>
+                  <a:endParaRPr lang="en-US" dirty="0"/>
+                </a:p>
+              </p:txBody>
+            </p:sp>
+          </mc:Choice>
+          <mc:Fallback>
+            <p:sp>
+              <p:nvSpPr>
+                <p:cNvPr id="4" name="Rectangle: Rounded Corners 3">
+                  <a:extLst>
+                    <a:ext uri="{FF2B5EF4-FFF2-40B4-BE49-F238E27FC236}">
+                      <a16:creationId xmlns:a16="http://schemas.microsoft.com/office/drawing/2014/main" id="{EB07EA55-9AAD-991A-8660-6DC9DC2640AD}"/>
+                    </a:ext>
+                  </a:extLst>
+                </p:cNvPr>
+                <p:cNvSpPr>
+                  <a:spLocks noRot="1" noChangeAspect="1" noMove="1" noResize="1" noEditPoints="1" noAdjustHandles="1" noChangeArrowheads="1" noChangeShapeType="1" noTextEdit="1"/>
+                </p:cNvSpPr>
+                <p:nvPr/>
+              </p:nvSpPr>
+              <p:spPr>
+                <a:xfrm>
+                  <a:off x="1930400" y="2133600"/>
+                  <a:ext cx="2418080" cy="386080"/>
+                </a:xfrm>
+                <a:prstGeom prst="roundRect">
+                  <a:avLst/>
+                </a:prstGeom>
+                <a:blipFill>
+                  <a:blip r:embed="rId2"/>
+                  <a:stretch>
+                    <a:fillRect/>
+                  </a:stretch>
+                </a:blipFill>
+                <a:ln w="19050">
+                  <a:solidFill>
+                    <a:schemeClr val="accent1"/>
+                  </a:solidFill>
+                </a:ln>
+              </p:spPr>
+              <p:txBody>
+                <a:bodyPr/>
+                <a:lstStyle/>
+                <a:p>
+                  <a:r>
+                    <a:rPr lang="en-US">
+                      <a:noFill/>
+                    </a:rPr>
+                    <a:t> </a:t>
+                  </a:r>
+                </a:p>
+              </p:txBody>
+            </p:sp>
+          </mc:Fallback>
+        </mc:AlternateContent>
+        <mc:AlternateContent xmlns:mc="http://schemas.openxmlformats.org/markup-compatibility/2006">
+          <mc:Choice xmlns:a14="http://schemas.microsoft.com/office/drawing/2010/main" Requires="a14">
+            <p:sp>
+              <p:nvSpPr>
+                <p:cNvPr id="5" name="Rectangle: Rounded Corners 4">
+                  <a:extLst>
+                    <a:ext uri="{FF2B5EF4-FFF2-40B4-BE49-F238E27FC236}">
+                      <a16:creationId xmlns:a16="http://schemas.microsoft.com/office/drawing/2014/main" id="{DB485A95-4147-E95A-762D-B5CBCD3B5BED}"/>
+                    </a:ext>
+                  </a:extLst>
+                </p:cNvPr>
+                <p:cNvSpPr/>
+                <p:nvPr/>
+              </p:nvSpPr>
+              <p:spPr>
+                <a:xfrm>
+                  <a:off x="1513840" y="3158858"/>
+                  <a:ext cx="2021840" cy="386080"/>
+                </a:xfrm>
+                <a:prstGeom prst="roundRect">
+                  <a:avLst/>
+                </a:prstGeom>
+                <a:ln w="19050">
+                  <a:solidFill>
+                    <a:schemeClr val="accent1"/>
+                  </a:solidFill>
+                </a:ln>
+              </p:spPr>
+              <p:style>
+                <a:lnRef idx="2">
+                  <a:schemeClr val="accent1"/>
+                </a:lnRef>
+                <a:fillRef idx="1">
+                  <a:schemeClr val="lt1"/>
+                </a:fillRef>
+                <a:effectRef idx="0">
+                  <a:schemeClr val="accent1"/>
+                </a:effectRef>
+                <a:fontRef idx="minor">
+                  <a:schemeClr val="dk1"/>
+                </a:fontRef>
+              </p:style>
+              <p:txBody>
+                <a:bodyPr rtlCol="0" anchor="ctr"/>
+                <a:lstStyle/>
+                <a:p>
+                  <a:pPr algn="ctr"/>
+                  <a14:m>
+                    <m:oMathPara xmlns:m="http://schemas.openxmlformats.org/officeDocument/2006/math">
+                      <m:oMathParaPr>
+                        <m:jc m:val="left"/>
+                      </m:oMathParaPr>
+                      <m:oMath xmlns:m="http://schemas.openxmlformats.org/officeDocument/2006/math">
+                        <m:sSub>
+                          <m:sSubPr>
+                            <m:ctrlPr>
+                              <a:rPr lang="de-DE" b="0" i="1" smtClean="0">
+                                <a:latin typeface="Cambria Math" panose="02040503050406030204" pitchFamily="18" charset="0"/>
+                              </a:rPr>
+                            </m:ctrlPr>
+                          </m:sSubPr>
+                          <m:e>
+                            <m:r>
+                              <a:rPr lang="de-DE" b="0" i="1" smtClean="0">
+                                <a:latin typeface="Cambria Math" panose="02040503050406030204" pitchFamily="18" charset="0"/>
+                              </a:rPr>
+                              <m:t>𝑠</m:t>
+                            </m:r>
+                          </m:e>
+                          <m:sub>
+                            <m:r>
+                              <a:rPr lang="de-DE" b="0" i="1" smtClean="0">
+                                <a:latin typeface="Cambria Math" panose="02040503050406030204" pitchFamily="18" charset="0"/>
+                              </a:rPr>
+                              <m:t>2</m:t>
+                            </m:r>
+                          </m:sub>
+                        </m:sSub>
+                      </m:oMath>
+                    </m:oMathPara>
+                  </a14:m>
+                  <a:endParaRPr lang="en-US" dirty="0"/>
+                </a:p>
+              </p:txBody>
+            </p:sp>
+          </mc:Choice>
+          <mc:Fallback>
+            <p:sp>
+              <p:nvSpPr>
+                <p:cNvPr id="5" name="Rectangle: Rounded Corners 4">
+                  <a:extLst>
+                    <a:ext uri="{FF2B5EF4-FFF2-40B4-BE49-F238E27FC236}">
+                      <a16:creationId xmlns:a16="http://schemas.microsoft.com/office/drawing/2014/main" id="{DB485A95-4147-E95A-762D-B5CBCD3B5BED}"/>
+                    </a:ext>
+                  </a:extLst>
+                </p:cNvPr>
+                <p:cNvSpPr>
+                  <a:spLocks noRot="1" noChangeAspect="1" noMove="1" noResize="1" noEditPoints="1" noAdjustHandles="1" noChangeArrowheads="1" noChangeShapeType="1" noTextEdit="1"/>
+                </p:cNvSpPr>
+                <p:nvPr/>
+              </p:nvSpPr>
+              <p:spPr>
+                <a:xfrm>
+                  <a:off x="1513840" y="3158858"/>
+                  <a:ext cx="2021840" cy="386080"/>
+                </a:xfrm>
+                <a:prstGeom prst="roundRect">
+                  <a:avLst/>
+                </a:prstGeom>
+                <a:blipFill>
+                  <a:blip r:embed="rId3"/>
+                  <a:stretch>
+                    <a:fillRect/>
+                  </a:stretch>
+                </a:blipFill>
+                <a:ln w="19050">
+                  <a:solidFill>
+                    <a:schemeClr val="accent1"/>
+                  </a:solidFill>
+                </a:ln>
+              </p:spPr>
+              <p:txBody>
+                <a:bodyPr/>
+                <a:lstStyle/>
+                <a:p>
+                  <a:r>
+                    <a:rPr lang="en-US">
+                      <a:noFill/>
+                    </a:rPr>
+                    <a:t> </a:t>
+                  </a:r>
+                </a:p>
+              </p:txBody>
+            </p:sp>
+          </mc:Fallback>
+        </mc:AlternateContent>
+        <mc:AlternateContent xmlns:mc="http://schemas.openxmlformats.org/markup-compatibility/2006">
+          <mc:Choice xmlns:a14="http://schemas.microsoft.com/office/drawing/2010/main" Requires="a14">
+            <p:sp>
+              <p:nvSpPr>
+                <p:cNvPr id="6" name="Rectangle: Rounded Corners 5">
+                  <a:extLst>
+                    <a:ext uri="{FF2B5EF4-FFF2-40B4-BE49-F238E27FC236}">
+                      <a16:creationId xmlns:a16="http://schemas.microsoft.com/office/drawing/2014/main" id="{7EAAFC77-52BB-3197-35C6-D00E9AFE26E7}"/>
+                    </a:ext>
+                  </a:extLst>
+                </p:cNvPr>
+                <p:cNvSpPr/>
+                <p:nvPr/>
+              </p:nvSpPr>
+              <p:spPr>
+                <a:xfrm>
+                  <a:off x="2174240" y="4160197"/>
+                  <a:ext cx="965200" cy="386080"/>
+                </a:xfrm>
+                <a:prstGeom prst="roundRect">
+                  <a:avLst/>
+                </a:prstGeom>
+                <a:ln w="19050">
+                  <a:solidFill>
+                    <a:schemeClr val="accent1"/>
+                  </a:solidFill>
+                </a:ln>
+              </p:spPr>
+              <p:style>
+                <a:lnRef idx="2">
+                  <a:schemeClr val="accent1"/>
+                </a:lnRef>
+                <a:fillRef idx="1">
+                  <a:schemeClr val="lt1"/>
+                </a:fillRef>
+                <a:effectRef idx="0">
+                  <a:schemeClr val="accent1"/>
+                </a:effectRef>
+                <a:fontRef idx="minor">
+                  <a:schemeClr val="dk1"/>
+                </a:fontRef>
+              </p:style>
+              <p:txBody>
+                <a:bodyPr rtlCol="0" anchor="ctr"/>
+                <a:lstStyle/>
+                <a:p>
+                  <a:pPr algn="ctr"/>
+                  <a14:m>
+                    <m:oMathPara xmlns:m="http://schemas.openxmlformats.org/officeDocument/2006/math">
+                      <m:oMathParaPr>
+                        <m:jc m:val="left"/>
+                      </m:oMathParaPr>
+                      <m:oMath xmlns:m="http://schemas.openxmlformats.org/officeDocument/2006/math">
+                        <m:sSub>
+                          <m:sSubPr>
+                            <m:ctrlPr>
+                              <a:rPr lang="de-DE" b="0" i="1" smtClean="0">
+                                <a:latin typeface="Cambria Math" panose="02040503050406030204" pitchFamily="18" charset="0"/>
+                              </a:rPr>
+                            </m:ctrlPr>
+                          </m:sSubPr>
+                          <m:e>
+                            <m:r>
+                              <a:rPr lang="de-DE" b="0" i="1" smtClean="0">
+                                <a:latin typeface="Cambria Math" panose="02040503050406030204" pitchFamily="18" charset="0"/>
+                              </a:rPr>
+                              <m:t>𝑠</m:t>
+                            </m:r>
+                          </m:e>
+                          <m:sub>
+                            <m:r>
+                              <a:rPr lang="de-DE" b="0" i="1" smtClean="0">
+                                <a:latin typeface="Cambria Math" panose="02040503050406030204" pitchFamily="18" charset="0"/>
+                              </a:rPr>
+                              <m:t>3</m:t>
+                            </m:r>
+                          </m:sub>
+                        </m:sSub>
+                      </m:oMath>
+                    </m:oMathPara>
+                  </a14:m>
+                  <a:endParaRPr lang="en-US" dirty="0"/>
+                </a:p>
+              </p:txBody>
+            </p:sp>
+          </mc:Choice>
+          <mc:Fallback>
+            <p:sp>
+              <p:nvSpPr>
+                <p:cNvPr id="6" name="Rectangle: Rounded Corners 5">
+                  <a:extLst>
+                    <a:ext uri="{FF2B5EF4-FFF2-40B4-BE49-F238E27FC236}">
+                      <a16:creationId xmlns:a16="http://schemas.microsoft.com/office/drawing/2014/main" id="{7EAAFC77-52BB-3197-35C6-D00E9AFE26E7}"/>
+                    </a:ext>
+                  </a:extLst>
+                </p:cNvPr>
+                <p:cNvSpPr>
+                  <a:spLocks noRot="1" noChangeAspect="1" noMove="1" noResize="1" noEditPoints="1" noAdjustHandles="1" noChangeArrowheads="1" noChangeShapeType="1" noTextEdit="1"/>
+                </p:cNvSpPr>
+                <p:nvPr/>
+              </p:nvSpPr>
+              <p:spPr>
+                <a:xfrm>
+                  <a:off x="2174240" y="4160197"/>
+                  <a:ext cx="965200" cy="386080"/>
+                </a:xfrm>
+                <a:prstGeom prst="roundRect">
+                  <a:avLst/>
+                </a:prstGeom>
+                <a:blipFill>
+                  <a:blip r:embed="rId4"/>
+                  <a:stretch>
+                    <a:fillRect/>
+                  </a:stretch>
+                </a:blipFill>
+                <a:ln w="19050">
+                  <a:solidFill>
+                    <a:schemeClr val="accent1"/>
+                  </a:solidFill>
+                </a:ln>
+              </p:spPr>
+              <p:txBody>
+                <a:bodyPr/>
+                <a:lstStyle/>
+                <a:p>
+                  <a:r>
+                    <a:rPr lang="en-US">
+                      <a:noFill/>
+                    </a:rPr>
+                    <a:t> </a:t>
+                  </a:r>
+                </a:p>
+              </p:txBody>
+            </p:sp>
+          </mc:Fallback>
+        </mc:AlternateContent>
+        <mc:AlternateContent xmlns:mc="http://schemas.openxmlformats.org/markup-compatibility/2006">
+          <mc:Choice xmlns:a14="http://schemas.microsoft.com/office/drawing/2010/main" Requires="a14">
+            <p:sp>
+              <p:nvSpPr>
+                <p:cNvPr id="7" name="Rectangle: Rounded Corners 6">
+                  <a:extLst>
+                    <a:ext uri="{FF2B5EF4-FFF2-40B4-BE49-F238E27FC236}">
+                      <a16:creationId xmlns:a16="http://schemas.microsoft.com/office/drawing/2014/main" id="{A16533D4-87B6-20C9-BB8C-E50BA29A1D1E}"/>
+                    </a:ext>
+                  </a:extLst>
+                </p:cNvPr>
+                <p:cNvSpPr/>
+                <p:nvPr/>
+              </p:nvSpPr>
+              <p:spPr>
+                <a:xfrm>
+                  <a:off x="2305551" y="5140961"/>
+                  <a:ext cx="1767840" cy="386080"/>
+                </a:xfrm>
+                <a:prstGeom prst="roundRect">
+                  <a:avLst/>
+                </a:prstGeom>
+                <a:ln w="19050">
+                  <a:solidFill>
+                    <a:schemeClr val="accent1"/>
+                  </a:solidFill>
+                </a:ln>
+              </p:spPr>
+              <p:style>
+                <a:lnRef idx="2">
+                  <a:schemeClr val="accent1"/>
+                </a:lnRef>
+                <a:fillRef idx="1">
+                  <a:schemeClr val="lt1"/>
+                </a:fillRef>
+                <a:effectRef idx="0">
+                  <a:schemeClr val="accent1"/>
+                </a:effectRef>
+                <a:fontRef idx="minor">
+                  <a:schemeClr val="dk1"/>
+                </a:fontRef>
+              </p:style>
+              <p:txBody>
+                <a:bodyPr rtlCol="0" anchor="ctr"/>
+                <a:lstStyle/>
+                <a:p>
+                  <a:pPr algn="ctr"/>
+                  <a14:m>
+                    <m:oMathPara xmlns:m="http://schemas.openxmlformats.org/officeDocument/2006/math">
+                      <m:oMathParaPr>
+                        <m:jc m:val="left"/>
+                      </m:oMathParaPr>
+                      <m:oMath xmlns:m="http://schemas.openxmlformats.org/officeDocument/2006/math">
+                        <m:sSub>
+                          <m:sSubPr>
+                            <m:ctrlPr>
+                              <a:rPr lang="de-DE" b="0" i="1" smtClean="0">
+                                <a:latin typeface="Cambria Math" panose="02040503050406030204" pitchFamily="18" charset="0"/>
+                              </a:rPr>
+                            </m:ctrlPr>
+                          </m:sSubPr>
+                          <m:e>
+                            <m:r>
+                              <a:rPr lang="de-DE" b="0" i="1" smtClean="0">
+                                <a:latin typeface="Cambria Math" panose="02040503050406030204" pitchFamily="18" charset="0"/>
+                              </a:rPr>
+                              <m:t>𝑠</m:t>
+                            </m:r>
+                          </m:e>
+                          <m:sub>
+                            <m:r>
+                              <a:rPr lang="de-DE" b="0" i="1" smtClean="0">
+                                <a:latin typeface="Cambria Math" panose="02040503050406030204" pitchFamily="18" charset="0"/>
+                              </a:rPr>
+                              <m:t>4</m:t>
+                            </m:r>
+                          </m:sub>
+                        </m:sSub>
+                      </m:oMath>
+                    </m:oMathPara>
+                  </a14:m>
+                  <a:endParaRPr lang="en-US" dirty="0"/>
+                </a:p>
+              </p:txBody>
+            </p:sp>
+          </mc:Choice>
+          <mc:Fallback>
+            <p:sp>
+              <p:nvSpPr>
+                <p:cNvPr id="7" name="Rectangle: Rounded Corners 6">
+                  <a:extLst>
+                    <a:ext uri="{FF2B5EF4-FFF2-40B4-BE49-F238E27FC236}">
+                      <a16:creationId xmlns:a16="http://schemas.microsoft.com/office/drawing/2014/main" id="{A16533D4-87B6-20C9-BB8C-E50BA29A1D1E}"/>
+                    </a:ext>
+                  </a:extLst>
+                </p:cNvPr>
+                <p:cNvSpPr>
+                  <a:spLocks noRot="1" noChangeAspect="1" noMove="1" noResize="1" noEditPoints="1" noAdjustHandles="1" noChangeArrowheads="1" noChangeShapeType="1" noTextEdit="1"/>
+                </p:cNvSpPr>
+                <p:nvPr/>
+              </p:nvSpPr>
+              <p:spPr>
+                <a:xfrm>
+                  <a:off x="2305551" y="5140961"/>
+                  <a:ext cx="1767840" cy="386080"/>
+                </a:xfrm>
+                <a:prstGeom prst="roundRect">
+                  <a:avLst/>
+                </a:prstGeom>
+                <a:blipFill>
+                  <a:blip r:embed="rId5"/>
+                  <a:stretch>
+                    <a:fillRect/>
+                  </a:stretch>
+                </a:blipFill>
+                <a:ln w="19050">
+                  <a:solidFill>
+                    <a:schemeClr val="accent1"/>
+                  </a:solidFill>
+                </a:ln>
+              </p:spPr>
+              <p:txBody>
+                <a:bodyPr/>
+                <a:lstStyle/>
+                <a:p>
+                  <a:r>
+                    <a:rPr lang="en-US">
+                      <a:noFill/>
+                    </a:rPr>
+                    <a:t> </a:t>
+                  </a:r>
+                </a:p>
+              </p:txBody>
+            </p:sp>
+          </mc:Fallback>
+        </mc:AlternateContent>
+        <p:sp>
+          <p:nvSpPr>
+            <p:cNvPr id="8" name="Right Brace 7">
+              <a:extLst>
+                <a:ext uri="{FF2B5EF4-FFF2-40B4-BE49-F238E27FC236}">
+                  <a16:creationId xmlns:a16="http://schemas.microsoft.com/office/drawing/2014/main" id="{8735DE98-52DA-3E7A-5189-260DCD77C9E5}"/>
+                </a:ext>
+              </a:extLst>
+            </p:cNvPr>
+            <p:cNvSpPr/>
+            <p:nvPr/>
+          </p:nvSpPr>
+          <p:spPr>
+            <a:xfrm rot="16200000">
+              <a:off x="3007360" y="751840"/>
+              <a:ext cx="264160" cy="2418080"/>
+            </a:xfrm>
+            <a:prstGeom prst="rightBrace">
+              <a:avLst/>
+            </a:prstGeom>
+            <a:ln>
+              <a:solidFill>
+                <a:schemeClr val="accent1"/>
+              </a:solidFill>
+            </a:ln>
+          </p:spPr>
+          <p:style>
+            <a:lnRef idx="1">
+              <a:schemeClr val="accent1"/>
+            </a:lnRef>
+            <a:fillRef idx="0">
+              <a:schemeClr val="accent1"/>
+            </a:fillRef>
+            <a:effectRef idx="0">
+              <a:schemeClr val="accent1"/>
+            </a:effectRef>
+            <a:fontRef idx="minor">
+              <a:schemeClr val="tx1"/>
+            </a:fontRef>
+          </p:style>
+          <p:txBody>
+            <a:bodyPr rtlCol="0" anchor="ctr"/>
+            <a:lstStyle/>
+            <a:p>
+              <a:pPr algn="ctr"/>
+              <a:endParaRPr lang="en-US"/>
+            </a:p>
+          </p:txBody>
+        </p:sp>
+        <mc:AlternateContent xmlns:mc="http://schemas.openxmlformats.org/markup-compatibility/2006">
+          <mc:Choice xmlns:a14="http://schemas.microsoft.com/office/drawing/2010/main" Requires="a14">
+            <p:sp>
+              <p:nvSpPr>
+                <p:cNvPr id="10" name="TextBox 9">
+                  <a:extLst>
+                    <a:ext uri="{FF2B5EF4-FFF2-40B4-BE49-F238E27FC236}">
+                      <a16:creationId xmlns:a16="http://schemas.microsoft.com/office/drawing/2014/main" id="{0E298DF7-3858-4CF1-CB50-A9136952B3F3}"/>
+                    </a:ext>
+                  </a:extLst>
+                </p:cNvPr>
+                <p:cNvSpPr txBox="1"/>
+                <p:nvPr/>
+              </p:nvSpPr>
+              <p:spPr>
+                <a:xfrm>
+                  <a:off x="2865120" y="1523999"/>
+                  <a:ext cx="548640" cy="369332"/>
+                </a:xfrm>
+                <a:prstGeom prst="rect">
+                  <a:avLst/>
+                </a:prstGeom>
+                <a:noFill/>
+              </p:spPr>
+              <p:txBody>
+                <a:bodyPr wrap="square">
+                  <a:spAutoFit/>
+                </a:bodyPr>
+                <a:lstStyle/>
+                <a:p>
+                  <a:pPr/>
+                  <a14:m>
+                    <m:oMathPara xmlns:m="http://schemas.openxmlformats.org/officeDocument/2006/math">
+                      <m:oMathParaPr>
+                        <m:jc m:val="centerGroup"/>
+                      </m:oMathParaPr>
+                      <m:oMath xmlns:m="http://schemas.openxmlformats.org/officeDocument/2006/math">
+                        <m:sSub>
+                          <m:sSubPr>
+                            <m:ctrlPr>
+                              <a:rPr lang="de-DE" b="0" i="1" smtClean="0">
+                                <a:latin typeface="Cambria Math" panose="02040503050406030204" pitchFamily="18" charset="0"/>
+                              </a:rPr>
+                            </m:ctrlPr>
+                          </m:sSubPr>
+                          <m:e>
+                            <m:r>
+                              <a:rPr lang="de-DE" b="0" i="1" smtClean="0">
+                                <a:latin typeface="Cambria Math" panose="02040503050406030204" pitchFamily="18" charset="0"/>
+                              </a:rPr>
+                              <m:t>𝑑</m:t>
+                            </m:r>
+                          </m:e>
+                          <m:sub>
+                            <m:r>
+                              <a:rPr lang="de-DE" b="0" i="1" smtClean="0">
+                                <a:latin typeface="Cambria Math" panose="02040503050406030204" pitchFamily="18" charset="0"/>
+                              </a:rPr>
+                              <m:t>1</m:t>
+                            </m:r>
+                          </m:sub>
+                        </m:sSub>
+                      </m:oMath>
+                    </m:oMathPara>
+                  </a14:m>
+                  <a:endParaRPr lang="en-US" dirty="0"/>
+                </a:p>
+              </p:txBody>
+            </p:sp>
+          </mc:Choice>
+          <mc:Fallback>
+            <p:sp>
+              <p:nvSpPr>
+                <p:cNvPr id="10" name="TextBox 9">
+                  <a:extLst>
+                    <a:ext uri="{FF2B5EF4-FFF2-40B4-BE49-F238E27FC236}">
+                      <a16:creationId xmlns:a16="http://schemas.microsoft.com/office/drawing/2014/main" id="{0E298DF7-3858-4CF1-CB50-A9136952B3F3}"/>
+                    </a:ext>
+                  </a:extLst>
+                </p:cNvPr>
+                <p:cNvSpPr txBox="1">
+                  <a:spLocks noRot="1" noChangeAspect="1" noMove="1" noResize="1" noEditPoints="1" noAdjustHandles="1" noChangeArrowheads="1" noChangeShapeType="1" noTextEdit="1"/>
+                </p:cNvSpPr>
+                <p:nvPr/>
+              </p:nvSpPr>
+              <p:spPr>
+                <a:xfrm>
+                  <a:off x="2865120" y="1523999"/>
+                  <a:ext cx="548640" cy="369332"/>
+                </a:xfrm>
+                <a:prstGeom prst="rect">
+                  <a:avLst/>
+                </a:prstGeom>
+                <a:blipFill>
+                  <a:blip r:embed="rId6"/>
+                  <a:stretch>
+                    <a:fillRect/>
+                  </a:stretch>
+                </a:blipFill>
+              </p:spPr>
+              <p:txBody>
+                <a:bodyPr/>
+                <a:lstStyle/>
+                <a:p>
+                  <a:r>
+                    <a:rPr lang="en-US">
+                      <a:noFill/>
+                    </a:rPr>
+                    <a:t> </a:t>
+                  </a:r>
+                </a:p>
+              </p:txBody>
+            </p:sp>
+          </mc:Fallback>
+        </mc:AlternateContent>
+        <p:sp>
+          <p:nvSpPr>
+            <p:cNvPr id="11" name="Right Brace 10">
+              <a:extLst>
+                <a:ext uri="{FF2B5EF4-FFF2-40B4-BE49-F238E27FC236}">
+                  <a16:creationId xmlns:a16="http://schemas.microsoft.com/office/drawing/2014/main" id="{35B440A9-594C-A6B4-B540-B8EDA9F9308D}"/>
+                </a:ext>
+              </a:extLst>
+            </p:cNvPr>
+            <p:cNvSpPr/>
+            <p:nvPr/>
+          </p:nvSpPr>
+          <p:spPr>
+            <a:xfrm rot="16200000">
+              <a:off x="2392680" y="1975218"/>
+              <a:ext cx="264160" cy="2021840"/>
+            </a:xfrm>
+            <a:prstGeom prst="rightBrace">
+              <a:avLst/>
+            </a:prstGeom>
+            <a:ln>
+              <a:solidFill>
+                <a:schemeClr val="accent1"/>
+              </a:solidFill>
+            </a:ln>
+          </p:spPr>
+          <p:style>
+            <a:lnRef idx="1">
+              <a:schemeClr val="accent1"/>
+            </a:lnRef>
+            <a:fillRef idx="0">
+              <a:schemeClr val="accent1"/>
+            </a:fillRef>
+            <a:effectRef idx="0">
+              <a:schemeClr val="accent1"/>
+            </a:effectRef>
+            <a:fontRef idx="minor">
+              <a:schemeClr val="tx1"/>
+            </a:fontRef>
+          </p:style>
+          <p:txBody>
+            <a:bodyPr rtlCol="0" anchor="ctr"/>
+            <a:lstStyle/>
+            <a:p>
+              <a:pPr algn="ctr"/>
+              <a:endParaRPr lang="en-US"/>
+            </a:p>
+          </p:txBody>
+        </p:sp>
+        <mc:AlternateContent xmlns:mc="http://schemas.openxmlformats.org/markup-compatibility/2006">
+          <mc:Choice xmlns:a14="http://schemas.microsoft.com/office/drawing/2010/main" Requires="a14">
+            <p:sp>
+              <p:nvSpPr>
+                <p:cNvPr id="12" name="TextBox 11">
+                  <a:extLst>
+                    <a:ext uri="{FF2B5EF4-FFF2-40B4-BE49-F238E27FC236}">
+                      <a16:creationId xmlns:a16="http://schemas.microsoft.com/office/drawing/2014/main" id="{D7FD950E-C571-1DC4-D266-3DEB0DDCB1B5}"/>
+                    </a:ext>
+                  </a:extLst>
+                </p:cNvPr>
+                <p:cNvSpPr txBox="1"/>
+                <p:nvPr/>
+              </p:nvSpPr>
+              <p:spPr>
+                <a:xfrm>
+                  <a:off x="2305551" y="2549257"/>
+                  <a:ext cx="458737" cy="369332"/>
+                </a:xfrm>
+                <a:prstGeom prst="rect">
+                  <a:avLst/>
+                </a:prstGeom>
+                <a:noFill/>
+              </p:spPr>
+              <p:txBody>
+                <a:bodyPr wrap="square">
+                  <a:spAutoFit/>
+                </a:bodyPr>
+                <a:lstStyle/>
+                <a:p>
+                  <a:pPr/>
+                  <a14:m>
+                    <m:oMathPara xmlns:m="http://schemas.openxmlformats.org/officeDocument/2006/math">
+                      <m:oMathParaPr>
+                        <m:jc m:val="centerGroup"/>
+                      </m:oMathParaPr>
+                      <m:oMath xmlns:m="http://schemas.openxmlformats.org/officeDocument/2006/math">
+                        <m:sSub>
+                          <m:sSubPr>
+                            <m:ctrlPr>
+                              <a:rPr lang="de-DE" b="0" i="1" smtClean="0">
+                                <a:latin typeface="Cambria Math" panose="02040503050406030204" pitchFamily="18" charset="0"/>
+                              </a:rPr>
+                            </m:ctrlPr>
+                          </m:sSubPr>
+                          <m:e>
+                            <m:r>
+                              <a:rPr lang="de-DE" b="0" i="1" smtClean="0">
+                                <a:latin typeface="Cambria Math" panose="02040503050406030204" pitchFamily="18" charset="0"/>
+                              </a:rPr>
+                              <m:t>𝑑</m:t>
+                            </m:r>
+                          </m:e>
+                          <m:sub>
+                            <m:r>
+                              <a:rPr lang="de-DE" b="0" i="1" smtClean="0">
+                                <a:latin typeface="Cambria Math" panose="02040503050406030204" pitchFamily="18" charset="0"/>
+                              </a:rPr>
+                              <m:t>2</m:t>
+                            </m:r>
+                          </m:sub>
+                        </m:sSub>
+                      </m:oMath>
+                    </m:oMathPara>
+                  </a14:m>
+                  <a:endParaRPr lang="en-US" dirty="0"/>
+                </a:p>
+              </p:txBody>
+            </p:sp>
+          </mc:Choice>
+          <mc:Fallback>
+            <p:sp>
+              <p:nvSpPr>
+                <p:cNvPr id="12" name="TextBox 11">
+                  <a:extLst>
+                    <a:ext uri="{FF2B5EF4-FFF2-40B4-BE49-F238E27FC236}">
+                      <a16:creationId xmlns:a16="http://schemas.microsoft.com/office/drawing/2014/main" id="{D7FD950E-C571-1DC4-D266-3DEB0DDCB1B5}"/>
+                    </a:ext>
+                  </a:extLst>
+                </p:cNvPr>
+                <p:cNvSpPr txBox="1">
+                  <a:spLocks noRot="1" noChangeAspect="1" noMove="1" noResize="1" noEditPoints="1" noAdjustHandles="1" noChangeArrowheads="1" noChangeShapeType="1" noTextEdit="1"/>
+                </p:cNvSpPr>
+                <p:nvPr/>
+              </p:nvSpPr>
+              <p:spPr>
+                <a:xfrm>
+                  <a:off x="2305551" y="2549257"/>
+                  <a:ext cx="458737" cy="369332"/>
+                </a:xfrm>
+                <a:prstGeom prst="rect">
+                  <a:avLst/>
+                </a:prstGeom>
+                <a:blipFill>
+                  <a:blip r:embed="rId7"/>
+                  <a:stretch>
+                    <a:fillRect/>
+                  </a:stretch>
+                </a:blipFill>
+              </p:spPr>
+              <p:txBody>
+                <a:bodyPr/>
+                <a:lstStyle/>
+                <a:p>
+                  <a:r>
+                    <a:rPr lang="en-US">
+                      <a:noFill/>
+                    </a:rPr>
+                    <a:t> </a:t>
+                  </a:r>
+                </a:p>
+              </p:txBody>
+            </p:sp>
+          </mc:Fallback>
+        </mc:AlternateContent>
+        <p:sp>
+          <p:nvSpPr>
+            <p:cNvPr id="13" name="Right Brace 12">
+              <a:extLst>
+                <a:ext uri="{FF2B5EF4-FFF2-40B4-BE49-F238E27FC236}">
+                  <a16:creationId xmlns:a16="http://schemas.microsoft.com/office/drawing/2014/main" id="{FB1A32A9-9402-57C2-C6EE-E1860060D466}"/>
+                </a:ext>
+              </a:extLst>
+            </p:cNvPr>
+            <p:cNvSpPr/>
+            <p:nvPr/>
+          </p:nvSpPr>
+          <p:spPr>
+            <a:xfrm rot="16200000">
+              <a:off x="2524760" y="3504878"/>
+              <a:ext cx="264160" cy="965200"/>
+            </a:xfrm>
+            <a:prstGeom prst="rightBrace">
+              <a:avLst/>
+            </a:prstGeom>
+            <a:ln>
+              <a:solidFill>
+                <a:schemeClr val="accent1"/>
+              </a:solidFill>
+            </a:ln>
+          </p:spPr>
+          <p:style>
+            <a:lnRef idx="1">
+              <a:schemeClr val="accent1"/>
+            </a:lnRef>
+            <a:fillRef idx="0">
+              <a:schemeClr val="accent1"/>
+            </a:fillRef>
+            <a:effectRef idx="0">
+              <a:schemeClr val="accent1"/>
+            </a:effectRef>
+            <a:fontRef idx="minor">
+              <a:schemeClr val="tx1"/>
+            </a:fontRef>
+          </p:style>
+          <p:txBody>
+            <a:bodyPr rtlCol="0" anchor="ctr"/>
+            <a:lstStyle/>
+            <a:p>
+              <a:pPr algn="ctr"/>
+              <a:endParaRPr lang="en-US"/>
+            </a:p>
+          </p:txBody>
+        </p:sp>
+        <mc:AlternateContent xmlns:mc="http://schemas.openxmlformats.org/markup-compatibility/2006">
+          <mc:Choice xmlns:a14="http://schemas.microsoft.com/office/drawing/2010/main" Requires="a14">
+            <p:sp>
+              <p:nvSpPr>
+                <p:cNvPr id="14" name="TextBox 13">
+                  <a:extLst>
+                    <a:ext uri="{FF2B5EF4-FFF2-40B4-BE49-F238E27FC236}">
+                      <a16:creationId xmlns:a16="http://schemas.microsoft.com/office/drawing/2014/main" id="{7DB0A420-8E52-CA76-F50D-A3ECC408F7DB}"/>
+                    </a:ext>
+                  </a:extLst>
+                </p:cNvPr>
+                <p:cNvSpPr txBox="1"/>
+                <p:nvPr/>
+              </p:nvSpPr>
+              <p:spPr>
+                <a:xfrm>
+                  <a:off x="2469896" y="3570317"/>
+                  <a:ext cx="218995" cy="369332"/>
+                </a:xfrm>
+                <a:prstGeom prst="rect">
+                  <a:avLst/>
+                </a:prstGeom>
+                <a:noFill/>
+              </p:spPr>
+              <p:txBody>
+                <a:bodyPr wrap="square">
+                  <a:spAutoFit/>
+                </a:bodyPr>
+                <a:lstStyle/>
+                <a:p>
+                  <a:pPr/>
+                  <a14:m>
+                    <m:oMathPara xmlns:m="http://schemas.openxmlformats.org/officeDocument/2006/math">
+                      <m:oMathParaPr>
+                        <m:jc m:val="centerGroup"/>
+                      </m:oMathParaPr>
+                      <m:oMath xmlns:m="http://schemas.openxmlformats.org/officeDocument/2006/math">
+                        <m:sSub>
+                          <m:sSubPr>
+                            <m:ctrlPr>
+                              <a:rPr lang="de-DE" b="0" i="1" smtClean="0">
+                                <a:latin typeface="Cambria Math" panose="02040503050406030204" pitchFamily="18" charset="0"/>
+                              </a:rPr>
+                            </m:ctrlPr>
+                          </m:sSubPr>
+                          <m:e>
+                            <m:r>
+                              <a:rPr lang="de-DE" b="0" i="1" smtClean="0">
+                                <a:latin typeface="Cambria Math" panose="02040503050406030204" pitchFamily="18" charset="0"/>
+                              </a:rPr>
+                              <m:t>𝑑</m:t>
+                            </m:r>
+                          </m:e>
+                          <m:sub>
+                            <m:r>
+                              <a:rPr lang="de-DE" b="0" i="1" smtClean="0">
+                                <a:latin typeface="Cambria Math" panose="02040503050406030204" pitchFamily="18" charset="0"/>
+                              </a:rPr>
+                              <m:t>3</m:t>
+                            </m:r>
+                          </m:sub>
+                        </m:sSub>
+                      </m:oMath>
+                    </m:oMathPara>
+                  </a14:m>
+                  <a:endParaRPr lang="en-US" dirty="0"/>
+                </a:p>
+              </p:txBody>
+            </p:sp>
+          </mc:Choice>
+          <mc:Fallback>
+            <p:sp>
+              <p:nvSpPr>
+                <p:cNvPr id="14" name="TextBox 13">
+                  <a:extLst>
+                    <a:ext uri="{FF2B5EF4-FFF2-40B4-BE49-F238E27FC236}">
+                      <a16:creationId xmlns:a16="http://schemas.microsoft.com/office/drawing/2014/main" id="{7DB0A420-8E52-CA76-F50D-A3ECC408F7DB}"/>
+                    </a:ext>
+                  </a:extLst>
+                </p:cNvPr>
+                <p:cNvSpPr txBox="1">
+                  <a:spLocks noRot="1" noChangeAspect="1" noMove="1" noResize="1" noEditPoints="1" noAdjustHandles="1" noChangeArrowheads="1" noChangeShapeType="1" noTextEdit="1"/>
+                </p:cNvSpPr>
+                <p:nvPr/>
+              </p:nvSpPr>
+              <p:spPr>
+                <a:xfrm>
+                  <a:off x="2469896" y="3570317"/>
+                  <a:ext cx="218995" cy="369332"/>
+                </a:xfrm>
+                <a:prstGeom prst="rect">
+                  <a:avLst/>
+                </a:prstGeom>
+                <a:blipFill>
+                  <a:blip r:embed="rId8"/>
+                  <a:stretch>
+                    <a:fillRect r="-75000"/>
+                  </a:stretch>
+                </a:blipFill>
+              </p:spPr>
+              <p:txBody>
+                <a:bodyPr/>
+                <a:lstStyle/>
+                <a:p>
+                  <a:r>
+                    <a:rPr lang="en-US">
+                      <a:noFill/>
+                    </a:rPr>
+                    <a:t> </a:t>
+                  </a:r>
+                </a:p>
+              </p:txBody>
+            </p:sp>
+          </mc:Fallback>
+        </mc:AlternateContent>
+        <p:sp>
+          <p:nvSpPr>
+            <p:cNvPr id="15" name="Right Brace 14">
+              <a:extLst>
+                <a:ext uri="{FF2B5EF4-FFF2-40B4-BE49-F238E27FC236}">
+                  <a16:creationId xmlns:a16="http://schemas.microsoft.com/office/drawing/2014/main" id="{880F96E9-48A0-169E-E452-FB433FB45F53}"/>
+                </a:ext>
+              </a:extLst>
+            </p:cNvPr>
+            <p:cNvSpPr/>
+            <p:nvPr/>
+          </p:nvSpPr>
+          <p:spPr>
+            <a:xfrm rot="16200000">
+              <a:off x="3057391" y="4077131"/>
+              <a:ext cx="264160" cy="1767840"/>
+            </a:xfrm>
+            <a:prstGeom prst="rightBrace">
+              <a:avLst/>
+            </a:prstGeom>
+            <a:ln>
+              <a:solidFill>
+                <a:schemeClr val="accent1"/>
+              </a:solidFill>
+            </a:ln>
+          </p:spPr>
+          <p:style>
+            <a:lnRef idx="1">
+              <a:schemeClr val="accent1"/>
+            </a:lnRef>
+            <a:fillRef idx="0">
+              <a:schemeClr val="accent1"/>
+            </a:fillRef>
+            <a:effectRef idx="0">
+              <a:schemeClr val="accent1"/>
+            </a:effectRef>
+            <a:fontRef idx="minor">
+              <a:schemeClr val="tx1"/>
+            </a:fontRef>
+          </p:style>
+          <p:txBody>
+            <a:bodyPr rtlCol="0" anchor="ctr"/>
+            <a:lstStyle/>
+            <a:p>
+              <a:pPr algn="ctr"/>
+              <a:endParaRPr lang="en-US"/>
+            </a:p>
+          </p:txBody>
+        </p:sp>
+        <mc:AlternateContent xmlns:mc="http://schemas.openxmlformats.org/markup-compatibility/2006">
+          <mc:Choice xmlns:a14="http://schemas.microsoft.com/office/drawing/2010/main" Requires="a14">
+            <p:sp>
+              <p:nvSpPr>
+                <p:cNvPr id="16" name="TextBox 15">
+                  <a:extLst>
+                    <a:ext uri="{FF2B5EF4-FFF2-40B4-BE49-F238E27FC236}">
+                      <a16:creationId xmlns:a16="http://schemas.microsoft.com/office/drawing/2014/main" id="{48339E63-5E8C-6CAF-C521-074F9A967D6E}"/>
+                    </a:ext>
+                  </a:extLst>
+                </p:cNvPr>
+                <p:cNvSpPr txBox="1"/>
+                <p:nvPr/>
+              </p:nvSpPr>
+              <p:spPr>
+                <a:xfrm>
+                  <a:off x="2988917" y="4546277"/>
+                  <a:ext cx="401107" cy="369332"/>
+                </a:xfrm>
+                <a:prstGeom prst="rect">
+                  <a:avLst/>
+                </a:prstGeom>
+                <a:noFill/>
+              </p:spPr>
+              <p:txBody>
+                <a:bodyPr wrap="square">
+                  <a:spAutoFit/>
+                </a:bodyPr>
+                <a:lstStyle/>
+                <a:p>
+                  <a:pPr/>
+                  <a14:m>
+                    <m:oMathPara xmlns:m="http://schemas.openxmlformats.org/officeDocument/2006/math">
+                      <m:oMathParaPr>
+                        <m:jc m:val="centerGroup"/>
+                      </m:oMathParaPr>
+                      <m:oMath xmlns:m="http://schemas.openxmlformats.org/officeDocument/2006/math">
+                        <m:sSub>
+                          <m:sSubPr>
+                            <m:ctrlPr>
+                              <a:rPr lang="de-DE" b="0" i="1" smtClean="0">
+                                <a:latin typeface="Cambria Math" panose="02040503050406030204" pitchFamily="18" charset="0"/>
+                              </a:rPr>
+                            </m:ctrlPr>
+                          </m:sSubPr>
+                          <m:e>
+                            <m:r>
+                              <a:rPr lang="de-DE" b="0" i="1" smtClean="0">
+                                <a:latin typeface="Cambria Math" panose="02040503050406030204" pitchFamily="18" charset="0"/>
+                              </a:rPr>
+                              <m:t>𝑑</m:t>
+                            </m:r>
+                          </m:e>
+                          <m:sub>
+                            <m:r>
+                              <a:rPr lang="de-DE" b="0" i="1" smtClean="0">
+                                <a:latin typeface="Cambria Math" panose="02040503050406030204" pitchFamily="18" charset="0"/>
+                              </a:rPr>
+                              <m:t>4</m:t>
+                            </m:r>
+                          </m:sub>
+                        </m:sSub>
+                      </m:oMath>
+                    </m:oMathPara>
+                  </a14:m>
+                  <a:endParaRPr lang="en-US" dirty="0"/>
+                </a:p>
+              </p:txBody>
+            </p:sp>
+          </mc:Choice>
+          <mc:Fallback>
+            <p:sp>
+              <p:nvSpPr>
+                <p:cNvPr id="16" name="TextBox 15">
+                  <a:extLst>
+                    <a:ext uri="{FF2B5EF4-FFF2-40B4-BE49-F238E27FC236}">
+                      <a16:creationId xmlns:a16="http://schemas.microsoft.com/office/drawing/2014/main" id="{48339E63-5E8C-6CAF-C521-074F9A967D6E}"/>
+                    </a:ext>
+                  </a:extLst>
+                </p:cNvPr>
+                <p:cNvSpPr txBox="1">
+                  <a:spLocks noRot="1" noChangeAspect="1" noMove="1" noResize="1" noEditPoints="1" noAdjustHandles="1" noChangeArrowheads="1" noChangeShapeType="1" noTextEdit="1"/>
+                </p:cNvSpPr>
+                <p:nvPr/>
+              </p:nvSpPr>
+              <p:spPr>
+                <a:xfrm>
+                  <a:off x="2988917" y="4546277"/>
+                  <a:ext cx="401107" cy="369332"/>
+                </a:xfrm>
+                <a:prstGeom prst="rect">
+                  <a:avLst/>
+                </a:prstGeom>
+                <a:blipFill>
+                  <a:blip r:embed="rId9"/>
+                  <a:stretch>
+                    <a:fillRect/>
+                  </a:stretch>
+                </a:blipFill>
+              </p:spPr>
+              <p:txBody>
+                <a:bodyPr/>
+                <a:lstStyle/>
+                <a:p>
+                  <a:r>
+                    <a:rPr lang="en-US">
+                      <a:noFill/>
+                    </a:rPr>
+                    <a:t> </a:t>
+                  </a:r>
+                </a:p>
+              </p:txBody>
+            </p:sp>
+          </mc:Fallback>
+        </mc:AlternateContent>
+        <p:cxnSp>
+          <p:nvCxnSpPr>
+            <p:cNvPr id="18" name="Straight Connector 17">
+              <a:extLst>
+                <a:ext uri="{FF2B5EF4-FFF2-40B4-BE49-F238E27FC236}">
+                  <a16:creationId xmlns:a16="http://schemas.microsoft.com/office/drawing/2014/main" id="{0779D2B2-4221-A27A-D1F6-34E0F884D65F}"/>
+                </a:ext>
+              </a:extLst>
+            </p:cNvPr>
+            <p:cNvCxnSpPr/>
+            <p:nvPr/>
+          </p:nvCxnSpPr>
+          <p:spPr>
+            <a:xfrm>
+              <a:off x="1501111" y="1523999"/>
+              <a:ext cx="0" cy="4529560"/>
+            </a:xfrm>
+            <a:prstGeom prst="line">
+              <a:avLst/>
+            </a:prstGeom>
+            <a:ln w="28575">
+              <a:solidFill>
+                <a:srgbClr val="C00000"/>
+              </a:solidFill>
+            </a:ln>
+          </p:spPr>
+          <p:style>
+            <a:lnRef idx="1">
+              <a:schemeClr val="accent1"/>
+            </a:lnRef>
+            <a:fillRef idx="0">
+              <a:schemeClr val="accent1"/>
+            </a:fillRef>
+            <a:effectRef idx="0">
+              <a:schemeClr val="accent1"/>
+            </a:effectRef>
+            <a:fontRef idx="minor">
+              <a:schemeClr val="tx1"/>
+            </a:fontRef>
+          </p:style>
+        </p:cxnSp>
+        <mc:AlternateContent xmlns:mc="http://schemas.openxmlformats.org/markup-compatibility/2006">
+          <mc:Choice xmlns:a14="http://schemas.microsoft.com/office/drawing/2010/main" Requires="a14">
+            <p:sp>
+              <p:nvSpPr>
+                <p:cNvPr id="19" name="TextBox 18">
+                  <a:extLst>
+                    <a:ext uri="{FF2B5EF4-FFF2-40B4-BE49-F238E27FC236}">
+                      <a16:creationId xmlns:a16="http://schemas.microsoft.com/office/drawing/2014/main" id="{BFA6E135-1306-45A1-D2B9-ED8531C4AB2E}"/>
+                    </a:ext>
+                  </a:extLst>
+                </p:cNvPr>
+                <p:cNvSpPr txBox="1"/>
+                <p:nvPr/>
+              </p:nvSpPr>
+              <p:spPr>
+                <a:xfrm>
+                  <a:off x="667052" y="713238"/>
+                  <a:ext cx="2021839" cy="1091646"/>
+                </a:xfrm>
+                <a:prstGeom prst="rect">
+                  <a:avLst/>
+                </a:prstGeom>
+                <a:noFill/>
+              </p:spPr>
+              <p:txBody>
+                <a:bodyPr wrap="square">
+                  <a:spAutoFit/>
+                </a:bodyPr>
+                <a:lstStyle/>
+                <a:p>
+                  <a:pPr/>
+                  <a14:m>
+                    <m:oMathPara xmlns:m="http://schemas.openxmlformats.org/officeDocument/2006/math">
+                      <m:oMathParaPr>
+                        <m:jc m:val="centerGroup"/>
+                      </m:oMathParaPr>
+                      <m:oMath xmlns:m="http://schemas.openxmlformats.org/officeDocument/2006/math">
+                        <m:func>
+                          <m:funcPr>
+                            <m:ctrlPr>
+                              <a:rPr lang="de-DE" b="0" i="1" smtClean="0">
+                                <a:latin typeface="Cambria Math" panose="02040503050406030204" pitchFamily="18" charset="0"/>
+                              </a:rPr>
+                            </m:ctrlPr>
+                          </m:funcPr>
+                          <m:fName>
+                            <m:r>
+                              <m:rPr>
+                                <m:sty m:val="p"/>
+                              </m:rPr>
+                              <a:rPr lang="de-DE" b="0" i="0" smtClean="0">
+                                <a:latin typeface="Cambria Math" panose="02040503050406030204" pitchFamily="18" charset="0"/>
+                              </a:rPr>
+                              <m:t>min</m:t>
+                            </m:r>
+                          </m:fName>
+                          <m:e>
+                            <m:func>
+                              <m:funcPr>
+                                <m:ctrlPr>
+                                  <a:rPr lang="de-DE" b="0" i="1" smtClean="0">
+                                    <a:latin typeface="Cambria Math" panose="02040503050406030204" pitchFamily="18" charset="0"/>
+                                  </a:rPr>
+                                </m:ctrlPr>
+                              </m:funcPr>
+                              <m:fName>
+                                <m:r>
+                                  <m:rPr>
+                                    <m:sty m:val="p"/>
+                                  </m:rPr>
+                                  <a:rPr lang="de-DE" b="0" i="0" smtClean="0">
+                                    <a:latin typeface="Cambria Math" panose="02040503050406030204" pitchFamily="18" charset="0"/>
+                                  </a:rPr>
+                                  <m:t>min</m:t>
+                                </m:r>
+                              </m:fName>
+                              <m:e>
+                                <m:eqArr>
+                                  <m:eqArrPr>
+                                    <m:ctrlPr>
+                                      <a:rPr lang="de-DE" b="0" i="1" smtClean="0">
+                                        <a:latin typeface="Cambria Math" panose="02040503050406030204" pitchFamily="18" charset="0"/>
+                                      </a:rPr>
+                                    </m:ctrlPr>
+                                  </m:eqArrPr>
+                                  <m:e>
+                                    <m:r>
+                                      <a:rPr lang="de-DE" b="0" i="1" smtClean="0">
+                                        <a:latin typeface="Cambria Math" panose="02040503050406030204" pitchFamily="18" charset="0"/>
+                                      </a:rPr>
+                                      <m:t>{</m:t>
+                                    </m:r>
+                                    <m:sSub>
+                                      <m:sSubPr>
+                                        <m:ctrlPr>
+                                          <a:rPr lang="de-DE" b="0" i="1" smtClean="0">
+                                            <a:latin typeface="Cambria Math" panose="02040503050406030204" pitchFamily="18" charset="0"/>
+                                          </a:rPr>
+                                        </m:ctrlPr>
+                                      </m:sSubPr>
+                                      <m:e>
+                                        <m:r>
+                                          <a:rPr lang="de-DE" b="0" i="1" smtClean="0">
+                                            <a:latin typeface="Cambria Math" panose="02040503050406030204" pitchFamily="18" charset="0"/>
+                                          </a:rPr>
+                                          <m:t>𝑠</m:t>
+                                        </m:r>
+                                      </m:e>
+                                      <m:sub>
+                                        <m:r>
+                                          <a:rPr lang="de-DE" b="0" i="1" smtClean="0">
+                                            <a:latin typeface="Cambria Math" panose="02040503050406030204" pitchFamily="18" charset="0"/>
+                                          </a:rPr>
+                                          <m:t>1</m:t>
+                                        </m:r>
+                                      </m:sub>
+                                    </m:sSub>
+                                  </m:e>
+                                  <m:e>
+                                    <m:eqArr>
+                                      <m:eqArrPr>
+                                        <m:ctrlPr>
+                                          <a:rPr lang="de-DE" b="0" i="1" smtClean="0">
+                                            <a:latin typeface="Cambria Math" panose="02040503050406030204" pitchFamily="18" charset="0"/>
+                                          </a:rPr>
+                                        </m:ctrlPr>
+                                      </m:eqArrPr>
+                                      <m:e>
+                                        <m:r>
+                                          <a:rPr lang="de-DE" b="0" i="1" smtClean="0">
+                                            <a:latin typeface="Cambria Math" panose="02040503050406030204" pitchFamily="18" charset="0"/>
+                                          </a:rPr>
+                                          <m:t>  </m:t>
+                                        </m:r>
+                                        <m:sSub>
+                                          <m:sSubPr>
+                                            <m:ctrlPr>
+                                              <a:rPr lang="de-DE" b="0" i="1" smtClean="0">
+                                                <a:latin typeface="Cambria Math" panose="02040503050406030204" pitchFamily="18" charset="0"/>
+                                              </a:rPr>
+                                            </m:ctrlPr>
+                                          </m:sSubPr>
+                                          <m:e>
+                                            <m:r>
+                                              <a:rPr lang="de-DE" b="0" i="1" smtClean="0">
+                                                <a:latin typeface="Cambria Math" panose="02040503050406030204" pitchFamily="18" charset="0"/>
+                                              </a:rPr>
+                                              <m:t>𝑠</m:t>
+                                            </m:r>
+                                          </m:e>
+                                          <m:sub>
+                                            <m:r>
+                                              <a:rPr lang="de-DE" b="0" i="1" smtClean="0">
+                                                <a:latin typeface="Cambria Math" panose="02040503050406030204" pitchFamily="18" charset="0"/>
+                                              </a:rPr>
+                                              <m:t>2</m:t>
+                                            </m:r>
+                                          </m:sub>
+                                        </m:sSub>
+                                        <m:r>
+                                          <a:rPr lang="de-DE" b="0" i="1" smtClean="0">
+                                            <a:latin typeface="Cambria Math" panose="02040503050406030204" pitchFamily="18" charset="0"/>
+                                          </a:rPr>
+                                          <m:t>,</m:t>
+                                        </m:r>
+                                      </m:e>
+                                      <m:e>
+                                        <m:eqArr>
+                                          <m:eqArrPr>
+                                            <m:ctrlPr>
+                                              <a:rPr lang="de-DE" b="0" i="1" smtClean="0">
+                                                <a:latin typeface="Cambria Math" panose="02040503050406030204" pitchFamily="18" charset="0"/>
+                                              </a:rPr>
+                                            </m:ctrlPr>
+                                          </m:eqArrPr>
+                                          <m:e>
+                                            <m:r>
+                                              <a:rPr lang="de-DE" b="0" i="1" smtClean="0">
+                                                <a:latin typeface="Cambria Math" panose="02040503050406030204" pitchFamily="18" charset="0"/>
+                                              </a:rPr>
+                                              <m:t>  </m:t>
+                                            </m:r>
+                                            <m:sSub>
+                                              <m:sSubPr>
+                                                <m:ctrlPr>
+                                                  <a:rPr lang="de-DE" b="0" i="1" smtClean="0">
+                                                    <a:latin typeface="Cambria Math" panose="02040503050406030204" pitchFamily="18" charset="0"/>
+                                                  </a:rPr>
+                                                </m:ctrlPr>
+                                              </m:sSubPr>
+                                              <m:e>
+                                                <m:r>
+                                                  <a:rPr lang="de-DE" b="0" i="1" smtClean="0">
+                                                    <a:latin typeface="Cambria Math" panose="02040503050406030204" pitchFamily="18" charset="0"/>
+                                                  </a:rPr>
+                                                  <m:t>𝑠</m:t>
+                                                </m:r>
+                                              </m:e>
+                                              <m:sub>
+                                                <m:r>
+                                                  <a:rPr lang="de-DE" b="0" i="1" smtClean="0">
+                                                    <a:latin typeface="Cambria Math" panose="02040503050406030204" pitchFamily="18" charset="0"/>
+                                                  </a:rPr>
+                                                  <m:t>3</m:t>
+                                                </m:r>
+                                              </m:sub>
+                                            </m:sSub>
+                                            <m:r>
+                                              <a:rPr lang="de-DE" b="0" i="1" smtClean="0">
+                                                <a:latin typeface="Cambria Math" panose="02040503050406030204" pitchFamily="18" charset="0"/>
+                                              </a:rPr>
+                                              <m:t>,</m:t>
+                                            </m:r>
+                                          </m:e>
+                                          <m:e>
+                                            <m:r>
+                                              <a:rPr lang="de-DE" b="0" i="1" smtClean="0">
+                                                <a:latin typeface="Cambria Math" panose="02040503050406030204" pitchFamily="18" charset="0"/>
+                                              </a:rPr>
+                                              <m:t>   </m:t>
+                                            </m:r>
+                                            <m:sSub>
+                                              <m:sSubPr>
+                                                <m:ctrlPr>
+                                                  <a:rPr lang="de-DE" b="0" i="1" smtClean="0">
+                                                    <a:latin typeface="Cambria Math" panose="02040503050406030204" pitchFamily="18" charset="0"/>
+                                                  </a:rPr>
+                                                </m:ctrlPr>
+                                              </m:sSubPr>
+                                              <m:e>
+                                                <m:r>
+                                                  <a:rPr lang="de-DE" b="0" i="1" smtClean="0">
+                                                    <a:latin typeface="Cambria Math" panose="02040503050406030204" pitchFamily="18" charset="0"/>
+                                                  </a:rPr>
+                                                  <m:t>𝑠</m:t>
+                                                </m:r>
+                                              </m:e>
+                                              <m:sub>
+                                                <m:r>
+                                                  <a:rPr lang="de-DE" b="0" i="1" smtClean="0">
+                                                    <a:latin typeface="Cambria Math" panose="02040503050406030204" pitchFamily="18" charset="0"/>
+                                                  </a:rPr>
+                                                  <m:t>4</m:t>
+                                                </m:r>
+                                              </m:sub>
+                                            </m:sSub>
+                                            <m:r>
+                                              <a:rPr lang="de-DE" b="0" i="1" smtClean="0">
+                                                <a:latin typeface="Cambria Math" panose="02040503050406030204" pitchFamily="18" charset="0"/>
+                                              </a:rPr>
+                                              <m:t>}</m:t>
+                                            </m:r>
+                                          </m:e>
+                                        </m:eqArr>
+                                      </m:e>
+                                    </m:eqArr>
+                                  </m:e>
+                                </m:eqArr>
+                              </m:e>
+                            </m:func>
+                          </m:e>
+                        </m:func>
+                      </m:oMath>
+                    </m:oMathPara>
+                  </a14:m>
+                  <a:endParaRPr lang="en-US" dirty="0"/>
+                </a:p>
+              </p:txBody>
+            </p:sp>
+          </mc:Choice>
+          <mc:Fallback>
+            <p:sp>
+              <p:nvSpPr>
+                <p:cNvPr id="19" name="TextBox 18">
+                  <a:extLst>
+                    <a:ext uri="{FF2B5EF4-FFF2-40B4-BE49-F238E27FC236}">
+                      <a16:creationId xmlns:a16="http://schemas.microsoft.com/office/drawing/2014/main" id="{BFA6E135-1306-45A1-D2B9-ED8531C4AB2E}"/>
+                    </a:ext>
+                  </a:extLst>
+                </p:cNvPr>
+                <p:cNvSpPr txBox="1">
+                  <a:spLocks noRot="1" noChangeAspect="1" noMove="1" noResize="1" noEditPoints="1" noAdjustHandles="1" noChangeArrowheads="1" noChangeShapeType="1" noTextEdit="1"/>
+                </p:cNvSpPr>
+                <p:nvPr/>
+              </p:nvSpPr>
+              <p:spPr>
+                <a:xfrm>
+                  <a:off x="667052" y="713238"/>
+                  <a:ext cx="2021839" cy="1091646"/>
+                </a:xfrm>
+                <a:prstGeom prst="rect">
+                  <a:avLst/>
+                </a:prstGeom>
+                <a:blipFill>
+                  <a:blip r:embed="rId10"/>
+                  <a:stretch>
+                    <a:fillRect/>
+                  </a:stretch>
+                </a:blipFill>
+              </p:spPr>
+              <p:txBody>
+                <a:bodyPr/>
+                <a:lstStyle/>
+                <a:p>
+                  <a:r>
+                    <a:rPr lang="en-US">
+                      <a:noFill/>
+                    </a:rPr>
+                    <a:t> </a:t>
+                  </a:r>
+                </a:p>
+              </p:txBody>
+            </p:sp>
+          </mc:Fallback>
+        </mc:AlternateContent>
+      </p:grpSp>
+    </p:spTree>
+    <p:extLst>
+      <p:ext uri="{BB962C8B-B14F-4D97-AF65-F5344CB8AC3E}">
+        <p14:creationId xmlns:p14="http://schemas.microsoft.com/office/powerpoint/2010/main" val="3316440455"/>
+      </p:ext>
+    </p:extLst>
+  </p:cSld>
+  <p:clrMapOvr>
+    <a:masterClrMapping/>
+  </p:clrMapOvr>
+</p:sld>
+</file>
+
+<file path=ppt/slides/slide14.xml><?xml version="1.0" encoding="utf-8"?>
+<p:sld xmlns:a="http://schemas.openxmlformats.org/drawingml/2006/main" xmlns:r="http://schemas.openxmlformats.org/officeDocument/2006/relationships" xmlns:p="http://schemas.openxmlformats.org/presentationml/2006/main">
+  <p:cSld>
+    <p:spTree>
+      <p:nvGrpSpPr>
+        <p:cNvPr id="1" name=""/>
+        <p:cNvGrpSpPr/>
+        <p:nvPr/>
+      </p:nvGrpSpPr>
+      <p:grpSpPr>
+        <a:xfrm>
+          <a:off x="0" y="0"/>
+          <a:ext cx="0" cy="0"/>
+          <a:chOff x="0" y="0"/>
+          <a:chExt cx="0" cy="0"/>
+        </a:xfrm>
+      </p:grpSpPr>
+      <p:grpSp>
+        <p:nvGrpSpPr>
+          <p:cNvPr id="21" name="Group 20">
+            <a:extLst>
+              <a:ext uri="{FF2B5EF4-FFF2-40B4-BE49-F238E27FC236}">
+                <a16:creationId xmlns:a16="http://schemas.microsoft.com/office/drawing/2014/main" id="{EF8B67E4-2B5B-C5D7-50A8-D11F1B125009}"/>
+              </a:ext>
+            </a:extLst>
+          </p:cNvPr>
+          <p:cNvGrpSpPr/>
+          <p:nvPr/>
+        </p:nvGrpSpPr>
+        <p:grpSpPr>
+          <a:xfrm>
+            <a:off x="2320953" y="1238491"/>
+            <a:ext cx="3470247" cy="4081393"/>
+            <a:chOff x="2320953" y="1238491"/>
+            <a:chExt cx="3470247" cy="4081393"/>
+          </a:xfrm>
+        </p:grpSpPr>
+        <mc:AlternateContent xmlns:mc="http://schemas.openxmlformats.org/markup-compatibility/2006">
+          <mc:Choice xmlns:a14="http://schemas.microsoft.com/office/drawing/2010/main" Requires="a14">
+            <p:sp>
+              <p:nvSpPr>
+                <p:cNvPr id="5" name="Rectangle: Rounded Corners 4">
+                  <a:extLst>
+                    <a:ext uri="{FF2B5EF4-FFF2-40B4-BE49-F238E27FC236}">
+                      <a16:creationId xmlns:a16="http://schemas.microsoft.com/office/drawing/2014/main" id="{285EAD6A-8999-7910-4F0E-7B8182093203}"/>
+                    </a:ext>
+                  </a:extLst>
+                </p:cNvPr>
+                <p:cNvSpPr/>
+                <p:nvPr/>
+              </p:nvSpPr>
+              <p:spPr>
+                <a:xfrm>
+                  <a:off x="4560426" y="1238491"/>
+                  <a:ext cx="509286" cy="1620000"/>
+                </a:xfrm>
+                <a:prstGeom prst="roundRect">
+                  <a:avLst/>
+                </a:prstGeom>
+              </p:spPr>
+              <p:style>
+                <a:lnRef idx="2">
+                  <a:schemeClr val="accent1">
+                    <a:shade val="15000"/>
+                  </a:schemeClr>
+                </a:lnRef>
+                <a:fillRef idx="1">
+                  <a:schemeClr val="accent1"/>
+                </a:fillRef>
+                <a:effectRef idx="0">
+                  <a:schemeClr val="accent1"/>
+                </a:effectRef>
+                <a:fontRef idx="minor">
+                  <a:schemeClr val="lt1"/>
+                </a:fontRef>
+              </p:style>
+              <p:txBody>
+                <a:bodyPr rtlCol="0" anchor="ctr"/>
+                <a:lstStyle/>
+                <a:p>
+                  <a:pPr algn="ctr"/>
+                  <a14:m>
+                    <m:oMathPara xmlns:m="http://schemas.openxmlformats.org/officeDocument/2006/math">
+                      <m:oMathParaPr>
+                        <m:jc m:val="center"/>
+                      </m:oMathParaPr>
+                      <m:oMath xmlns:m="http://schemas.openxmlformats.org/officeDocument/2006/math">
+                        <m:r>
+                          <a:rPr lang="de-DE" b="0" i="1" smtClean="0">
+                            <a:latin typeface="Cambria Math" panose="02040503050406030204" pitchFamily="18" charset="0"/>
+                          </a:rPr>
+                          <m:t>3</m:t>
+                        </m:r>
+                      </m:oMath>
+                    </m:oMathPara>
+                  </a14:m>
+                  <a:endParaRPr lang="en-US" dirty="0"/>
+                </a:p>
+              </p:txBody>
+            </p:sp>
+          </mc:Choice>
+          <mc:Fallback>
+            <p:sp>
+              <p:nvSpPr>
+                <p:cNvPr id="5" name="Rectangle: Rounded Corners 4">
+                  <a:extLst>
+                    <a:ext uri="{FF2B5EF4-FFF2-40B4-BE49-F238E27FC236}">
+                      <a16:creationId xmlns:a16="http://schemas.microsoft.com/office/drawing/2014/main" id="{285EAD6A-8999-7910-4F0E-7B8182093203}"/>
+                    </a:ext>
+                  </a:extLst>
+                </p:cNvPr>
+                <p:cNvSpPr>
+                  <a:spLocks noRot="1" noChangeAspect="1" noMove="1" noResize="1" noEditPoints="1" noAdjustHandles="1" noChangeArrowheads="1" noChangeShapeType="1" noTextEdit="1"/>
+                </p:cNvSpPr>
+                <p:nvPr/>
+              </p:nvSpPr>
+              <p:spPr>
+                <a:xfrm>
+                  <a:off x="4560426" y="1238491"/>
+                  <a:ext cx="509286" cy="1620000"/>
+                </a:xfrm>
+                <a:prstGeom prst="roundRect">
+                  <a:avLst/>
+                </a:prstGeom>
+                <a:blipFill>
+                  <a:blip r:embed="rId2"/>
+                  <a:stretch>
+                    <a:fillRect/>
+                  </a:stretch>
+                </a:blipFill>
+              </p:spPr>
+              <p:txBody>
+                <a:bodyPr/>
+                <a:lstStyle/>
+                <a:p>
+                  <a:r>
+                    <a:rPr lang="en-US">
+                      <a:noFill/>
+                    </a:rPr>
+                    <a:t> </a:t>
+                  </a:r>
+                </a:p>
+              </p:txBody>
+            </p:sp>
+          </mc:Fallback>
+        </mc:AlternateContent>
+        <mc:AlternateContent xmlns:mc="http://schemas.openxmlformats.org/markup-compatibility/2006">
+          <mc:Choice xmlns:a14="http://schemas.microsoft.com/office/drawing/2010/main" Requires="a14">
+            <p:sp>
+              <p:nvSpPr>
+                <p:cNvPr id="6" name="Rectangle: Rounded Corners 5">
+                  <a:extLst>
+                    <a:ext uri="{FF2B5EF4-FFF2-40B4-BE49-F238E27FC236}">
+                      <a16:creationId xmlns:a16="http://schemas.microsoft.com/office/drawing/2014/main" id="{E7697546-B0ED-C6FB-FB2A-031CDA744A7D}"/>
+                    </a:ext>
+                  </a:extLst>
+                </p:cNvPr>
+                <p:cNvSpPr/>
+                <p:nvPr/>
+              </p:nvSpPr>
+              <p:spPr>
+                <a:xfrm>
+                  <a:off x="5281914" y="1238491"/>
+                  <a:ext cx="509286" cy="1620000"/>
+                </a:xfrm>
+                <a:prstGeom prst="roundRect">
+                  <a:avLst/>
+                </a:prstGeom>
+              </p:spPr>
+              <p:style>
+                <a:lnRef idx="2">
+                  <a:schemeClr val="accent1">
+                    <a:shade val="15000"/>
+                  </a:schemeClr>
+                </a:lnRef>
+                <a:fillRef idx="1">
+                  <a:schemeClr val="accent1"/>
+                </a:fillRef>
+                <a:effectRef idx="0">
+                  <a:schemeClr val="accent1"/>
+                </a:effectRef>
+                <a:fontRef idx="minor">
+                  <a:schemeClr val="lt1"/>
+                </a:fontRef>
+              </p:style>
+              <p:txBody>
+                <a:bodyPr rtlCol="0" anchor="ctr"/>
+                <a:lstStyle/>
+                <a:p>
+                  <a:pPr algn="ctr"/>
+                  <a14:m>
+                    <m:oMathPara xmlns:m="http://schemas.openxmlformats.org/officeDocument/2006/math">
+                      <m:oMathParaPr>
+                        <m:jc m:val="center"/>
+                      </m:oMathParaPr>
+                      <m:oMath xmlns:m="http://schemas.openxmlformats.org/officeDocument/2006/math">
+                        <m:r>
+                          <a:rPr lang="de-DE" b="0" i="1" smtClean="0">
+                            <a:latin typeface="Cambria Math" panose="02040503050406030204" pitchFamily="18" charset="0"/>
+                          </a:rPr>
+                          <m:t>3</m:t>
+                        </m:r>
+                      </m:oMath>
+                    </m:oMathPara>
+                  </a14:m>
+                  <a:endParaRPr lang="en-US" dirty="0"/>
+                </a:p>
+              </p:txBody>
+            </p:sp>
+          </mc:Choice>
+          <mc:Fallback>
+            <p:sp>
+              <p:nvSpPr>
+                <p:cNvPr id="6" name="Rectangle: Rounded Corners 5">
+                  <a:extLst>
+                    <a:ext uri="{FF2B5EF4-FFF2-40B4-BE49-F238E27FC236}">
+                      <a16:creationId xmlns:a16="http://schemas.microsoft.com/office/drawing/2014/main" id="{E7697546-B0ED-C6FB-FB2A-031CDA744A7D}"/>
+                    </a:ext>
+                  </a:extLst>
+                </p:cNvPr>
+                <p:cNvSpPr>
+                  <a:spLocks noRot="1" noChangeAspect="1" noMove="1" noResize="1" noEditPoints="1" noAdjustHandles="1" noChangeArrowheads="1" noChangeShapeType="1" noTextEdit="1"/>
+                </p:cNvSpPr>
+                <p:nvPr/>
+              </p:nvSpPr>
+              <p:spPr>
+                <a:xfrm>
+                  <a:off x="5281914" y="1238491"/>
+                  <a:ext cx="509286" cy="1620000"/>
+                </a:xfrm>
+                <a:prstGeom prst="roundRect">
+                  <a:avLst/>
+                </a:prstGeom>
+                <a:blipFill>
+                  <a:blip r:embed="rId3"/>
+                  <a:stretch>
+                    <a:fillRect/>
+                  </a:stretch>
+                </a:blipFill>
+              </p:spPr>
+              <p:txBody>
+                <a:bodyPr/>
+                <a:lstStyle/>
+                <a:p>
+                  <a:r>
+                    <a:rPr lang="en-US">
+                      <a:noFill/>
+                    </a:rPr>
+                    <a:t> </a:t>
+                  </a:r>
+                </a:p>
+              </p:txBody>
+            </p:sp>
+          </mc:Fallback>
+        </mc:AlternateContent>
+        <mc:AlternateContent xmlns:mc="http://schemas.openxmlformats.org/markup-compatibility/2006">
+          <mc:Choice xmlns:a14="http://schemas.microsoft.com/office/drawing/2010/main" Requires="a14">
+            <p:sp>
+              <p:nvSpPr>
+                <p:cNvPr id="7" name="Rectangle: Rounded Corners 6">
+                  <a:extLst>
+                    <a:ext uri="{FF2B5EF4-FFF2-40B4-BE49-F238E27FC236}">
+                      <a16:creationId xmlns:a16="http://schemas.microsoft.com/office/drawing/2014/main" id="{37A58F54-7DB4-D3D4-B9A3-B546016F15BC}"/>
+                    </a:ext>
+                  </a:extLst>
+                </p:cNvPr>
+                <p:cNvSpPr/>
+                <p:nvPr/>
+              </p:nvSpPr>
+              <p:spPr>
+                <a:xfrm>
+                  <a:off x="3094301" y="1238491"/>
+                  <a:ext cx="509286" cy="1080000"/>
+                </a:xfrm>
+                <a:prstGeom prst="roundRect">
+                  <a:avLst/>
+                </a:prstGeom>
+              </p:spPr>
+              <p:style>
+                <a:lnRef idx="2">
+                  <a:schemeClr val="accent1">
+                    <a:shade val="15000"/>
+                  </a:schemeClr>
+                </a:lnRef>
+                <a:fillRef idx="1">
+                  <a:schemeClr val="accent1"/>
+                </a:fillRef>
+                <a:effectRef idx="0">
+                  <a:schemeClr val="accent1"/>
+                </a:effectRef>
+                <a:fontRef idx="minor">
+                  <a:schemeClr val="lt1"/>
+                </a:fontRef>
+              </p:style>
+              <p:txBody>
+                <a:bodyPr rtlCol="0" anchor="ctr"/>
+                <a:lstStyle/>
+                <a:p>
+                  <a:pPr algn="ctr"/>
+                  <a14:m>
+                    <m:oMathPara xmlns:m="http://schemas.openxmlformats.org/officeDocument/2006/math">
+                      <m:oMathParaPr>
+                        <m:jc m:val="center"/>
+                      </m:oMathParaPr>
+                      <m:oMath xmlns:m="http://schemas.openxmlformats.org/officeDocument/2006/math">
+                        <m:r>
+                          <a:rPr lang="de-DE" b="0" i="1" smtClean="0">
+                            <a:latin typeface="Cambria Math" panose="02040503050406030204" pitchFamily="18" charset="0"/>
+                          </a:rPr>
+                          <m:t>2</m:t>
+                        </m:r>
+                      </m:oMath>
+                    </m:oMathPara>
+                  </a14:m>
+                  <a:endParaRPr lang="en-US" dirty="0"/>
+                </a:p>
+              </p:txBody>
+            </p:sp>
+          </mc:Choice>
+          <mc:Fallback>
+            <p:sp>
+              <p:nvSpPr>
+                <p:cNvPr id="7" name="Rectangle: Rounded Corners 6">
+                  <a:extLst>
+                    <a:ext uri="{FF2B5EF4-FFF2-40B4-BE49-F238E27FC236}">
+                      <a16:creationId xmlns:a16="http://schemas.microsoft.com/office/drawing/2014/main" id="{37A58F54-7DB4-D3D4-B9A3-B546016F15BC}"/>
+                    </a:ext>
+                  </a:extLst>
+                </p:cNvPr>
+                <p:cNvSpPr>
+                  <a:spLocks noRot="1" noChangeAspect="1" noMove="1" noResize="1" noEditPoints="1" noAdjustHandles="1" noChangeArrowheads="1" noChangeShapeType="1" noTextEdit="1"/>
+                </p:cNvSpPr>
+                <p:nvPr/>
+              </p:nvSpPr>
+              <p:spPr>
+                <a:xfrm>
+                  <a:off x="3094301" y="1238491"/>
+                  <a:ext cx="509286" cy="1080000"/>
+                </a:xfrm>
+                <a:prstGeom prst="roundRect">
+                  <a:avLst/>
+                </a:prstGeom>
+                <a:blipFill>
+                  <a:blip r:embed="rId4"/>
+                  <a:stretch>
+                    <a:fillRect/>
+                  </a:stretch>
+                </a:blipFill>
+              </p:spPr>
+              <p:txBody>
+                <a:bodyPr/>
+                <a:lstStyle/>
+                <a:p>
+                  <a:r>
+                    <a:rPr lang="en-US">
+                      <a:noFill/>
+                    </a:rPr>
+                    <a:t> </a:t>
+                  </a:r>
+                </a:p>
+              </p:txBody>
+            </p:sp>
+          </mc:Fallback>
+        </mc:AlternateContent>
+        <mc:AlternateContent xmlns:mc="http://schemas.openxmlformats.org/markup-compatibility/2006">
+          <mc:Choice xmlns:a14="http://schemas.microsoft.com/office/drawing/2010/main" Requires="a14">
+            <p:sp>
+              <p:nvSpPr>
+                <p:cNvPr id="8" name="Rectangle: Rounded Corners 7">
+                  <a:extLst>
+                    <a:ext uri="{FF2B5EF4-FFF2-40B4-BE49-F238E27FC236}">
+                      <a16:creationId xmlns:a16="http://schemas.microsoft.com/office/drawing/2014/main" id="{083BA114-285C-86EC-6CB6-3697D4584BEB}"/>
+                    </a:ext>
+                  </a:extLst>
+                </p:cNvPr>
+                <p:cNvSpPr/>
+                <p:nvPr/>
+              </p:nvSpPr>
+              <p:spPr>
+                <a:xfrm>
+                  <a:off x="3815789" y="1238491"/>
+                  <a:ext cx="509286" cy="1080000"/>
+                </a:xfrm>
+                <a:prstGeom prst="roundRect">
+                  <a:avLst/>
+                </a:prstGeom>
+              </p:spPr>
+              <p:style>
+                <a:lnRef idx="2">
+                  <a:schemeClr val="accent1">
+                    <a:shade val="15000"/>
+                  </a:schemeClr>
+                </a:lnRef>
+                <a:fillRef idx="1">
+                  <a:schemeClr val="accent1"/>
+                </a:fillRef>
+                <a:effectRef idx="0">
+                  <a:schemeClr val="accent1"/>
+                </a:effectRef>
+                <a:fontRef idx="minor">
+                  <a:schemeClr val="lt1"/>
+                </a:fontRef>
+              </p:style>
+              <p:txBody>
+                <a:bodyPr rtlCol="0" anchor="ctr"/>
+                <a:lstStyle/>
+                <a:p>
+                  <a:pPr algn="ctr"/>
+                  <a14:m>
+                    <m:oMathPara xmlns:m="http://schemas.openxmlformats.org/officeDocument/2006/math">
+                      <m:oMathParaPr>
+                        <m:jc m:val="center"/>
+                      </m:oMathParaPr>
+                      <m:oMath xmlns:m="http://schemas.openxmlformats.org/officeDocument/2006/math">
+                        <m:r>
+                          <a:rPr lang="de-DE" b="0" i="1" smtClean="0">
+                            <a:latin typeface="Cambria Math" panose="02040503050406030204" pitchFamily="18" charset="0"/>
+                          </a:rPr>
+                          <m:t>2</m:t>
+                        </m:r>
+                      </m:oMath>
+                    </m:oMathPara>
+                  </a14:m>
+                  <a:endParaRPr lang="en-US" dirty="0"/>
+                </a:p>
+              </p:txBody>
+            </p:sp>
+          </mc:Choice>
+          <mc:Fallback>
+            <p:sp>
+              <p:nvSpPr>
+                <p:cNvPr id="8" name="Rectangle: Rounded Corners 7">
+                  <a:extLst>
+                    <a:ext uri="{FF2B5EF4-FFF2-40B4-BE49-F238E27FC236}">
+                      <a16:creationId xmlns:a16="http://schemas.microsoft.com/office/drawing/2014/main" id="{083BA114-285C-86EC-6CB6-3697D4584BEB}"/>
+                    </a:ext>
+                  </a:extLst>
+                </p:cNvPr>
+                <p:cNvSpPr>
+                  <a:spLocks noRot="1" noChangeAspect="1" noMove="1" noResize="1" noEditPoints="1" noAdjustHandles="1" noChangeArrowheads="1" noChangeShapeType="1" noTextEdit="1"/>
+                </p:cNvSpPr>
+                <p:nvPr/>
+              </p:nvSpPr>
+              <p:spPr>
+                <a:xfrm>
+                  <a:off x="3815789" y="1238491"/>
+                  <a:ext cx="509286" cy="1080000"/>
+                </a:xfrm>
+                <a:prstGeom prst="roundRect">
+                  <a:avLst/>
+                </a:prstGeom>
+                <a:blipFill>
+                  <a:blip r:embed="rId5"/>
+                  <a:stretch>
+                    <a:fillRect/>
+                  </a:stretch>
+                </a:blipFill>
+              </p:spPr>
+              <p:txBody>
+                <a:bodyPr/>
+                <a:lstStyle/>
+                <a:p>
+                  <a:r>
+                    <a:rPr lang="en-US">
+                      <a:noFill/>
+                    </a:rPr>
+                    <a:t> </a:t>
+                  </a:r>
+                </a:p>
+              </p:txBody>
+            </p:sp>
+          </mc:Fallback>
+        </mc:AlternateContent>
+        <mc:AlternateContent xmlns:mc="http://schemas.openxmlformats.org/markup-compatibility/2006">
+          <mc:Choice xmlns:a14="http://schemas.microsoft.com/office/drawing/2010/main" Requires="a14">
+            <p:sp>
+              <p:nvSpPr>
+                <p:cNvPr id="9" name="Rectangle: Rounded Corners 8">
+                  <a:extLst>
+                    <a:ext uri="{FF2B5EF4-FFF2-40B4-BE49-F238E27FC236}">
+                      <a16:creationId xmlns:a16="http://schemas.microsoft.com/office/drawing/2014/main" id="{0FB78677-2E38-A276-1A0B-24A5EB8A4678}"/>
+                    </a:ext>
+                  </a:extLst>
+                </p:cNvPr>
+                <p:cNvSpPr/>
+                <p:nvPr/>
+              </p:nvSpPr>
+              <p:spPr>
+                <a:xfrm>
+                  <a:off x="2372813" y="1238491"/>
+                  <a:ext cx="509286" cy="1080000"/>
+                </a:xfrm>
+                <a:prstGeom prst="roundRect">
+                  <a:avLst/>
+                </a:prstGeom>
+              </p:spPr>
+              <p:style>
+                <a:lnRef idx="2">
+                  <a:schemeClr val="accent1">
+                    <a:shade val="15000"/>
+                  </a:schemeClr>
+                </a:lnRef>
+                <a:fillRef idx="1">
+                  <a:schemeClr val="accent1"/>
+                </a:fillRef>
+                <a:effectRef idx="0">
+                  <a:schemeClr val="accent1"/>
+                </a:effectRef>
+                <a:fontRef idx="minor">
+                  <a:schemeClr val="lt1"/>
+                </a:fontRef>
+              </p:style>
+              <p:txBody>
+                <a:bodyPr rtlCol="0" anchor="ctr"/>
+                <a:lstStyle/>
+                <a:p>
+                  <a:pPr algn="ctr"/>
+                  <a14:m>
+                    <m:oMathPara xmlns:m="http://schemas.openxmlformats.org/officeDocument/2006/math">
+                      <m:oMathParaPr>
+                        <m:jc m:val="center"/>
+                      </m:oMathParaPr>
+                      <m:oMath xmlns:m="http://schemas.openxmlformats.org/officeDocument/2006/math">
+                        <m:r>
+                          <a:rPr lang="de-DE" b="0" i="1" smtClean="0">
+                            <a:latin typeface="Cambria Math" panose="02040503050406030204" pitchFamily="18" charset="0"/>
+                          </a:rPr>
+                          <m:t>2</m:t>
+                        </m:r>
+                      </m:oMath>
+                    </m:oMathPara>
+                  </a14:m>
+                  <a:endParaRPr lang="en-US" dirty="0"/>
+                </a:p>
+              </p:txBody>
+            </p:sp>
+          </mc:Choice>
+          <mc:Fallback>
+            <p:sp>
+              <p:nvSpPr>
+                <p:cNvPr id="9" name="Rectangle: Rounded Corners 8">
+                  <a:extLst>
+                    <a:ext uri="{FF2B5EF4-FFF2-40B4-BE49-F238E27FC236}">
+                      <a16:creationId xmlns:a16="http://schemas.microsoft.com/office/drawing/2014/main" id="{0FB78677-2E38-A276-1A0B-24A5EB8A4678}"/>
+                    </a:ext>
+                  </a:extLst>
+                </p:cNvPr>
+                <p:cNvSpPr>
+                  <a:spLocks noRot="1" noChangeAspect="1" noMove="1" noResize="1" noEditPoints="1" noAdjustHandles="1" noChangeArrowheads="1" noChangeShapeType="1" noTextEdit="1"/>
+                </p:cNvSpPr>
+                <p:nvPr/>
+              </p:nvSpPr>
+              <p:spPr>
+                <a:xfrm>
+                  <a:off x="2372813" y="1238491"/>
+                  <a:ext cx="509286" cy="1080000"/>
+                </a:xfrm>
+                <a:prstGeom prst="roundRect">
+                  <a:avLst/>
+                </a:prstGeom>
+                <a:blipFill>
+                  <a:blip r:embed="rId6"/>
+                  <a:stretch>
+                    <a:fillRect/>
+                  </a:stretch>
+                </a:blipFill>
+              </p:spPr>
+              <p:txBody>
+                <a:bodyPr/>
+                <a:lstStyle/>
+                <a:p>
+                  <a:r>
+                    <a:rPr lang="en-US">
+                      <a:noFill/>
+                    </a:rPr>
+                    <a:t> </a:t>
+                  </a:r>
+                </a:p>
+              </p:txBody>
+            </p:sp>
+          </mc:Fallback>
+        </mc:AlternateContent>
+        <p:sp>
+          <p:nvSpPr>
+            <p:cNvPr id="10" name="Rectangle 9">
+              <a:extLst>
+                <a:ext uri="{FF2B5EF4-FFF2-40B4-BE49-F238E27FC236}">
+                  <a16:creationId xmlns:a16="http://schemas.microsoft.com/office/drawing/2014/main" id="{C2D499F9-E0FC-048A-F72C-3FD32AA120F3}"/>
+                </a:ext>
+              </a:extLst>
+            </p:cNvPr>
+            <p:cNvSpPr/>
+            <p:nvPr/>
+          </p:nvSpPr>
+          <p:spPr>
+            <a:xfrm>
+              <a:off x="2372813" y="3159884"/>
+              <a:ext cx="509286" cy="2160000"/>
+            </a:xfrm>
+            <a:prstGeom prst="rect">
+              <a:avLst/>
+            </a:prstGeom>
+            <a:ln w="25400"/>
+          </p:spPr>
+          <p:style>
+            <a:lnRef idx="2">
+              <a:schemeClr val="accent6"/>
+            </a:lnRef>
+            <a:fillRef idx="1">
+              <a:schemeClr val="lt1"/>
+            </a:fillRef>
+            <a:effectRef idx="0">
+              <a:schemeClr val="accent6"/>
+            </a:effectRef>
+            <a:fontRef idx="minor">
+              <a:schemeClr val="dk1"/>
+            </a:fontRef>
+          </p:style>
+          <p:txBody>
+            <a:bodyPr rtlCol="0" anchor="ctr"/>
+            <a:lstStyle/>
+            <a:p>
+              <a:pPr algn="ctr"/>
+              <a:endParaRPr lang="en-US"/>
+            </a:p>
+          </p:txBody>
+        </p:sp>
+        <p:sp>
+          <p:nvSpPr>
+            <p:cNvPr id="11" name="Rectangle 10">
+              <a:extLst>
+                <a:ext uri="{FF2B5EF4-FFF2-40B4-BE49-F238E27FC236}">
+                  <a16:creationId xmlns:a16="http://schemas.microsoft.com/office/drawing/2014/main" id="{A689E11D-1356-F0DF-207F-ABFF2CEEF22C}"/>
+                </a:ext>
+              </a:extLst>
+            </p:cNvPr>
+            <p:cNvSpPr/>
+            <p:nvPr/>
+          </p:nvSpPr>
+          <p:spPr>
+            <a:xfrm>
+              <a:off x="3094301" y="3159884"/>
+              <a:ext cx="509286" cy="2160000"/>
+            </a:xfrm>
+            <a:prstGeom prst="rect">
+              <a:avLst/>
+            </a:prstGeom>
+            <a:ln w="25400"/>
+          </p:spPr>
+          <p:style>
+            <a:lnRef idx="2">
+              <a:schemeClr val="accent6"/>
+            </a:lnRef>
+            <a:fillRef idx="1">
+              <a:schemeClr val="lt1"/>
+            </a:fillRef>
+            <a:effectRef idx="0">
+              <a:schemeClr val="accent6"/>
+            </a:effectRef>
+            <a:fontRef idx="minor">
+              <a:schemeClr val="dk1"/>
+            </a:fontRef>
+          </p:style>
+          <p:txBody>
+            <a:bodyPr rtlCol="0" anchor="ctr"/>
+            <a:lstStyle/>
+            <a:p>
+              <a:pPr algn="ctr"/>
+              <a:endParaRPr lang="en-US"/>
+            </a:p>
+          </p:txBody>
+        </p:sp>
+        <p:sp>
+          <p:nvSpPr>
+            <p:cNvPr id="12" name="Rectangle 11">
+              <a:extLst>
+                <a:ext uri="{FF2B5EF4-FFF2-40B4-BE49-F238E27FC236}">
+                  <a16:creationId xmlns:a16="http://schemas.microsoft.com/office/drawing/2014/main" id="{E08644DF-9786-34AB-C52A-1CB40A80C3CA}"/>
+                </a:ext>
+              </a:extLst>
+            </p:cNvPr>
+            <p:cNvSpPr/>
+            <p:nvPr/>
+          </p:nvSpPr>
+          <p:spPr>
+            <a:xfrm>
+              <a:off x="3815789" y="3159884"/>
+              <a:ext cx="509286" cy="2160000"/>
+            </a:xfrm>
+            <a:prstGeom prst="rect">
+              <a:avLst/>
+            </a:prstGeom>
+            <a:ln w="25400"/>
+          </p:spPr>
+          <p:style>
+            <a:lnRef idx="2">
+              <a:schemeClr val="accent6"/>
+            </a:lnRef>
+            <a:fillRef idx="1">
+              <a:schemeClr val="lt1"/>
+            </a:fillRef>
+            <a:effectRef idx="0">
+              <a:schemeClr val="accent6"/>
+            </a:effectRef>
+            <a:fontRef idx="minor">
+              <a:schemeClr val="dk1"/>
+            </a:fontRef>
+          </p:style>
+          <p:txBody>
+            <a:bodyPr rtlCol="0" anchor="ctr"/>
+            <a:lstStyle/>
+            <a:p>
+              <a:pPr algn="ctr"/>
+              <a:endParaRPr lang="en-US"/>
+            </a:p>
+          </p:txBody>
+        </p:sp>
+        <mc:AlternateContent xmlns:mc="http://schemas.openxmlformats.org/markup-compatibility/2006">
+          <mc:Choice xmlns:a14="http://schemas.microsoft.com/office/drawing/2010/main" Requires="a14">
+            <p:sp>
+              <p:nvSpPr>
+                <p:cNvPr id="15" name="TextBox 14">
+                  <a:extLst>
+                    <a:ext uri="{FF2B5EF4-FFF2-40B4-BE49-F238E27FC236}">
+                      <a16:creationId xmlns:a16="http://schemas.microsoft.com/office/drawing/2014/main" id="{E80541AA-F733-8565-7E27-2D226058031C}"/>
+                    </a:ext>
+                  </a:extLst>
+                </p:cNvPr>
+                <p:cNvSpPr txBox="1"/>
+                <p:nvPr/>
+              </p:nvSpPr>
+              <p:spPr>
+                <a:xfrm>
+                  <a:off x="4088759" y="4009051"/>
+                  <a:ext cx="1189298" cy="461665"/>
+                </a:xfrm>
+                <a:prstGeom prst="rect">
+                  <a:avLst/>
+                </a:prstGeom>
+                <a:noFill/>
+              </p:spPr>
+              <p:txBody>
+                <a:bodyPr wrap="square">
+                  <a:spAutoFit/>
+                </a:bodyPr>
+                <a:lstStyle/>
+                <a:p>
+                  <a:pPr/>
+                  <a14:m>
+                    <m:oMathPara xmlns:m="http://schemas.openxmlformats.org/officeDocument/2006/math">
+                      <m:oMathParaPr>
+                        <m:jc m:val="centerGroup"/>
+                      </m:oMathParaPr>
+                      <m:oMath xmlns:m="http://schemas.openxmlformats.org/officeDocument/2006/math">
+                        <m:r>
+                          <a:rPr lang="de-DE" sz="2400" b="0" i="1" smtClean="0">
+                            <a:latin typeface="Cambria Math" panose="02040503050406030204" pitchFamily="18" charset="0"/>
+                          </a:rPr>
+                          <m:t>…</m:t>
+                        </m:r>
+                      </m:oMath>
+                    </m:oMathPara>
+                  </a14:m>
+                  <a:endParaRPr lang="en-US" sz="2400" dirty="0"/>
+                </a:p>
+              </p:txBody>
+            </p:sp>
+          </mc:Choice>
+          <mc:Fallback>
+            <p:sp>
+              <p:nvSpPr>
+                <p:cNvPr id="15" name="TextBox 14">
+                  <a:extLst>
+                    <a:ext uri="{FF2B5EF4-FFF2-40B4-BE49-F238E27FC236}">
+                      <a16:creationId xmlns:a16="http://schemas.microsoft.com/office/drawing/2014/main" id="{E80541AA-F733-8565-7E27-2D226058031C}"/>
+                    </a:ext>
+                  </a:extLst>
+                </p:cNvPr>
+                <p:cNvSpPr txBox="1">
+                  <a:spLocks noRot="1" noChangeAspect="1" noMove="1" noResize="1" noEditPoints="1" noAdjustHandles="1" noChangeArrowheads="1" noChangeShapeType="1" noTextEdit="1"/>
+                </p:cNvSpPr>
+                <p:nvPr/>
+              </p:nvSpPr>
+              <p:spPr>
+                <a:xfrm>
+                  <a:off x="4088759" y="4009051"/>
+                  <a:ext cx="1189298" cy="461665"/>
+                </a:xfrm>
+                <a:prstGeom prst="rect">
+                  <a:avLst/>
+                </a:prstGeom>
+                <a:blipFill>
+                  <a:blip r:embed="rId7"/>
+                  <a:stretch>
+                    <a:fillRect/>
+                  </a:stretch>
+                </a:blipFill>
+              </p:spPr>
+              <p:txBody>
+                <a:bodyPr/>
+                <a:lstStyle/>
+                <a:p>
+                  <a:r>
+                    <a:rPr lang="en-US">
+                      <a:noFill/>
+                    </a:rPr>
+                    <a:t> </a:t>
+                  </a:r>
+                </a:p>
+              </p:txBody>
+            </p:sp>
+          </mc:Fallback>
+        </mc:AlternateContent>
+        <p:sp>
+          <p:nvSpPr>
+            <p:cNvPr id="16" name="Rectangle 15">
+              <a:extLst>
+                <a:ext uri="{FF2B5EF4-FFF2-40B4-BE49-F238E27FC236}">
+                  <a16:creationId xmlns:a16="http://schemas.microsoft.com/office/drawing/2014/main" id="{0FF21E41-A6B4-7BC0-11AF-D61AFEF51371}"/>
+                </a:ext>
+              </a:extLst>
+            </p:cNvPr>
+            <p:cNvSpPr/>
+            <p:nvPr/>
+          </p:nvSpPr>
+          <p:spPr>
+            <a:xfrm>
+              <a:off x="2320953" y="2880219"/>
+              <a:ext cx="2129745" cy="289823"/>
+            </a:xfrm>
+            <a:prstGeom prst="rect">
+              <a:avLst/>
+            </a:prstGeom>
+            <a:solidFill>
+              <a:schemeClr val="bg1"/>
+            </a:solidFill>
+            <a:ln>
+              <a:noFill/>
+            </a:ln>
+          </p:spPr>
+          <p:style>
+            <a:lnRef idx="2">
+              <a:schemeClr val="accent1">
+                <a:shade val="15000"/>
+              </a:schemeClr>
+            </a:lnRef>
+            <a:fillRef idx="1">
+              <a:schemeClr val="accent1"/>
+            </a:fillRef>
+            <a:effectRef idx="0">
+              <a:schemeClr val="accent1"/>
+            </a:effectRef>
+            <a:fontRef idx="minor">
+              <a:schemeClr val="lt1"/>
+            </a:fontRef>
+          </p:style>
+          <p:txBody>
+            <a:bodyPr rtlCol="0" anchor="ctr"/>
+            <a:lstStyle/>
+            <a:p>
+              <a:pPr algn="ctr"/>
+              <a:endParaRPr lang="en-US"/>
+            </a:p>
+          </p:txBody>
+        </p:sp>
+        <mc:AlternateContent xmlns:mc="http://schemas.openxmlformats.org/markup-compatibility/2006">
+          <mc:Choice xmlns:a14="http://schemas.microsoft.com/office/drawing/2010/main" Requires="a14">
+            <p:sp>
+              <p:nvSpPr>
+                <p:cNvPr id="20" name="TextBox 19">
+                  <a:extLst>
+                    <a:ext uri="{FF2B5EF4-FFF2-40B4-BE49-F238E27FC236}">
+                      <a16:creationId xmlns:a16="http://schemas.microsoft.com/office/drawing/2014/main" id="{378B2B8B-6911-D128-1AAA-94400547C498}"/>
+                    </a:ext>
+                  </a:extLst>
+                </p:cNvPr>
+                <p:cNvSpPr txBox="1"/>
+                <p:nvPr/>
+              </p:nvSpPr>
+              <p:spPr>
+                <a:xfrm>
+                  <a:off x="4537277" y="4940393"/>
+                  <a:ext cx="989633" cy="369332"/>
+                </a:xfrm>
+                <a:prstGeom prst="rect">
+                  <a:avLst/>
+                </a:prstGeom>
+                <a:noFill/>
+              </p:spPr>
+              <p:txBody>
+                <a:bodyPr wrap="square">
+                  <a:spAutoFit/>
+                </a:bodyPr>
+                <a:lstStyle/>
+                <a:p>
+                  <a:pPr algn="ctr"/>
+                  <a14:m>
+                    <m:oMathPara xmlns:m="http://schemas.openxmlformats.org/officeDocument/2006/math">
+                      <m:oMathParaPr>
+                        <m:jc m:val="center"/>
+                      </m:oMathParaPr>
+                      <m:oMath xmlns:m="http://schemas.openxmlformats.org/officeDocument/2006/math">
+                        <m:r>
+                          <a:rPr lang="de-DE" b="0" i="1" smtClean="0">
+                            <a:latin typeface="Cambria Math" panose="02040503050406030204" pitchFamily="18" charset="0"/>
+                          </a:rPr>
+                          <m:t>𝐵</m:t>
+                        </m:r>
+                        <m:r>
+                          <a:rPr lang="de-DE" b="0" i="1" smtClean="0">
+                            <a:latin typeface="Cambria Math" panose="02040503050406030204" pitchFamily="18" charset="0"/>
+                          </a:rPr>
+                          <m:t>=</m:t>
+                        </m:r>
+                        <m:r>
+                          <a:rPr lang="de-DE" b="0" i="1" smtClean="0">
+                            <a:latin typeface="Cambria Math" panose="02040503050406030204" pitchFamily="18" charset="0"/>
+                          </a:rPr>
+                          <m:t>4</m:t>
+                        </m:r>
+                      </m:oMath>
+                    </m:oMathPara>
+                  </a14:m>
+                  <a:endParaRPr lang="en-US" dirty="0"/>
+                </a:p>
+              </p:txBody>
+            </p:sp>
+          </mc:Choice>
+          <mc:Fallback>
+            <p:sp>
+              <p:nvSpPr>
+                <p:cNvPr id="20" name="TextBox 19">
+                  <a:extLst>
+                    <a:ext uri="{FF2B5EF4-FFF2-40B4-BE49-F238E27FC236}">
+                      <a16:creationId xmlns:a16="http://schemas.microsoft.com/office/drawing/2014/main" id="{378B2B8B-6911-D128-1AAA-94400547C498}"/>
+                    </a:ext>
+                  </a:extLst>
+                </p:cNvPr>
+                <p:cNvSpPr txBox="1">
+                  <a:spLocks noRot="1" noChangeAspect="1" noMove="1" noResize="1" noEditPoints="1" noAdjustHandles="1" noChangeArrowheads="1" noChangeShapeType="1" noTextEdit="1"/>
+                </p:cNvSpPr>
+                <p:nvPr/>
+              </p:nvSpPr>
+              <p:spPr>
+                <a:xfrm>
+                  <a:off x="4537277" y="4940393"/>
+                  <a:ext cx="989633" cy="369332"/>
+                </a:xfrm>
+                <a:prstGeom prst="rect">
+                  <a:avLst/>
+                </a:prstGeom>
+                <a:blipFill>
+                  <a:blip r:embed="rId8"/>
+                  <a:stretch>
+                    <a:fillRect/>
+                  </a:stretch>
+                </a:blipFill>
+              </p:spPr>
+              <p:txBody>
+                <a:bodyPr/>
+                <a:lstStyle/>
+                <a:p>
+                  <a:r>
+                    <a:rPr lang="en-US">
+                      <a:noFill/>
+                    </a:rPr>
+                    <a:t> </a:t>
+                  </a:r>
+                </a:p>
+              </p:txBody>
+            </p:sp>
+          </mc:Fallback>
+        </mc:AlternateContent>
+      </p:grpSp>
+    </p:spTree>
+    <p:extLst>
+      <p:ext uri="{BB962C8B-B14F-4D97-AF65-F5344CB8AC3E}">
+        <p14:creationId xmlns:p14="http://schemas.microsoft.com/office/powerpoint/2010/main" val="2584401944"/>
       </p:ext>
     </p:extLst>
   </p:cSld>

</xml_diff>